<commit_message>
added parts for presentation
</commit_message>
<xml_diff>
--- a/Dokumentation/Praesentation/Praesentation.pptx
+++ b/Dokumentation/Praesentation/Praesentation.pptx
@@ -5,12 +5,25 @@
     <p:sldMasterId id="2147483648" r:id="rId1"/>
   </p:sldMasterIdLst>
   <p:notesMasterIdLst>
-    <p:notesMasterId r:id="rId5"/>
+    <p:notesMasterId r:id="rId18"/>
   </p:notesMasterIdLst>
   <p:sldIdLst>
     <p:sldId id="256" r:id="rId2"/>
     <p:sldId id="257" r:id="rId3"/>
     <p:sldId id="258" r:id="rId4"/>
+    <p:sldId id="259" r:id="rId5"/>
+    <p:sldId id="261" r:id="rId6"/>
+    <p:sldId id="260" r:id="rId7"/>
+    <p:sldId id="262" r:id="rId8"/>
+    <p:sldId id="263" r:id="rId9"/>
+    <p:sldId id="264" r:id="rId10"/>
+    <p:sldId id="265" r:id="rId11"/>
+    <p:sldId id="266" r:id="rId12"/>
+    <p:sldId id="267" r:id="rId13"/>
+    <p:sldId id="268" r:id="rId14"/>
+    <p:sldId id="269" r:id="rId15"/>
+    <p:sldId id="270" r:id="rId16"/>
+    <p:sldId id="271" r:id="rId17"/>
   </p:sldIdLst>
   <p:sldSz cx="9144000" cy="6858000" type="screen4x3"/>
   <p:notesSz cx="6858000" cy="9144000"/>
@@ -194,7 +207,7 @@
           <a:p>
             <a:fld id="{AD8B85D8-A08F-474B-850C-6EBE1C4997FF}" type="datetimeFigureOut">
               <a:rPr lang="de-DE" smtClean="0"/>
-              <a:t>03.05.2013</a:t>
+              <a:t>16.05.2013</a:t>
             </a:fld>
             <a:endParaRPr lang="de-DE"/>
           </a:p>
@@ -643,7 +656,7 @@
           <a:p>
             <a:fld id="{2262EDCC-AC18-44F8-82D6-389A1A2ACCA2}" type="datetime1">
               <a:rPr lang="de-DE" smtClean="0"/>
-              <a:t>03.05.2013</a:t>
+              <a:t>16.05.2013</a:t>
             </a:fld>
             <a:endParaRPr lang="de-DE"/>
           </a:p>
@@ -815,7 +828,7 @@
           <a:p>
             <a:fld id="{CB217951-9D3E-47DC-B260-5DE836C303CA}" type="datetime1">
               <a:rPr lang="de-DE" smtClean="0"/>
-              <a:t>03.05.2013</a:t>
+              <a:t>16.05.2013</a:t>
             </a:fld>
             <a:endParaRPr lang="de-DE"/>
           </a:p>
@@ -990,7 +1003,7 @@
           <a:p>
             <a:fld id="{EEC388B6-8733-410D-8F87-E4ED4C6F4DA7}" type="datetime1">
               <a:rPr lang="de-DE" smtClean="0"/>
-              <a:t>03.05.2013</a:t>
+              <a:t>16.05.2013</a:t>
             </a:fld>
             <a:endParaRPr lang="de-DE"/>
           </a:p>
@@ -1075,7 +1088,7 @@
         </p:nvSpPr>
         <p:spPr>
           <a:xfrm>
-            <a:off x="457200" y="908720"/>
+            <a:off x="457200" y="764704"/>
             <a:ext cx="8229600" cy="936104"/>
           </a:xfrm>
         </p:spPr>
@@ -1109,7 +1122,7 @@
         </p:nvSpPr>
         <p:spPr>
           <a:xfrm>
-            <a:off x="457200" y="1988840"/>
+            <a:off x="457200" y="1844824"/>
             <a:ext cx="8229600" cy="4137323"/>
           </a:xfrm>
         </p:spPr>
@@ -1175,7 +1188,7 @@
           <a:p>
             <a:fld id="{93F45587-BEEE-4D54-90A9-A458946DA07D}" type="datetime1">
               <a:rPr lang="de-DE" smtClean="0"/>
-              <a:t>03.05.2013</a:t>
+              <a:t>16.05.2013</a:t>
             </a:fld>
             <a:endParaRPr lang="de-DE" dirty="0"/>
           </a:p>
@@ -1591,7 +1604,7 @@
           <a:p>
             <a:fld id="{37179F3E-53BB-4A1E-B9D8-AF3519983CCC}" type="datetime1">
               <a:rPr lang="de-DE" smtClean="0"/>
-              <a:t>03.05.2013</a:t>
+              <a:t>16.05.2013</a:t>
             </a:fld>
             <a:endParaRPr lang="de-DE" dirty="0"/>
           </a:p>
@@ -1886,7 +1899,7 @@
           <a:p>
             <a:fld id="{1A16814E-E00D-42D7-88BB-0C21ED97C26C}" type="datetime1">
               <a:rPr lang="de-DE" smtClean="0"/>
-              <a:t>03.05.2013</a:t>
+              <a:t>16.05.2013</a:t>
             </a:fld>
             <a:endParaRPr lang="de-DE"/>
           </a:p>
@@ -2303,7 +2316,7 @@
           <a:p>
             <a:fld id="{A7846212-3F43-49B0-9322-E3121984D0F5}" type="datetime1">
               <a:rPr lang="de-DE" smtClean="0"/>
-              <a:t>03.05.2013</a:t>
+              <a:t>16.05.2013</a:t>
             </a:fld>
             <a:endParaRPr lang="de-DE"/>
           </a:p>
@@ -2416,7 +2429,7 @@
           <a:p>
             <a:fld id="{33759B05-CA0A-42AB-AAD6-72142BAED1B5}" type="datetime1">
               <a:rPr lang="de-DE" smtClean="0"/>
-              <a:t>03.05.2013</a:t>
+              <a:t>16.05.2013</a:t>
             </a:fld>
             <a:endParaRPr lang="de-DE"/>
           </a:p>
@@ -2506,7 +2519,7 @@
           <a:p>
             <a:fld id="{3FC932FF-2A97-4EAE-B1FA-B102CC0C0A9E}" type="datetime1">
               <a:rPr lang="de-DE" smtClean="0"/>
-              <a:t>03.05.2013</a:t>
+              <a:t>16.05.2013</a:t>
             </a:fld>
             <a:endParaRPr lang="de-DE"/>
           </a:p>
@@ -2778,7 +2791,7 @@
           <a:p>
             <a:fld id="{1E2F9022-582B-4DAF-B74E-56B6795EA56A}" type="datetime1">
               <a:rPr lang="de-DE" smtClean="0"/>
-              <a:t>03.05.2013</a:t>
+              <a:t>16.05.2013</a:t>
             </a:fld>
             <a:endParaRPr lang="de-DE"/>
           </a:p>
@@ -3026,7 +3039,7 @@
           <a:p>
             <a:fld id="{8A551492-2435-4E67-B69C-BFD679A649D4}" type="datetime1">
               <a:rPr lang="de-DE" smtClean="0"/>
-              <a:t>03.05.2013</a:t>
+              <a:t>16.05.2013</a:t>
             </a:fld>
             <a:endParaRPr lang="de-DE"/>
           </a:p>
@@ -3234,7 +3247,7 @@
           <a:p>
             <a:fld id="{017F8D79-42BA-469E-A555-C90750336C1F}" type="datetime1">
               <a:rPr lang="de-DE" smtClean="0"/>
-              <a:t>03.05.2013</a:t>
+              <a:t>16.05.2013</a:t>
             </a:fld>
             <a:endParaRPr lang="de-DE"/>
           </a:p>
@@ -3670,6 +3683,2194 @@
 </p:sld>
 </file>
 
+<file path=ppt/slides/slide10.xml><?xml version="1.0" encoding="utf-8"?>
+<p:sld xmlns:a="http://schemas.openxmlformats.org/drawingml/2006/main" xmlns:r="http://schemas.openxmlformats.org/officeDocument/2006/relationships" xmlns:p="http://schemas.openxmlformats.org/presentationml/2006/main">
+  <p:cSld>
+    <p:spTree>
+      <p:nvGrpSpPr>
+        <p:cNvPr id="1" name=""/>
+        <p:cNvGrpSpPr/>
+        <p:nvPr/>
+      </p:nvGrpSpPr>
+      <p:grpSpPr>
+        <a:xfrm>
+          <a:off x="0" y="0"/>
+          <a:ext cx="0" cy="0"/>
+          <a:chOff x="0" y="0"/>
+          <a:chExt cx="0" cy="0"/>
+        </a:xfrm>
+      </p:grpSpPr>
+      <p:sp>
+        <p:nvSpPr>
+          <p:cNvPr id="2" name="Titel 1"/>
+          <p:cNvSpPr>
+            <a:spLocks noGrp="1"/>
+          </p:cNvSpPr>
+          <p:nvPr>
+            <p:ph type="title"/>
+          </p:nvPr>
+        </p:nvSpPr>
+        <p:spPr>
+          <a:xfrm>
+            <a:off x="446856" y="836712"/>
+            <a:ext cx="8229600" cy="936104"/>
+          </a:xfrm>
+        </p:spPr>
+        <p:txBody>
+          <a:bodyPr/>
+          <a:lstStyle/>
+          <a:p>
+            <a:r>
+              <a:rPr lang="de-DE" dirty="0" smtClean="0"/>
+              <a:t>Aufgabe: Die View</a:t>
+            </a:r>
+            <a:endParaRPr lang="de-DE" dirty="0"/>
+          </a:p>
+        </p:txBody>
+      </p:sp>
+      <p:sp>
+        <p:nvSpPr>
+          <p:cNvPr id="3" name="Inhaltsplatzhalter 2"/>
+          <p:cNvSpPr>
+            <a:spLocks noGrp="1"/>
+          </p:cNvSpPr>
+          <p:nvPr>
+            <p:ph idx="1"/>
+          </p:nvPr>
+        </p:nvSpPr>
+        <p:spPr>
+          <a:xfrm>
+            <a:off x="2267744" y="1916832"/>
+            <a:ext cx="4824536" cy="648072"/>
+          </a:xfrm>
+        </p:spPr>
+        <p:txBody>
+          <a:bodyPr/>
+          <a:lstStyle/>
+          <a:p>
+            <a:pPr marL="0" indent="0">
+              <a:buNone/>
+            </a:pPr>
+            <a:r>
+              <a:rPr lang="de-DE" dirty="0" smtClean="0"/>
+              <a:t>Was ist eine passive View?</a:t>
+            </a:r>
+            <a:endParaRPr lang="de-DE" dirty="0"/>
+          </a:p>
+        </p:txBody>
+      </p:sp>
+      <p:sp>
+        <p:nvSpPr>
+          <p:cNvPr id="4" name="Datumsplatzhalter 3"/>
+          <p:cNvSpPr>
+            <a:spLocks noGrp="1"/>
+          </p:cNvSpPr>
+          <p:nvPr>
+            <p:ph type="dt" sz="half" idx="10"/>
+          </p:nvPr>
+        </p:nvSpPr>
+        <p:spPr/>
+        <p:txBody>
+          <a:bodyPr/>
+          <a:lstStyle/>
+          <a:p>
+            <a:fld id="{93F45587-BEEE-4D54-90A9-A458946DA07D}" type="datetime1">
+              <a:rPr lang="de-DE" smtClean="0"/>
+              <a:t>16.05.2013</a:t>
+            </a:fld>
+            <a:endParaRPr lang="de-DE" dirty="0"/>
+          </a:p>
+        </p:txBody>
+      </p:sp>
+      <p:sp>
+        <p:nvSpPr>
+          <p:cNvPr id="5" name="Foliennummernplatzhalter 4"/>
+          <p:cNvSpPr>
+            <a:spLocks noGrp="1"/>
+          </p:cNvSpPr>
+          <p:nvPr>
+            <p:ph type="sldNum" sz="quarter" idx="12"/>
+          </p:nvPr>
+        </p:nvSpPr>
+        <p:spPr/>
+        <p:txBody>
+          <a:bodyPr/>
+          <a:lstStyle/>
+          <a:p>
+            <a:fld id="{6C6AE60A-B69C-4790-82F7-3882EDF23186}" type="slidenum">
+              <a:rPr lang="de-DE" smtClean="0"/>
+              <a:pPr/>
+              <a:t>10</a:t>
+            </a:fld>
+            <a:endParaRPr lang="de-DE" dirty="0"/>
+          </a:p>
+        </p:txBody>
+      </p:sp>
+      <p:sp>
+        <p:nvSpPr>
+          <p:cNvPr id="6" name="Pfeil nach oben 5"/>
+          <p:cNvSpPr/>
+          <p:nvPr/>
+        </p:nvSpPr>
+        <p:spPr>
+          <a:xfrm rot="10800000">
+            <a:off x="4252704" y="2708920"/>
+            <a:ext cx="484632" cy="618368"/>
+          </a:xfrm>
+          <a:prstGeom prst="upArrow">
+            <a:avLst/>
+          </a:prstGeom>
+        </p:spPr>
+        <p:style>
+          <a:lnRef idx="2">
+            <a:schemeClr val="accent1">
+              <a:shade val="50000"/>
+            </a:schemeClr>
+          </a:lnRef>
+          <a:fillRef idx="1">
+            <a:schemeClr val="accent1"/>
+          </a:fillRef>
+          <a:effectRef idx="0">
+            <a:schemeClr val="accent1"/>
+          </a:effectRef>
+          <a:fontRef idx="minor">
+            <a:schemeClr val="lt1"/>
+          </a:fontRef>
+        </p:style>
+        <p:txBody>
+          <a:bodyPr rtlCol="0" anchor="ctr"/>
+          <a:lstStyle/>
+          <a:p>
+            <a:pPr algn="ctr"/>
+            <a:endParaRPr lang="de-DE"/>
+          </a:p>
+        </p:txBody>
+      </p:sp>
+      <p:sp>
+        <p:nvSpPr>
+          <p:cNvPr id="7" name="Textfeld 6"/>
+          <p:cNvSpPr txBox="1"/>
+          <p:nvPr/>
+        </p:nvSpPr>
+        <p:spPr>
+          <a:xfrm>
+            <a:off x="179512" y="3573016"/>
+            <a:ext cx="8820472" cy="584775"/>
+          </a:xfrm>
+          <a:prstGeom prst="rect">
+            <a:avLst/>
+          </a:prstGeom>
+          <a:solidFill>
+            <a:schemeClr val="accent6">
+              <a:lumMod val="60000"/>
+              <a:lumOff val="40000"/>
+            </a:schemeClr>
+          </a:solidFill>
+        </p:spPr>
+        <p:txBody>
+          <a:bodyPr wrap="square" rtlCol="0">
+            <a:spAutoFit/>
+          </a:bodyPr>
+          <a:lstStyle/>
+          <a:p>
+            <a:pPr algn="ctr"/>
+            <a:r>
+              <a:rPr lang="de-DE" sz="3200" dirty="0" smtClean="0"/>
+              <a:t>Reduzierung der Programmlogik auf ein Minimum</a:t>
+            </a:r>
+          </a:p>
+        </p:txBody>
+      </p:sp>
+      <p:sp>
+        <p:nvSpPr>
+          <p:cNvPr id="8" name="Kreuz 7"/>
+          <p:cNvSpPr/>
+          <p:nvPr/>
+        </p:nvSpPr>
+        <p:spPr>
+          <a:xfrm>
+            <a:off x="4283968" y="4293096"/>
+            <a:ext cx="504056" cy="576064"/>
+          </a:xfrm>
+          <a:prstGeom prst="plus">
+            <a:avLst>
+              <a:gd name="adj" fmla="val 32045"/>
+            </a:avLst>
+          </a:prstGeom>
+        </p:spPr>
+        <p:style>
+          <a:lnRef idx="2">
+            <a:schemeClr val="accent1">
+              <a:shade val="50000"/>
+            </a:schemeClr>
+          </a:lnRef>
+          <a:fillRef idx="1">
+            <a:schemeClr val="accent1"/>
+          </a:fillRef>
+          <a:effectRef idx="0">
+            <a:schemeClr val="accent1"/>
+          </a:effectRef>
+          <a:fontRef idx="minor">
+            <a:schemeClr val="lt1"/>
+          </a:fontRef>
+        </p:style>
+        <p:txBody>
+          <a:bodyPr rtlCol="0" anchor="ctr"/>
+          <a:lstStyle/>
+          <a:p>
+            <a:pPr algn="ctr"/>
+            <a:endParaRPr lang="de-DE"/>
+          </a:p>
+        </p:txBody>
+      </p:sp>
+      <p:sp>
+        <p:nvSpPr>
+          <p:cNvPr id="9" name="Rechteck 8"/>
+          <p:cNvSpPr/>
+          <p:nvPr/>
+        </p:nvSpPr>
+        <p:spPr>
+          <a:xfrm>
+            <a:off x="395536" y="5085184"/>
+            <a:ext cx="8424936" cy="1077218"/>
+          </a:xfrm>
+          <a:prstGeom prst="rect">
+            <a:avLst/>
+          </a:prstGeom>
+          <a:solidFill>
+            <a:schemeClr val="accent6">
+              <a:lumMod val="60000"/>
+              <a:lumOff val="40000"/>
+            </a:schemeClr>
+          </a:solidFill>
+        </p:spPr>
+        <p:txBody>
+          <a:bodyPr wrap="square">
+            <a:spAutoFit/>
+          </a:bodyPr>
+          <a:lstStyle/>
+          <a:p>
+            <a:pPr algn="ctr"/>
+            <a:r>
+              <a:rPr lang="de-DE" sz="3200" dirty="0"/>
+              <a:t>Handler der GUI-Elemente werden in die View ausgelagert</a:t>
+            </a:r>
+            <a:endParaRPr lang="de-DE" sz="3200" dirty="0"/>
+          </a:p>
+        </p:txBody>
+      </p:sp>
+    </p:spTree>
+    <p:extLst>
+      <p:ext uri="{BB962C8B-B14F-4D97-AF65-F5344CB8AC3E}">
+        <p14:creationId xmlns:p14="http://schemas.microsoft.com/office/powerpoint/2010/main" val="368043059"/>
+      </p:ext>
+    </p:extLst>
+  </p:cSld>
+  <p:clrMapOvr>
+    <a:masterClrMapping/>
+  </p:clrMapOvr>
+  <p:timing>
+    <p:tnLst>
+      <p:par>
+        <p:cTn id="1" dur="indefinite" restart="never" nodeType="tmRoot"/>
+      </p:par>
+    </p:tnLst>
+  </p:timing>
+</p:sld>
+</file>
+
+<file path=ppt/slides/slide11.xml><?xml version="1.0" encoding="utf-8"?>
+<p:sld xmlns:a="http://schemas.openxmlformats.org/drawingml/2006/main" xmlns:r="http://schemas.openxmlformats.org/officeDocument/2006/relationships" xmlns:p="http://schemas.openxmlformats.org/presentationml/2006/main">
+  <p:cSld>
+    <p:spTree>
+      <p:nvGrpSpPr>
+        <p:cNvPr id="1" name=""/>
+        <p:cNvGrpSpPr/>
+        <p:nvPr/>
+      </p:nvGrpSpPr>
+      <p:grpSpPr>
+        <a:xfrm>
+          <a:off x="0" y="0"/>
+          <a:ext cx="0" cy="0"/>
+          <a:chOff x="0" y="0"/>
+          <a:chExt cx="0" cy="0"/>
+        </a:xfrm>
+      </p:grpSpPr>
+      <p:sp>
+        <p:nvSpPr>
+          <p:cNvPr id="2" name="Titel 1"/>
+          <p:cNvSpPr>
+            <a:spLocks noGrp="1"/>
+          </p:cNvSpPr>
+          <p:nvPr>
+            <p:ph type="title"/>
+          </p:nvPr>
+        </p:nvSpPr>
+        <p:spPr/>
+        <p:txBody>
+          <a:bodyPr/>
+          <a:lstStyle/>
+          <a:p>
+            <a:r>
+              <a:rPr lang="de-DE" dirty="0" smtClean="0"/>
+              <a:t>Möglicher MVP-Aufbau</a:t>
+            </a:r>
+            <a:endParaRPr lang="de-DE" dirty="0"/>
+          </a:p>
+        </p:txBody>
+      </p:sp>
+      <p:sp>
+        <p:nvSpPr>
+          <p:cNvPr id="4" name="Datumsplatzhalter 3"/>
+          <p:cNvSpPr>
+            <a:spLocks noGrp="1"/>
+          </p:cNvSpPr>
+          <p:nvPr>
+            <p:ph type="dt" sz="half" idx="10"/>
+          </p:nvPr>
+        </p:nvSpPr>
+        <p:spPr/>
+        <p:txBody>
+          <a:bodyPr/>
+          <a:lstStyle/>
+          <a:p>
+            <a:fld id="{93F45587-BEEE-4D54-90A9-A458946DA07D}" type="datetime1">
+              <a:rPr lang="de-DE" smtClean="0"/>
+              <a:t>16.05.2013</a:t>
+            </a:fld>
+            <a:endParaRPr lang="de-DE" dirty="0"/>
+          </a:p>
+        </p:txBody>
+      </p:sp>
+      <p:sp>
+        <p:nvSpPr>
+          <p:cNvPr id="5" name="Foliennummernplatzhalter 4"/>
+          <p:cNvSpPr>
+            <a:spLocks noGrp="1"/>
+          </p:cNvSpPr>
+          <p:nvPr>
+            <p:ph type="sldNum" sz="quarter" idx="12"/>
+          </p:nvPr>
+        </p:nvSpPr>
+        <p:spPr/>
+        <p:txBody>
+          <a:bodyPr/>
+          <a:lstStyle/>
+          <a:p>
+            <a:fld id="{6C6AE60A-B69C-4790-82F7-3882EDF23186}" type="slidenum">
+              <a:rPr lang="de-DE" smtClean="0"/>
+              <a:pPr/>
+              <a:t>11</a:t>
+            </a:fld>
+            <a:endParaRPr lang="de-DE" dirty="0"/>
+          </a:p>
+        </p:txBody>
+      </p:sp>
+      <p:pic>
+        <p:nvPicPr>
+          <p:cNvPr id="2050" name="Picture 2" descr="C:\Design-Pattern-MVC\ausarbeitung_latex\figure\MVP\MVP_classDiagramm_Example.png"/>
+          <p:cNvPicPr>
+            <a:picLocks noChangeAspect="1" noChangeArrowheads="1"/>
+          </p:cNvPicPr>
+          <p:nvPr/>
+        </p:nvPicPr>
+        <p:blipFill>
+          <a:blip r:embed="rId2">
+            <a:extLst>
+              <a:ext uri="{28A0092B-C50C-407E-A947-70E740481C1C}">
+                <a14:useLocalDpi xmlns:a14="http://schemas.microsoft.com/office/drawing/2010/main" val="0"/>
+              </a:ext>
+            </a:extLst>
+          </a:blip>
+          <a:srcRect/>
+          <a:stretch>
+            <a:fillRect/>
+          </a:stretch>
+        </p:blipFill>
+        <p:spPr bwMode="auto">
+          <a:xfrm>
+            <a:off x="2267744" y="1556792"/>
+            <a:ext cx="3960440" cy="5062749"/>
+          </a:xfrm>
+          <a:prstGeom prst="rect">
+            <a:avLst/>
+          </a:prstGeom>
+          <a:noFill/>
+          <a:extLst>
+            <a:ext uri="{909E8E84-426E-40DD-AFC4-6F175D3DCCD1}">
+              <a14:hiddenFill xmlns:a14="http://schemas.microsoft.com/office/drawing/2010/main">
+                <a:solidFill>
+                  <a:srgbClr val="FFFFFF"/>
+                </a:solidFill>
+              </a14:hiddenFill>
+            </a:ext>
+          </a:extLst>
+        </p:spPr>
+      </p:pic>
+    </p:spTree>
+    <p:extLst>
+      <p:ext uri="{BB962C8B-B14F-4D97-AF65-F5344CB8AC3E}">
+        <p14:creationId xmlns:p14="http://schemas.microsoft.com/office/powerpoint/2010/main" val="2661548110"/>
+      </p:ext>
+    </p:extLst>
+  </p:cSld>
+  <p:clrMapOvr>
+    <a:masterClrMapping/>
+  </p:clrMapOvr>
+  <p:timing>
+    <p:tnLst>
+      <p:par>
+        <p:cTn id="1" dur="indefinite" restart="never" nodeType="tmRoot"/>
+      </p:par>
+    </p:tnLst>
+  </p:timing>
+</p:sld>
+</file>
+
+<file path=ppt/slides/slide12.xml><?xml version="1.0" encoding="utf-8"?>
+<p:sld xmlns:a="http://schemas.openxmlformats.org/drawingml/2006/main" xmlns:r="http://schemas.openxmlformats.org/officeDocument/2006/relationships" xmlns:p="http://schemas.openxmlformats.org/presentationml/2006/main">
+  <p:cSld>
+    <p:spTree>
+      <p:nvGrpSpPr>
+        <p:cNvPr id="1" name=""/>
+        <p:cNvGrpSpPr/>
+        <p:nvPr/>
+      </p:nvGrpSpPr>
+      <p:grpSpPr>
+        <a:xfrm>
+          <a:off x="0" y="0"/>
+          <a:ext cx="0" cy="0"/>
+          <a:chOff x="0" y="0"/>
+          <a:chExt cx="0" cy="0"/>
+        </a:xfrm>
+      </p:grpSpPr>
+      <p:sp>
+        <p:nvSpPr>
+          <p:cNvPr id="2" name="Titel 1"/>
+          <p:cNvSpPr>
+            <a:spLocks noGrp="1"/>
+          </p:cNvSpPr>
+          <p:nvPr>
+            <p:ph type="title"/>
+          </p:nvPr>
+        </p:nvSpPr>
+        <p:spPr/>
+        <p:txBody>
+          <a:bodyPr/>
+          <a:lstStyle/>
+          <a:p>
+            <a:r>
+              <a:rPr lang="de-DE" dirty="0"/>
+              <a:t>k</a:t>
+            </a:r>
+            <a:r>
+              <a:rPr lang="de-DE" dirty="0" smtClean="0"/>
+              <a:t>onkrete Problemstellung</a:t>
+            </a:r>
+            <a:endParaRPr lang="de-DE" dirty="0"/>
+          </a:p>
+        </p:txBody>
+      </p:sp>
+      <p:sp>
+        <p:nvSpPr>
+          <p:cNvPr id="3" name="Inhaltsplatzhalter 2"/>
+          <p:cNvSpPr>
+            <a:spLocks noGrp="1"/>
+          </p:cNvSpPr>
+          <p:nvPr>
+            <p:ph idx="1"/>
+          </p:nvPr>
+        </p:nvSpPr>
+        <p:spPr/>
+        <p:txBody>
+          <a:bodyPr/>
+          <a:lstStyle/>
+          <a:p>
+            <a:pPr marL="0" indent="0">
+              <a:buNone/>
+            </a:pPr>
+            <a:endParaRPr lang="de-DE" dirty="0"/>
+          </a:p>
+        </p:txBody>
+      </p:sp>
+      <p:sp>
+        <p:nvSpPr>
+          <p:cNvPr id="4" name="Datumsplatzhalter 3"/>
+          <p:cNvSpPr>
+            <a:spLocks noGrp="1"/>
+          </p:cNvSpPr>
+          <p:nvPr>
+            <p:ph type="dt" sz="half" idx="10"/>
+          </p:nvPr>
+        </p:nvSpPr>
+        <p:spPr/>
+        <p:txBody>
+          <a:bodyPr/>
+          <a:lstStyle/>
+          <a:p>
+            <a:fld id="{93F45587-BEEE-4D54-90A9-A458946DA07D}" type="datetime1">
+              <a:rPr lang="de-DE" smtClean="0"/>
+              <a:t>16.05.2013</a:t>
+            </a:fld>
+            <a:endParaRPr lang="de-DE" dirty="0"/>
+          </a:p>
+        </p:txBody>
+      </p:sp>
+      <p:sp>
+        <p:nvSpPr>
+          <p:cNvPr id="5" name="Foliennummernplatzhalter 4"/>
+          <p:cNvSpPr>
+            <a:spLocks noGrp="1"/>
+          </p:cNvSpPr>
+          <p:nvPr>
+            <p:ph type="sldNum" sz="quarter" idx="12"/>
+          </p:nvPr>
+        </p:nvSpPr>
+        <p:spPr/>
+        <p:txBody>
+          <a:bodyPr/>
+          <a:lstStyle/>
+          <a:p>
+            <a:fld id="{6C6AE60A-B69C-4790-82F7-3882EDF23186}" type="slidenum">
+              <a:rPr lang="de-DE" smtClean="0"/>
+              <a:pPr/>
+              <a:t>12</a:t>
+            </a:fld>
+            <a:endParaRPr lang="de-DE" dirty="0"/>
+          </a:p>
+        </p:txBody>
+      </p:sp>
+    </p:spTree>
+    <p:extLst>
+      <p:ext uri="{BB962C8B-B14F-4D97-AF65-F5344CB8AC3E}">
+        <p14:creationId xmlns:p14="http://schemas.microsoft.com/office/powerpoint/2010/main" val="4134452096"/>
+      </p:ext>
+    </p:extLst>
+  </p:cSld>
+  <p:clrMapOvr>
+    <a:masterClrMapping/>
+  </p:clrMapOvr>
+  <p:timing>
+    <p:tnLst>
+      <p:par>
+        <p:cTn id="1" dur="indefinite" restart="never" nodeType="tmRoot"/>
+      </p:par>
+    </p:tnLst>
+  </p:timing>
+</p:sld>
+</file>
+
+<file path=ppt/slides/slide13.xml><?xml version="1.0" encoding="utf-8"?>
+<p:sld xmlns:a="http://schemas.openxmlformats.org/drawingml/2006/main" xmlns:r="http://schemas.openxmlformats.org/officeDocument/2006/relationships" xmlns:p="http://schemas.openxmlformats.org/presentationml/2006/main">
+  <p:cSld>
+    <p:spTree>
+      <p:nvGrpSpPr>
+        <p:cNvPr id="1" name=""/>
+        <p:cNvGrpSpPr/>
+        <p:nvPr/>
+      </p:nvGrpSpPr>
+      <p:grpSpPr>
+        <a:xfrm>
+          <a:off x="0" y="0"/>
+          <a:ext cx="0" cy="0"/>
+          <a:chOff x="0" y="0"/>
+          <a:chExt cx="0" cy="0"/>
+        </a:xfrm>
+      </p:grpSpPr>
+      <p:sp>
+        <p:nvSpPr>
+          <p:cNvPr id="2" name="Titel 1"/>
+          <p:cNvSpPr>
+            <a:spLocks noGrp="1"/>
+          </p:cNvSpPr>
+          <p:nvPr>
+            <p:ph type="title"/>
+          </p:nvPr>
+        </p:nvSpPr>
+        <p:spPr/>
+        <p:txBody>
+          <a:bodyPr/>
+          <a:lstStyle/>
+          <a:p>
+            <a:r>
+              <a:rPr lang="de-DE" dirty="0" smtClean="0"/>
+              <a:t>Vorteile</a:t>
+            </a:r>
+            <a:endParaRPr lang="de-DE" dirty="0"/>
+          </a:p>
+        </p:txBody>
+      </p:sp>
+      <p:sp>
+        <p:nvSpPr>
+          <p:cNvPr id="3" name="Inhaltsplatzhalter 2"/>
+          <p:cNvSpPr>
+            <a:spLocks noGrp="1"/>
+          </p:cNvSpPr>
+          <p:nvPr>
+            <p:ph idx="1"/>
+          </p:nvPr>
+        </p:nvSpPr>
+        <p:spPr/>
+        <p:txBody>
+          <a:bodyPr/>
+          <a:lstStyle/>
+          <a:p>
+            <a:r>
+              <a:rPr lang="de-DE" dirty="0" err="1" smtClean="0"/>
+              <a:t>Komponten</a:t>
+            </a:r>
+            <a:r>
+              <a:rPr lang="de-DE" dirty="0" smtClean="0"/>
+              <a:t>/Module sind austauschbar</a:t>
+            </a:r>
+          </a:p>
+          <a:p>
+            <a:r>
+              <a:rPr lang="de-DE" dirty="0" smtClean="0"/>
+              <a:t>Testen der Anwendung vereinfacht ( bessere Wartbarkeit)</a:t>
+            </a:r>
+          </a:p>
+          <a:p>
+            <a:r>
+              <a:rPr lang="de-DE" dirty="0" smtClean="0"/>
+              <a:t>Einfach erweiterbar</a:t>
+            </a:r>
+          </a:p>
+          <a:p>
+            <a:r>
+              <a:rPr lang="de-DE" dirty="0" smtClean="0"/>
+              <a:t>Klare Aufgabenteilung der Komponenten </a:t>
+            </a:r>
+          </a:p>
+          <a:p>
+            <a:pPr marL="0" indent="0">
+              <a:buNone/>
+            </a:pPr>
+            <a:endParaRPr lang="de-DE" dirty="0"/>
+          </a:p>
+        </p:txBody>
+      </p:sp>
+      <p:sp>
+        <p:nvSpPr>
+          <p:cNvPr id="4" name="Datumsplatzhalter 3"/>
+          <p:cNvSpPr>
+            <a:spLocks noGrp="1"/>
+          </p:cNvSpPr>
+          <p:nvPr>
+            <p:ph type="dt" sz="half" idx="10"/>
+          </p:nvPr>
+        </p:nvSpPr>
+        <p:spPr/>
+        <p:txBody>
+          <a:bodyPr/>
+          <a:lstStyle/>
+          <a:p>
+            <a:fld id="{93F45587-BEEE-4D54-90A9-A458946DA07D}" type="datetime1">
+              <a:rPr lang="de-DE" smtClean="0"/>
+              <a:t>16.05.2013</a:t>
+            </a:fld>
+            <a:endParaRPr lang="de-DE" dirty="0"/>
+          </a:p>
+        </p:txBody>
+      </p:sp>
+      <p:sp>
+        <p:nvSpPr>
+          <p:cNvPr id="5" name="Foliennummernplatzhalter 4"/>
+          <p:cNvSpPr>
+            <a:spLocks noGrp="1"/>
+          </p:cNvSpPr>
+          <p:nvPr>
+            <p:ph type="sldNum" sz="quarter" idx="12"/>
+          </p:nvPr>
+        </p:nvSpPr>
+        <p:spPr/>
+        <p:txBody>
+          <a:bodyPr/>
+          <a:lstStyle/>
+          <a:p>
+            <a:fld id="{6C6AE60A-B69C-4790-82F7-3882EDF23186}" type="slidenum">
+              <a:rPr lang="de-DE" smtClean="0"/>
+              <a:pPr/>
+              <a:t>13</a:t>
+            </a:fld>
+            <a:endParaRPr lang="de-DE" dirty="0"/>
+          </a:p>
+        </p:txBody>
+      </p:sp>
+    </p:spTree>
+    <p:extLst>
+      <p:ext uri="{BB962C8B-B14F-4D97-AF65-F5344CB8AC3E}">
+        <p14:creationId xmlns:p14="http://schemas.microsoft.com/office/powerpoint/2010/main" val="294730918"/>
+      </p:ext>
+    </p:extLst>
+  </p:cSld>
+  <p:clrMapOvr>
+    <a:masterClrMapping/>
+  </p:clrMapOvr>
+  <p:timing>
+    <p:tnLst>
+      <p:par>
+        <p:cTn id="1" dur="indefinite" restart="never" nodeType="tmRoot"/>
+      </p:par>
+    </p:tnLst>
+  </p:timing>
+</p:sld>
+</file>
+
+<file path=ppt/slides/slide14.xml><?xml version="1.0" encoding="utf-8"?>
+<p:sld xmlns:a="http://schemas.openxmlformats.org/drawingml/2006/main" xmlns:r="http://schemas.openxmlformats.org/officeDocument/2006/relationships" xmlns:p="http://schemas.openxmlformats.org/presentationml/2006/main">
+  <p:cSld>
+    <p:spTree>
+      <p:nvGrpSpPr>
+        <p:cNvPr id="1" name=""/>
+        <p:cNvGrpSpPr/>
+        <p:nvPr/>
+      </p:nvGrpSpPr>
+      <p:grpSpPr>
+        <a:xfrm>
+          <a:off x="0" y="0"/>
+          <a:ext cx="0" cy="0"/>
+          <a:chOff x="0" y="0"/>
+          <a:chExt cx="0" cy="0"/>
+        </a:xfrm>
+      </p:grpSpPr>
+      <p:sp>
+        <p:nvSpPr>
+          <p:cNvPr id="2" name="Titel 1"/>
+          <p:cNvSpPr>
+            <a:spLocks noGrp="1"/>
+          </p:cNvSpPr>
+          <p:nvPr>
+            <p:ph type="title"/>
+          </p:nvPr>
+        </p:nvSpPr>
+        <p:spPr/>
+        <p:txBody>
+          <a:bodyPr/>
+          <a:lstStyle/>
+          <a:p>
+            <a:r>
+              <a:rPr lang="de-DE" dirty="0" smtClean="0"/>
+              <a:t>Nachteile</a:t>
+            </a:r>
+            <a:endParaRPr lang="de-DE" dirty="0"/>
+          </a:p>
+        </p:txBody>
+      </p:sp>
+      <p:sp>
+        <p:nvSpPr>
+          <p:cNvPr id="3" name="Inhaltsplatzhalter 2"/>
+          <p:cNvSpPr>
+            <a:spLocks noGrp="1"/>
+          </p:cNvSpPr>
+          <p:nvPr>
+            <p:ph idx="1"/>
+          </p:nvPr>
+        </p:nvSpPr>
+        <p:spPr>
+          <a:xfrm>
+            <a:off x="457200" y="1844825"/>
+            <a:ext cx="8229600" cy="2016224"/>
+          </a:xfrm>
+        </p:spPr>
+        <p:txBody>
+          <a:bodyPr/>
+          <a:lstStyle/>
+          <a:p>
+            <a:r>
+              <a:rPr lang="de-DE" dirty="0" smtClean="0"/>
+              <a:t>Hoher Designaufwand</a:t>
+            </a:r>
+          </a:p>
+          <a:p>
+            <a:r>
+              <a:rPr lang="de-DE" dirty="0" smtClean="0"/>
+              <a:t>Nicht auf jedes Szenario anwendbar</a:t>
+            </a:r>
+          </a:p>
+          <a:p>
+            <a:r>
+              <a:rPr lang="de-DE" dirty="0" smtClean="0"/>
+              <a:t>Je nach Implementierungsart:</a:t>
+            </a:r>
+          </a:p>
+          <a:p>
+            <a:endParaRPr lang="de-DE" dirty="0"/>
+          </a:p>
+          <a:p>
+            <a:endParaRPr lang="de-DE" dirty="0" smtClean="0"/>
+          </a:p>
+          <a:p>
+            <a:pPr marL="0" indent="0">
+              <a:buNone/>
+            </a:pPr>
+            <a:endParaRPr lang="de-DE" dirty="0"/>
+          </a:p>
+        </p:txBody>
+      </p:sp>
+      <p:sp>
+        <p:nvSpPr>
+          <p:cNvPr id="4" name="Datumsplatzhalter 3"/>
+          <p:cNvSpPr>
+            <a:spLocks noGrp="1"/>
+          </p:cNvSpPr>
+          <p:nvPr>
+            <p:ph type="dt" sz="half" idx="10"/>
+          </p:nvPr>
+        </p:nvSpPr>
+        <p:spPr/>
+        <p:txBody>
+          <a:bodyPr/>
+          <a:lstStyle/>
+          <a:p>
+            <a:fld id="{93F45587-BEEE-4D54-90A9-A458946DA07D}" type="datetime1">
+              <a:rPr lang="de-DE" smtClean="0"/>
+              <a:t>16.05.2013</a:t>
+            </a:fld>
+            <a:endParaRPr lang="de-DE" dirty="0"/>
+          </a:p>
+        </p:txBody>
+      </p:sp>
+      <p:sp>
+        <p:nvSpPr>
+          <p:cNvPr id="5" name="Foliennummernplatzhalter 4"/>
+          <p:cNvSpPr>
+            <a:spLocks noGrp="1"/>
+          </p:cNvSpPr>
+          <p:nvPr>
+            <p:ph type="sldNum" sz="quarter" idx="12"/>
+          </p:nvPr>
+        </p:nvSpPr>
+        <p:spPr/>
+        <p:txBody>
+          <a:bodyPr/>
+          <a:lstStyle/>
+          <a:p>
+            <a:fld id="{6C6AE60A-B69C-4790-82F7-3882EDF23186}" type="slidenum">
+              <a:rPr lang="de-DE" smtClean="0"/>
+              <a:pPr/>
+              <a:t>14</a:t>
+            </a:fld>
+            <a:endParaRPr lang="de-DE" dirty="0"/>
+          </a:p>
+        </p:txBody>
+      </p:sp>
+      <p:sp>
+        <p:nvSpPr>
+          <p:cNvPr id="7" name="Textfeld 6"/>
+          <p:cNvSpPr txBox="1"/>
+          <p:nvPr/>
+        </p:nvSpPr>
+        <p:spPr>
+          <a:xfrm>
+            <a:off x="2051720" y="5267345"/>
+            <a:ext cx="4814523" cy="584775"/>
+          </a:xfrm>
+          <a:prstGeom prst="rect">
+            <a:avLst/>
+          </a:prstGeom>
+          <a:solidFill>
+            <a:schemeClr val="accent6">
+              <a:lumMod val="60000"/>
+              <a:lumOff val="40000"/>
+            </a:schemeClr>
+          </a:solidFill>
+        </p:spPr>
+        <p:txBody>
+          <a:bodyPr wrap="none" rtlCol="0">
+            <a:spAutoFit/>
+          </a:bodyPr>
+          <a:lstStyle/>
+          <a:p>
+            <a:r>
+              <a:rPr lang="de-DE" sz="3200" dirty="0"/>
+              <a:t>höherer </a:t>
+            </a:r>
+            <a:r>
+              <a:rPr lang="de-DE" sz="3200" dirty="0" err="1" smtClean="0"/>
+              <a:t>Resourcenaufwand</a:t>
+            </a:r>
+            <a:endParaRPr lang="de-DE" sz="3200" dirty="0"/>
+          </a:p>
+        </p:txBody>
+      </p:sp>
+      <p:sp>
+        <p:nvSpPr>
+          <p:cNvPr id="8" name="Pfeil nach unten 7"/>
+          <p:cNvSpPr/>
+          <p:nvPr/>
+        </p:nvSpPr>
+        <p:spPr>
+          <a:xfrm>
+            <a:off x="4139952" y="3789040"/>
+            <a:ext cx="864096" cy="1224136"/>
+          </a:xfrm>
+          <a:prstGeom prst="downArrow">
+            <a:avLst/>
+          </a:prstGeom>
+        </p:spPr>
+        <p:style>
+          <a:lnRef idx="2">
+            <a:schemeClr val="accent1">
+              <a:shade val="50000"/>
+            </a:schemeClr>
+          </a:lnRef>
+          <a:fillRef idx="1">
+            <a:schemeClr val="accent1"/>
+          </a:fillRef>
+          <a:effectRef idx="0">
+            <a:schemeClr val="accent1"/>
+          </a:effectRef>
+          <a:fontRef idx="minor">
+            <a:schemeClr val="lt1"/>
+          </a:fontRef>
+        </p:style>
+        <p:txBody>
+          <a:bodyPr rtlCol="0" anchor="ctr"/>
+          <a:lstStyle/>
+          <a:p>
+            <a:pPr algn="ctr"/>
+            <a:endParaRPr lang="de-DE"/>
+          </a:p>
+        </p:txBody>
+      </p:sp>
+    </p:spTree>
+    <p:extLst>
+      <p:ext uri="{BB962C8B-B14F-4D97-AF65-F5344CB8AC3E}">
+        <p14:creationId xmlns:p14="http://schemas.microsoft.com/office/powerpoint/2010/main" val="4177885348"/>
+      </p:ext>
+    </p:extLst>
+  </p:cSld>
+  <p:clrMapOvr>
+    <a:masterClrMapping/>
+  </p:clrMapOvr>
+  <p:timing>
+    <p:tnLst>
+      <p:par>
+        <p:cTn id="1" dur="indefinite" restart="never" nodeType="tmRoot"/>
+      </p:par>
+    </p:tnLst>
+  </p:timing>
+</p:sld>
+</file>
+
+<file path=ppt/slides/slide15.xml><?xml version="1.0" encoding="utf-8"?>
+<p:sld xmlns:a="http://schemas.openxmlformats.org/drawingml/2006/main" xmlns:r="http://schemas.openxmlformats.org/officeDocument/2006/relationships" xmlns:p="http://schemas.openxmlformats.org/presentationml/2006/main">
+  <p:cSld>
+    <p:spTree>
+      <p:nvGrpSpPr>
+        <p:cNvPr id="1" name=""/>
+        <p:cNvGrpSpPr/>
+        <p:nvPr/>
+      </p:nvGrpSpPr>
+      <p:grpSpPr>
+        <a:xfrm>
+          <a:off x="0" y="0"/>
+          <a:ext cx="0" cy="0"/>
+          <a:chOff x="0" y="0"/>
+          <a:chExt cx="0" cy="0"/>
+        </a:xfrm>
+      </p:grpSpPr>
+      <p:sp>
+        <p:nvSpPr>
+          <p:cNvPr id="2" name="Titel 1"/>
+          <p:cNvSpPr>
+            <a:spLocks noGrp="1"/>
+          </p:cNvSpPr>
+          <p:nvPr>
+            <p:ph type="title"/>
+          </p:nvPr>
+        </p:nvSpPr>
+        <p:spPr/>
+        <p:txBody>
+          <a:bodyPr/>
+          <a:lstStyle/>
+          <a:p>
+            <a:r>
+              <a:rPr lang="de-DE" dirty="0" smtClean="0"/>
+              <a:t>(Subjektives) Fazit</a:t>
+            </a:r>
+            <a:endParaRPr lang="de-DE" dirty="0"/>
+          </a:p>
+        </p:txBody>
+      </p:sp>
+      <p:sp>
+        <p:nvSpPr>
+          <p:cNvPr id="4" name="Datumsplatzhalter 3"/>
+          <p:cNvSpPr>
+            <a:spLocks noGrp="1"/>
+          </p:cNvSpPr>
+          <p:nvPr>
+            <p:ph type="dt" sz="half" idx="10"/>
+          </p:nvPr>
+        </p:nvSpPr>
+        <p:spPr/>
+        <p:txBody>
+          <a:bodyPr/>
+          <a:lstStyle/>
+          <a:p>
+            <a:fld id="{93F45587-BEEE-4D54-90A9-A458946DA07D}" type="datetime1">
+              <a:rPr lang="de-DE" smtClean="0"/>
+              <a:t>16.05.2013</a:t>
+            </a:fld>
+            <a:endParaRPr lang="de-DE" dirty="0"/>
+          </a:p>
+        </p:txBody>
+      </p:sp>
+      <p:sp>
+        <p:nvSpPr>
+          <p:cNvPr id="5" name="Foliennummernplatzhalter 4"/>
+          <p:cNvSpPr>
+            <a:spLocks noGrp="1"/>
+          </p:cNvSpPr>
+          <p:nvPr>
+            <p:ph type="sldNum" sz="quarter" idx="12"/>
+          </p:nvPr>
+        </p:nvSpPr>
+        <p:spPr/>
+        <p:txBody>
+          <a:bodyPr/>
+          <a:lstStyle/>
+          <a:p>
+            <a:fld id="{6C6AE60A-B69C-4790-82F7-3882EDF23186}" type="slidenum">
+              <a:rPr lang="de-DE" smtClean="0"/>
+              <a:pPr/>
+              <a:t>15</a:t>
+            </a:fld>
+            <a:endParaRPr lang="de-DE" dirty="0"/>
+          </a:p>
+        </p:txBody>
+      </p:sp>
+      <p:sp>
+        <p:nvSpPr>
+          <p:cNvPr id="7" name="Inhaltsplatzhalter 2"/>
+          <p:cNvSpPr txBox="1">
+            <a:spLocks/>
+          </p:cNvSpPr>
+          <p:nvPr/>
+        </p:nvSpPr>
+        <p:spPr>
+          <a:xfrm>
+            <a:off x="529208" y="1700808"/>
+            <a:ext cx="3034680" cy="1152128"/>
+          </a:xfrm>
+          <a:prstGeom prst="rect">
+            <a:avLst/>
+          </a:prstGeom>
+          <a:solidFill>
+            <a:schemeClr val="accent6">
+              <a:lumMod val="60000"/>
+              <a:lumOff val="40000"/>
+            </a:schemeClr>
+          </a:solidFill>
+        </p:spPr>
+        <p:txBody>
+          <a:bodyPr vert="horz" lIns="91440" tIns="45720" rIns="91440" bIns="45720" rtlCol="0">
+            <a:normAutofit/>
+          </a:bodyPr>
+          <a:lstStyle>
+            <a:lvl1pPr marL="342900" indent="-342900" algn="l" defTabSz="914400" rtl="0" eaLnBrk="1" latinLnBrk="0" hangingPunct="1">
+              <a:spcBef>
+                <a:spcPct val="20000"/>
+              </a:spcBef>
+              <a:buFont typeface="Arial" pitchFamily="34" charset="0"/>
+              <a:buChar char="•"/>
+              <a:defRPr sz="3200" kern="1200">
+                <a:solidFill>
+                  <a:schemeClr val="tx1"/>
+                </a:solidFill>
+                <a:latin typeface="+mn-lt"/>
+                <a:ea typeface="+mn-ea"/>
+                <a:cs typeface="+mn-cs"/>
+              </a:defRPr>
+            </a:lvl1pPr>
+            <a:lvl2pPr marL="742950" indent="-285750" algn="l" defTabSz="914400" rtl="0" eaLnBrk="1" latinLnBrk="0" hangingPunct="1">
+              <a:spcBef>
+                <a:spcPct val="20000"/>
+              </a:spcBef>
+              <a:buFont typeface="Arial" pitchFamily="34" charset="0"/>
+              <a:buChar char="–"/>
+              <a:defRPr sz="2800" kern="1200">
+                <a:solidFill>
+                  <a:schemeClr val="tx1"/>
+                </a:solidFill>
+                <a:latin typeface="+mn-lt"/>
+                <a:ea typeface="+mn-ea"/>
+                <a:cs typeface="+mn-cs"/>
+              </a:defRPr>
+            </a:lvl2pPr>
+            <a:lvl3pPr marL="1143000" indent="-228600" algn="l" defTabSz="914400" rtl="0" eaLnBrk="1" latinLnBrk="0" hangingPunct="1">
+              <a:spcBef>
+                <a:spcPct val="20000"/>
+              </a:spcBef>
+              <a:buFont typeface="Arial" pitchFamily="34" charset="0"/>
+              <a:buChar char="•"/>
+              <a:defRPr sz="2400" kern="1200">
+                <a:solidFill>
+                  <a:schemeClr val="tx1"/>
+                </a:solidFill>
+                <a:latin typeface="+mn-lt"/>
+                <a:ea typeface="+mn-ea"/>
+                <a:cs typeface="+mn-cs"/>
+              </a:defRPr>
+            </a:lvl3pPr>
+            <a:lvl4pPr marL="1600200" indent="-228600" algn="l" defTabSz="914400" rtl="0" eaLnBrk="1" latinLnBrk="0" hangingPunct="1">
+              <a:spcBef>
+                <a:spcPct val="20000"/>
+              </a:spcBef>
+              <a:buFont typeface="Arial" pitchFamily="34" charset="0"/>
+              <a:buChar char="–"/>
+              <a:defRPr sz="2000" kern="1200">
+                <a:solidFill>
+                  <a:schemeClr val="tx1"/>
+                </a:solidFill>
+                <a:latin typeface="+mn-lt"/>
+                <a:ea typeface="+mn-ea"/>
+                <a:cs typeface="+mn-cs"/>
+              </a:defRPr>
+            </a:lvl4pPr>
+            <a:lvl5pPr marL="2057400" indent="-228600" algn="l" defTabSz="914400" rtl="0" eaLnBrk="1" latinLnBrk="0" hangingPunct="1">
+              <a:spcBef>
+                <a:spcPct val="20000"/>
+              </a:spcBef>
+              <a:buFont typeface="Arial" pitchFamily="34" charset="0"/>
+              <a:buChar char="»"/>
+              <a:defRPr sz="2000" kern="1200">
+                <a:solidFill>
+                  <a:schemeClr val="tx1"/>
+                </a:solidFill>
+                <a:latin typeface="+mn-lt"/>
+                <a:ea typeface="+mn-ea"/>
+                <a:cs typeface="+mn-cs"/>
+              </a:defRPr>
+            </a:lvl5pPr>
+            <a:lvl6pPr marL="2514600" indent="-228600" algn="l" defTabSz="914400" rtl="0" eaLnBrk="1" latinLnBrk="0" hangingPunct="1">
+              <a:spcBef>
+                <a:spcPct val="20000"/>
+              </a:spcBef>
+              <a:buFont typeface="Arial" pitchFamily="34" charset="0"/>
+              <a:buChar char="•"/>
+              <a:defRPr sz="2000" kern="1200">
+                <a:solidFill>
+                  <a:schemeClr val="tx1"/>
+                </a:solidFill>
+                <a:latin typeface="+mn-lt"/>
+                <a:ea typeface="+mn-ea"/>
+                <a:cs typeface="+mn-cs"/>
+              </a:defRPr>
+            </a:lvl6pPr>
+            <a:lvl7pPr marL="2971800" indent="-228600" algn="l" defTabSz="914400" rtl="0" eaLnBrk="1" latinLnBrk="0" hangingPunct="1">
+              <a:spcBef>
+                <a:spcPct val="20000"/>
+              </a:spcBef>
+              <a:buFont typeface="Arial" pitchFamily="34" charset="0"/>
+              <a:buChar char="•"/>
+              <a:defRPr sz="2000" kern="1200">
+                <a:solidFill>
+                  <a:schemeClr val="tx1"/>
+                </a:solidFill>
+                <a:latin typeface="+mn-lt"/>
+                <a:ea typeface="+mn-ea"/>
+                <a:cs typeface="+mn-cs"/>
+              </a:defRPr>
+            </a:lvl7pPr>
+            <a:lvl8pPr marL="3429000" indent="-228600" algn="l" defTabSz="914400" rtl="0" eaLnBrk="1" latinLnBrk="0" hangingPunct="1">
+              <a:spcBef>
+                <a:spcPct val="20000"/>
+              </a:spcBef>
+              <a:buFont typeface="Arial" pitchFamily="34" charset="0"/>
+              <a:buChar char="•"/>
+              <a:defRPr sz="2000" kern="1200">
+                <a:solidFill>
+                  <a:schemeClr val="tx1"/>
+                </a:solidFill>
+                <a:latin typeface="+mn-lt"/>
+                <a:ea typeface="+mn-ea"/>
+                <a:cs typeface="+mn-cs"/>
+              </a:defRPr>
+            </a:lvl8pPr>
+            <a:lvl9pPr marL="3886200" indent="-228600" algn="l" defTabSz="914400" rtl="0" eaLnBrk="1" latinLnBrk="0" hangingPunct="1">
+              <a:spcBef>
+                <a:spcPct val="20000"/>
+              </a:spcBef>
+              <a:buFont typeface="Arial" pitchFamily="34" charset="0"/>
+              <a:buChar char="•"/>
+              <a:defRPr sz="2000" kern="1200">
+                <a:solidFill>
+                  <a:schemeClr val="tx1"/>
+                </a:solidFill>
+                <a:latin typeface="+mn-lt"/>
+                <a:ea typeface="+mn-ea"/>
+                <a:cs typeface="+mn-cs"/>
+              </a:defRPr>
+            </a:lvl9pPr>
+          </a:lstStyle>
+          <a:p>
+            <a:pPr marL="0" indent="0" algn="ctr">
+              <a:buFont typeface="Arial" pitchFamily="34" charset="0"/>
+              <a:buNone/>
+            </a:pPr>
+            <a:r>
+              <a:rPr lang="de-DE" dirty="0" smtClean="0"/>
+              <a:t>kleine Anwendung</a:t>
+            </a:r>
+          </a:p>
+        </p:txBody>
+      </p:sp>
+      <p:sp>
+        <p:nvSpPr>
+          <p:cNvPr id="8" name="Pfeil nach links und rechts 7"/>
+          <p:cNvSpPr/>
+          <p:nvPr/>
+        </p:nvSpPr>
+        <p:spPr>
+          <a:xfrm>
+            <a:off x="3724193" y="1880828"/>
+            <a:ext cx="1800200" cy="792088"/>
+          </a:xfrm>
+          <a:prstGeom prst="leftRightArrow">
+            <a:avLst/>
+          </a:prstGeom>
+        </p:spPr>
+        <p:style>
+          <a:lnRef idx="2">
+            <a:schemeClr val="accent1">
+              <a:shade val="50000"/>
+            </a:schemeClr>
+          </a:lnRef>
+          <a:fillRef idx="1">
+            <a:schemeClr val="accent1"/>
+          </a:fillRef>
+          <a:effectRef idx="0">
+            <a:schemeClr val="accent1"/>
+          </a:effectRef>
+          <a:fontRef idx="minor">
+            <a:schemeClr val="lt1"/>
+          </a:fontRef>
+        </p:style>
+        <p:txBody>
+          <a:bodyPr rtlCol="0" anchor="ctr"/>
+          <a:lstStyle/>
+          <a:p>
+            <a:pPr algn="ctr"/>
+            <a:endParaRPr lang="de-DE"/>
+          </a:p>
+        </p:txBody>
+      </p:sp>
+      <p:sp>
+        <p:nvSpPr>
+          <p:cNvPr id="9" name="Inhaltsplatzhalter 2"/>
+          <p:cNvSpPr txBox="1">
+            <a:spLocks/>
+          </p:cNvSpPr>
+          <p:nvPr/>
+        </p:nvSpPr>
+        <p:spPr>
+          <a:xfrm>
+            <a:off x="5641776" y="1772816"/>
+            <a:ext cx="3034680" cy="1152128"/>
+          </a:xfrm>
+          <a:prstGeom prst="rect">
+            <a:avLst/>
+          </a:prstGeom>
+          <a:solidFill>
+            <a:schemeClr val="bg2"/>
+          </a:solidFill>
+        </p:spPr>
+        <p:txBody>
+          <a:bodyPr vert="horz" lIns="91440" tIns="45720" rIns="91440" bIns="45720" rtlCol="0">
+            <a:normAutofit lnSpcReduction="10000"/>
+          </a:bodyPr>
+          <a:lstStyle>
+            <a:lvl1pPr marL="342900" indent="-342900" algn="l" defTabSz="914400" rtl="0" eaLnBrk="1" latinLnBrk="0" hangingPunct="1">
+              <a:spcBef>
+                <a:spcPct val="20000"/>
+              </a:spcBef>
+              <a:buFont typeface="Arial" pitchFamily="34" charset="0"/>
+              <a:buChar char="•"/>
+              <a:defRPr sz="3200" kern="1200">
+                <a:solidFill>
+                  <a:schemeClr val="tx1"/>
+                </a:solidFill>
+                <a:latin typeface="+mn-lt"/>
+                <a:ea typeface="+mn-ea"/>
+                <a:cs typeface="+mn-cs"/>
+              </a:defRPr>
+            </a:lvl1pPr>
+            <a:lvl2pPr marL="742950" indent="-285750" algn="l" defTabSz="914400" rtl="0" eaLnBrk="1" latinLnBrk="0" hangingPunct="1">
+              <a:spcBef>
+                <a:spcPct val="20000"/>
+              </a:spcBef>
+              <a:buFont typeface="Arial" pitchFamily="34" charset="0"/>
+              <a:buChar char="–"/>
+              <a:defRPr sz="2800" kern="1200">
+                <a:solidFill>
+                  <a:schemeClr val="tx1"/>
+                </a:solidFill>
+                <a:latin typeface="+mn-lt"/>
+                <a:ea typeface="+mn-ea"/>
+                <a:cs typeface="+mn-cs"/>
+              </a:defRPr>
+            </a:lvl2pPr>
+            <a:lvl3pPr marL="1143000" indent="-228600" algn="l" defTabSz="914400" rtl="0" eaLnBrk="1" latinLnBrk="0" hangingPunct="1">
+              <a:spcBef>
+                <a:spcPct val="20000"/>
+              </a:spcBef>
+              <a:buFont typeface="Arial" pitchFamily="34" charset="0"/>
+              <a:buChar char="•"/>
+              <a:defRPr sz="2400" kern="1200">
+                <a:solidFill>
+                  <a:schemeClr val="tx1"/>
+                </a:solidFill>
+                <a:latin typeface="+mn-lt"/>
+                <a:ea typeface="+mn-ea"/>
+                <a:cs typeface="+mn-cs"/>
+              </a:defRPr>
+            </a:lvl3pPr>
+            <a:lvl4pPr marL="1600200" indent="-228600" algn="l" defTabSz="914400" rtl="0" eaLnBrk="1" latinLnBrk="0" hangingPunct="1">
+              <a:spcBef>
+                <a:spcPct val="20000"/>
+              </a:spcBef>
+              <a:buFont typeface="Arial" pitchFamily="34" charset="0"/>
+              <a:buChar char="–"/>
+              <a:defRPr sz="2000" kern="1200">
+                <a:solidFill>
+                  <a:schemeClr val="tx1"/>
+                </a:solidFill>
+                <a:latin typeface="+mn-lt"/>
+                <a:ea typeface="+mn-ea"/>
+                <a:cs typeface="+mn-cs"/>
+              </a:defRPr>
+            </a:lvl4pPr>
+            <a:lvl5pPr marL="2057400" indent="-228600" algn="l" defTabSz="914400" rtl="0" eaLnBrk="1" latinLnBrk="0" hangingPunct="1">
+              <a:spcBef>
+                <a:spcPct val="20000"/>
+              </a:spcBef>
+              <a:buFont typeface="Arial" pitchFamily="34" charset="0"/>
+              <a:buChar char="»"/>
+              <a:defRPr sz="2000" kern="1200">
+                <a:solidFill>
+                  <a:schemeClr val="tx1"/>
+                </a:solidFill>
+                <a:latin typeface="+mn-lt"/>
+                <a:ea typeface="+mn-ea"/>
+                <a:cs typeface="+mn-cs"/>
+              </a:defRPr>
+            </a:lvl5pPr>
+            <a:lvl6pPr marL="2514600" indent="-228600" algn="l" defTabSz="914400" rtl="0" eaLnBrk="1" latinLnBrk="0" hangingPunct="1">
+              <a:spcBef>
+                <a:spcPct val="20000"/>
+              </a:spcBef>
+              <a:buFont typeface="Arial" pitchFamily="34" charset="0"/>
+              <a:buChar char="•"/>
+              <a:defRPr sz="2000" kern="1200">
+                <a:solidFill>
+                  <a:schemeClr val="tx1"/>
+                </a:solidFill>
+                <a:latin typeface="+mn-lt"/>
+                <a:ea typeface="+mn-ea"/>
+                <a:cs typeface="+mn-cs"/>
+              </a:defRPr>
+            </a:lvl6pPr>
+            <a:lvl7pPr marL="2971800" indent="-228600" algn="l" defTabSz="914400" rtl="0" eaLnBrk="1" latinLnBrk="0" hangingPunct="1">
+              <a:spcBef>
+                <a:spcPct val="20000"/>
+              </a:spcBef>
+              <a:buFont typeface="Arial" pitchFamily="34" charset="0"/>
+              <a:buChar char="•"/>
+              <a:defRPr sz="2000" kern="1200">
+                <a:solidFill>
+                  <a:schemeClr val="tx1"/>
+                </a:solidFill>
+                <a:latin typeface="+mn-lt"/>
+                <a:ea typeface="+mn-ea"/>
+                <a:cs typeface="+mn-cs"/>
+              </a:defRPr>
+            </a:lvl7pPr>
+            <a:lvl8pPr marL="3429000" indent="-228600" algn="l" defTabSz="914400" rtl="0" eaLnBrk="1" latinLnBrk="0" hangingPunct="1">
+              <a:spcBef>
+                <a:spcPct val="20000"/>
+              </a:spcBef>
+              <a:buFont typeface="Arial" pitchFamily="34" charset="0"/>
+              <a:buChar char="•"/>
+              <a:defRPr sz="2000" kern="1200">
+                <a:solidFill>
+                  <a:schemeClr val="tx1"/>
+                </a:solidFill>
+                <a:latin typeface="+mn-lt"/>
+                <a:ea typeface="+mn-ea"/>
+                <a:cs typeface="+mn-cs"/>
+              </a:defRPr>
+            </a:lvl8pPr>
+            <a:lvl9pPr marL="3886200" indent="-228600" algn="l" defTabSz="914400" rtl="0" eaLnBrk="1" latinLnBrk="0" hangingPunct="1">
+              <a:spcBef>
+                <a:spcPct val="20000"/>
+              </a:spcBef>
+              <a:buFont typeface="Arial" pitchFamily="34" charset="0"/>
+              <a:buChar char="•"/>
+              <a:defRPr sz="2000" kern="1200">
+                <a:solidFill>
+                  <a:schemeClr val="tx1"/>
+                </a:solidFill>
+                <a:latin typeface="+mn-lt"/>
+                <a:ea typeface="+mn-ea"/>
+                <a:cs typeface="+mn-cs"/>
+              </a:defRPr>
+            </a:lvl9pPr>
+          </a:lstStyle>
+          <a:p>
+            <a:pPr marL="0" indent="0" algn="ctr">
+              <a:buFont typeface="Arial" pitchFamily="34" charset="0"/>
+              <a:buNone/>
+            </a:pPr>
+            <a:r>
+              <a:rPr lang="de-DE" dirty="0" smtClean="0"/>
+              <a:t>Bedingt </a:t>
+            </a:r>
+          </a:p>
+          <a:p>
+            <a:pPr marL="0" indent="0" algn="ctr">
+              <a:buFont typeface="Arial" pitchFamily="34" charset="0"/>
+              <a:buNone/>
+            </a:pPr>
+            <a:r>
+              <a:rPr lang="de-DE" dirty="0" smtClean="0"/>
+              <a:t>einsetzbar</a:t>
+            </a:r>
+          </a:p>
+        </p:txBody>
+      </p:sp>
+      <p:sp>
+        <p:nvSpPr>
+          <p:cNvPr id="11" name="Inhaltsplatzhalter 2"/>
+          <p:cNvSpPr txBox="1">
+            <a:spLocks/>
+          </p:cNvSpPr>
+          <p:nvPr/>
+        </p:nvSpPr>
+        <p:spPr>
+          <a:xfrm>
+            <a:off x="529208" y="2996952"/>
+            <a:ext cx="3034680" cy="1080120"/>
+          </a:xfrm>
+          <a:prstGeom prst="rect">
+            <a:avLst/>
+          </a:prstGeom>
+          <a:solidFill>
+            <a:schemeClr val="accent6">
+              <a:lumMod val="60000"/>
+              <a:lumOff val="40000"/>
+            </a:schemeClr>
+          </a:solidFill>
+        </p:spPr>
+        <p:txBody>
+          <a:bodyPr vert="horz" lIns="91440" tIns="45720" rIns="91440" bIns="45720" rtlCol="0">
+            <a:normAutofit/>
+          </a:bodyPr>
+          <a:lstStyle>
+            <a:lvl1pPr marL="342900" indent="-342900" algn="l" defTabSz="914400" rtl="0" eaLnBrk="1" latinLnBrk="0" hangingPunct="1">
+              <a:spcBef>
+                <a:spcPct val="20000"/>
+              </a:spcBef>
+              <a:buFont typeface="Arial" pitchFamily="34" charset="0"/>
+              <a:buChar char="•"/>
+              <a:defRPr sz="3200" kern="1200">
+                <a:solidFill>
+                  <a:schemeClr val="tx1"/>
+                </a:solidFill>
+                <a:latin typeface="+mn-lt"/>
+                <a:ea typeface="+mn-ea"/>
+                <a:cs typeface="+mn-cs"/>
+              </a:defRPr>
+            </a:lvl1pPr>
+            <a:lvl2pPr marL="742950" indent="-285750" algn="l" defTabSz="914400" rtl="0" eaLnBrk="1" latinLnBrk="0" hangingPunct="1">
+              <a:spcBef>
+                <a:spcPct val="20000"/>
+              </a:spcBef>
+              <a:buFont typeface="Arial" pitchFamily="34" charset="0"/>
+              <a:buChar char="–"/>
+              <a:defRPr sz="2800" kern="1200">
+                <a:solidFill>
+                  <a:schemeClr val="tx1"/>
+                </a:solidFill>
+                <a:latin typeface="+mn-lt"/>
+                <a:ea typeface="+mn-ea"/>
+                <a:cs typeface="+mn-cs"/>
+              </a:defRPr>
+            </a:lvl2pPr>
+            <a:lvl3pPr marL="1143000" indent="-228600" algn="l" defTabSz="914400" rtl="0" eaLnBrk="1" latinLnBrk="0" hangingPunct="1">
+              <a:spcBef>
+                <a:spcPct val="20000"/>
+              </a:spcBef>
+              <a:buFont typeface="Arial" pitchFamily="34" charset="0"/>
+              <a:buChar char="•"/>
+              <a:defRPr sz="2400" kern="1200">
+                <a:solidFill>
+                  <a:schemeClr val="tx1"/>
+                </a:solidFill>
+                <a:latin typeface="+mn-lt"/>
+                <a:ea typeface="+mn-ea"/>
+                <a:cs typeface="+mn-cs"/>
+              </a:defRPr>
+            </a:lvl3pPr>
+            <a:lvl4pPr marL="1600200" indent="-228600" algn="l" defTabSz="914400" rtl="0" eaLnBrk="1" latinLnBrk="0" hangingPunct="1">
+              <a:spcBef>
+                <a:spcPct val="20000"/>
+              </a:spcBef>
+              <a:buFont typeface="Arial" pitchFamily="34" charset="0"/>
+              <a:buChar char="–"/>
+              <a:defRPr sz="2000" kern="1200">
+                <a:solidFill>
+                  <a:schemeClr val="tx1"/>
+                </a:solidFill>
+                <a:latin typeface="+mn-lt"/>
+                <a:ea typeface="+mn-ea"/>
+                <a:cs typeface="+mn-cs"/>
+              </a:defRPr>
+            </a:lvl4pPr>
+            <a:lvl5pPr marL="2057400" indent="-228600" algn="l" defTabSz="914400" rtl="0" eaLnBrk="1" latinLnBrk="0" hangingPunct="1">
+              <a:spcBef>
+                <a:spcPct val="20000"/>
+              </a:spcBef>
+              <a:buFont typeface="Arial" pitchFamily="34" charset="0"/>
+              <a:buChar char="»"/>
+              <a:defRPr sz="2000" kern="1200">
+                <a:solidFill>
+                  <a:schemeClr val="tx1"/>
+                </a:solidFill>
+                <a:latin typeface="+mn-lt"/>
+                <a:ea typeface="+mn-ea"/>
+                <a:cs typeface="+mn-cs"/>
+              </a:defRPr>
+            </a:lvl5pPr>
+            <a:lvl6pPr marL="2514600" indent="-228600" algn="l" defTabSz="914400" rtl="0" eaLnBrk="1" latinLnBrk="0" hangingPunct="1">
+              <a:spcBef>
+                <a:spcPct val="20000"/>
+              </a:spcBef>
+              <a:buFont typeface="Arial" pitchFamily="34" charset="0"/>
+              <a:buChar char="•"/>
+              <a:defRPr sz="2000" kern="1200">
+                <a:solidFill>
+                  <a:schemeClr val="tx1"/>
+                </a:solidFill>
+                <a:latin typeface="+mn-lt"/>
+                <a:ea typeface="+mn-ea"/>
+                <a:cs typeface="+mn-cs"/>
+              </a:defRPr>
+            </a:lvl6pPr>
+            <a:lvl7pPr marL="2971800" indent="-228600" algn="l" defTabSz="914400" rtl="0" eaLnBrk="1" latinLnBrk="0" hangingPunct="1">
+              <a:spcBef>
+                <a:spcPct val="20000"/>
+              </a:spcBef>
+              <a:buFont typeface="Arial" pitchFamily="34" charset="0"/>
+              <a:buChar char="•"/>
+              <a:defRPr sz="2000" kern="1200">
+                <a:solidFill>
+                  <a:schemeClr val="tx1"/>
+                </a:solidFill>
+                <a:latin typeface="+mn-lt"/>
+                <a:ea typeface="+mn-ea"/>
+                <a:cs typeface="+mn-cs"/>
+              </a:defRPr>
+            </a:lvl7pPr>
+            <a:lvl8pPr marL="3429000" indent="-228600" algn="l" defTabSz="914400" rtl="0" eaLnBrk="1" latinLnBrk="0" hangingPunct="1">
+              <a:spcBef>
+                <a:spcPct val="20000"/>
+              </a:spcBef>
+              <a:buFont typeface="Arial" pitchFamily="34" charset="0"/>
+              <a:buChar char="•"/>
+              <a:defRPr sz="2000" kern="1200">
+                <a:solidFill>
+                  <a:schemeClr val="tx1"/>
+                </a:solidFill>
+                <a:latin typeface="+mn-lt"/>
+                <a:ea typeface="+mn-ea"/>
+                <a:cs typeface="+mn-cs"/>
+              </a:defRPr>
+            </a:lvl8pPr>
+            <a:lvl9pPr marL="3886200" indent="-228600" algn="l" defTabSz="914400" rtl="0" eaLnBrk="1" latinLnBrk="0" hangingPunct="1">
+              <a:spcBef>
+                <a:spcPct val="20000"/>
+              </a:spcBef>
+              <a:buFont typeface="Arial" pitchFamily="34" charset="0"/>
+              <a:buChar char="•"/>
+              <a:defRPr sz="2000" kern="1200">
+                <a:solidFill>
+                  <a:schemeClr val="tx1"/>
+                </a:solidFill>
+                <a:latin typeface="+mn-lt"/>
+                <a:ea typeface="+mn-ea"/>
+                <a:cs typeface="+mn-cs"/>
+              </a:defRPr>
+            </a:lvl9pPr>
+          </a:lstStyle>
+          <a:p>
+            <a:pPr marL="0" indent="0" algn="ctr">
+              <a:buFont typeface="Arial" pitchFamily="34" charset="0"/>
+              <a:buNone/>
+            </a:pPr>
+            <a:r>
+              <a:rPr lang="de-DE" dirty="0" smtClean="0"/>
+              <a:t>größere Anwendung</a:t>
+            </a:r>
+            <a:endParaRPr lang="de-DE" dirty="0"/>
+          </a:p>
+        </p:txBody>
+      </p:sp>
+      <p:sp>
+        <p:nvSpPr>
+          <p:cNvPr id="12" name="Pfeil nach links und rechts 11"/>
+          <p:cNvSpPr/>
+          <p:nvPr/>
+        </p:nvSpPr>
+        <p:spPr>
+          <a:xfrm>
+            <a:off x="3697560" y="3212976"/>
+            <a:ext cx="1800200" cy="792088"/>
+          </a:xfrm>
+          <a:prstGeom prst="leftRightArrow">
+            <a:avLst/>
+          </a:prstGeom>
+        </p:spPr>
+        <p:style>
+          <a:lnRef idx="2">
+            <a:schemeClr val="accent1">
+              <a:shade val="50000"/>
+            </a:schemeClr>
+          </a:lnRef>
+          <a:fillRef idx="1">
+            <a:schemeClr val="accent1"/>
+          </a:fillRef>
+          <a:effectRef idx="0">
+            <a:schemeClr val="accent1"/>
+          </a:effectRef>
+          <a:fontRef idx="minor">
+            <a:schemeClr val="lt1"/>
+          </a:fontRef>
+        </p:style>
+        <p:txBody>
+          <a:bodyPr rtlCol="0" anchor="ctr"/>
+          <a:lstStyle/>
+          <a:p>
+            <a:pPr algn="ctr"/>
+            <a:endParaRPr lang="de-DE"/>
+          </a:p>
+        </p:txBody>
+      </p:sp>
+      <p:sp>
+        <p:nvSpPr>
+          <p:cNvPr id="13" name="Inhaltsplatzhalter 2"/>
+          <p:cNvSpPr txBox="1">
+            <a:spLocks/>
+          </p:cNvSpPr>
+          <p:nvPr/>
+        </p:nvSpPr>
+        <p:spPr>
+          <a:xfrm>
+            <a:off x="5641776" y="3068960"/>
+            <a:ext cx="3034680" cy="1152128"/>
+          </a:xfrm>
+          <a:prstGeom prst="rect">
+            <a:avLst/>
+          </a:prstGeom>
+          <a:solidFill>
+            <a:schemeClr val="bg2"/>
+          </a:solidFill>
+        </p:spPr>
+        <p:txBody>
+          <a:bodyPr vert="horz" lIns="91440" tIns="45720" rIns="91440" bIns="45720" rtlCol="0">
+            <a:normAutofit lnSpcReduction="10000"/>
+          </a:bodyPr>
+          <a:lstStyle>
+            <a:lvl1pPr marL="342900" indent="-342900" algn="l" defTabSz="914400" rtl="0" eaLnBrk="1" latinLnBrk="0" hangingPunct="1">
+              <a:spcBef>
+                <a:spcPct val="20000"/>
+              </a:spcBef>
+              <a:buFont typeface="Arial" pitchFamily="34" charset="0"/>
+              <a:buChar char="•"/>
+              <a:defRPr sz="3200" kern="1200">
+                <a:solidFill>
+                  <a:schemeClr val="tx1"/>
+                </a:solidFill>
+                <a:latin typeface="+mn-lt"/>
+                <a:ea typeface="+mn-ea"/>
+                <a:cs typeface="+mn-cs"/>
+              </a:defRPr>
+            </a:lvl1pPr>
+            <a:lvl2pPr marL="742950" indent="-285750" algn="l" defTabSz="914400" rtl="0" eaLnBrk="1" latinLnBrk="0" hangingPunct="1">
+              <a:spcBef>
+                <a:spcPct val="20000"/>
+              </a:spcBef>
+              <a:buFont typeface="Arial" pitchFamily="34" charset="0"/>
+              <a:buChar char="–"/>
+              <a:defRPr sz="2800" kern="1200">
+                <a:solidFill>
+                  <a:schemeClr val="tx1"/>
+                </a:solidFill>
+                <a:latin typeface="+mn-lt"/>
+                <a:ea typeface="+mn-ea"/>
+                <a:cs typeface="+mn-cs"/>
+              </a:defRPr>
+            </a:lvl2pPr>
+            <a:lvl3pPr marL="1143000" indent="-228600" algn="l" defTabSz="914400" rtl="0" eaLnBrk="1" latinLnBrk="0" hangingPunct="1">
+              <a:spcBef>
+                <a:spcPct val="20000"/>
+              </a:spcBef>
+              <a:buFont typeface="Arial" pitchFamily="34" charset="0"/>
+              <a:buChar char="•"/>
+              <a:defRPr sz="2400" kern="1200">
+                <a:solidFill>
+                  <a:schemeClr val="tx1"/>
+                </a:solidFill>
+                <a:latin typeface="+mn-lt"/>
+                <a:ea typeface="+mn-ea"/>
+                <a:cs typeface="+mn-cs"/>
+              </a:defRPr>
+            </a:lvl3pPr>
+            <a:lvl4pPr marL="1600200" indent="-228600" algn="l" defTabSz="914400" rtl="0" eaLnBrk="1" latinLnBrk="0" hangingPunct="1">
+              <a:spcBef>
+                <a:spcPct val="20000"/>
+              </a:spcBef>
+              <a:buFont typeface="Arial" pitchFamily="34" charset="0"/>
+              <a:buChar char="–"/>
+              <a:defRPr sz="2000" kern="1200">
+                <a:solidFill>
+                  <a:schemeClr val="tx1"/>
+                </a:solidFill>
+                <a:latin typeface="+mn-lt"/>
+                <a:ea typeface="+mn-ea"/>
+                <a:cs typeface="+mn-cs"/>
+              </a:defRPr>
+            </a:lvl4pPr>
+            <a:lvl5pPr marL="2057400" indent="-228600" algn="l" defTabSz="914400" rtl="0" eaLnBrk="1" latinLnBrk="0" hangingPunct="1">
+              <a:spcBef>
+                <a:spcPct val="20000"/>
+              </a:spcBef>
+              <a:buFont typeface="Arial" pitchFamily="34" charset="0"/>
+              <a:buChar char="»"/>
+              <a:defRPr sz="2000" kern="1200">
+                <a:solidFill>
+                  <a:schemeClr val="tx1"/>
+                </a:solidFill>
+                <a:latin typeface="+mn-lt"/>
+                <a:ea typeface="+mn-ea"/>
+                <a:cs typeface="+mn-cs"/>
+              </a:defRPr>
+            </a:lvl5pPr>
+            <a:lvl6pPr marL="2514600" indent="-228600" algn="l" defTabSz="914400" rtl="0" eaLnBrk="1" latinLnBrk="0" hangingPunct="1">
+              <a:spcBef>
+                <a:spcPct val="20000"/>
+              </a:spcBef>
+              <a:buFont typeface="Arial" pitchFamily="34" charset="0"/>
+              <a:buChar char="•"/>
+              <a:defRPr sz="2000" kern="1200">
+                <a:solidFill>
+                  <a:schemeClr val="tx1"/>
+                </a:solidFill>
+                <a:latin typeface="+mn-lt"/>
+                <a:ea typeface="+mn-ea"/>
+                <a:cs typeface="+mn-cs"/>
+              </a:defRPr>
+            </a:lvl6pPr>
+            <a:lvl7pPr marL="2971800" indent="-228600" algn="l" defTabSz="914400" rtl="0" eaLnBrk="1" latinLnBrk="0" hangingPunct="1">
+              <a:spcBef>
+                <a:spcPct val="20000"/>
+              </a:spcBef>
+              <a:buFont typeface="Arial" pitchFamily="34" charset="0"/>
+              <a:buChar char="•"/>
+              <a:defRPr sz="2000" kern="1200">
+                <a:solidFill>
+                  <a:schemeClr val="tx1"/>
+                </a:solidFill>
+                <a:latin typeface="+mn-lt"/>
+                <a:ea typeface="+mn-ea"/>
+                <a:cs typeface="+mn-cs"/>
+              </a:defRPr>
+            </a:lvl7pPr>
+            <a:lvl8pPr marL="3429000" indent="-228600" algn="l" defTabSz="914400" rtl="0" eaLnBrk="1" latinLnBrk="0" hangingPunct="1">
+              <a:spcBef>
+                <a:spcPct val="20000"/>
+              </a:spcBef>
+              <a:buFont typeface="Arial" pitchFamily="34" charset="0"/>
+              <a:buChar char="•"/>
+              <a:defRPr sz="2000" kern="1200">
+                <a:solidFill>
+                  <a:schemeClr val="tx1"/>
+                </a:solidFill>
+                <a:latin typeface="+mn-lt"/>
+                <a:ea typeface="+mn-ea"/>
+                <a:cs typeface="+mn-cs"/>
+              </a:defRPr>
+            </a:lvl8pPr>
+            <a:lvl9pPr marL="3886200" indent="-228600" algn="l" defTabSz="914400" rtl="0" eaLnBrk="1" latinLnBrk="0" hangingPunct="1">
+              <a:spcBef>
+                <a:spcPct val="20000"/>
+              </a:spcBef>
+              <a:buFont typeface="Arial" pitchFamily="34" charset="0"/>
+              <a:buChar char="•"/>
+              <a:defRPr sz="2000" kern="1200">
+                <a:solidFill>
+                  <a:schemeClr val="tx1"/>
+                </a:solidFill>
+                <a:latin typeface="+mn-lt"/>
+                <a:ea typeface="+mn-ea"/>
+                <a:cs typeface="+mn-cs"/>
+              </a:defRPr>
+            </a:lvl9pPr>
+          </a:lstStyle>
+          <a:p>
+            <a:pPr marL="0" indent="0" algn="ctr">
+              <a:buFont typeface="Arial" pitchFamily="34" charset="0"/>
+              <a:buNone/>
+            </a:pPr>
+            <a:r>
+              <a:rPr lang="de-DE" dirty="0" smtClean="0"/>
+              <a:t>Sinnvoll</a:t>
+            </a:r>
+          </a:p>
+          <a:p>
+            <a:pPr marL="0" indent="0" algn="ctr">
+              <a:buNone/>
+            </a:pPr>
+            <a:r>
+              <a:rPr lang="de-DE" dirty="0"/>
+              <a:t>einsetzbar</a:t>
+            </a:r>
+            <a:endParaRPr lang="de-DE" dirty="0" smtClean="0"/>
+          </a:p>
+        </p:txBody>
+      </p:sp>
+      <p:sp>
+        <p:nvSpPr>
+          <p:cNvPr id="15" name="Pfeil nach links und oben 14"/>
+          <p:cNvSpPr/>
+          <p:nvPr/>
+        </p:nvSpPr>
+        <p:spPr>
+          <a:xfrm flipH="1">
+            <a:off x="1691680" y="4221088"/>
+            <a:ext cx="1152128" cy="1152128"/>
+          </a:xfrm>
+          <a:prstGeom prst="leftUpArrow">
+            <a:avLst/>
+          </a:prstGeom>
+        </p:spPr>
+        <p:style>
+          <a:lnRef idx="2">
+            <a:schemeClr val="accent1">
+              <a:shade val="50000"/>
+            </a:schemeClr>
+          </a:lnRef>
+          <a:fillRef idx="1">
+            <a:schemeClr val="accent1"/>
+          </a:fillRef>
+          <a:effectRef idx="0">
+            <a:schemeClr val="accent1"/>
+          </a:effectRef>
+          <a:fontRef idx="minor">
+            <a:schemeClr val="lt1"/>
+          </a:fontRef>
+        </p:style>
+        <p:txBody>
+          <a:bodyPr rtlCol="0" anchor="ctr"/>
+          <a:lstStyle/>
+          <a:p>
+            <a:pPr algn="ctr"/>
+            <a:endParaRPr lang="de-DE"/>
+          </a:p>
+        </p:txBody>
+      </p:sp>
+      <p:sp>
+        <p:nvSpPr>
+          <p:cNvPr id="16" name="Textfeld 15"/>
+          <p:cNvSpPr txBox="1"/>
+          <p:nvPr/>
+        </p:nvSpPr>
+        <p:spPr>
+          <a:xfrm>
+            <a:off x="3275856" y="4581128"/>
+            <a:ext cx="3960440" cy="923330"/>
+          </a:xfrm>
+          <a:prstGeom prst="rect">
+            <a:avLst/>
+          </a:prstGeom>
+          <a:noFill/>
+        </p:spPr>
+        <p:txBody>
+          <a:bodyPr wrap="square" rtlCol="0">
+            <a:spAutoFit/>
+          </a:bodyPr>
+          <a:lstStyle/>
+          <a:p>
+            <a:pPr algn="ctr"/>
+            <a:r>
+              <a:rPr lang="de-DE" dirty="0" smtClean="0"/>
+              <a:t>Möglicher Einsatz des Patterns muss/sollte bei der Analyse/Designs der Anwendung geprüft werden</a:t>
+            </a:r>
+          </a:p>
+        </p:txBody>
+      </p:sp>
+    </p:spTree>
+    <p:extLst>
+      <p:ext uri="{BB962C8B-B14F-4D97-AF65-F5344CB8AC3E}">
+        <p14:creationId xmlns:p14="http://schemas.microsoft.com/office/powerpoint/2010/main" val="1857641464"/>
+      </p:ext>
+    </p:extLst>
+  </p:cSld>
+  <p:clrMapOvr>
+    <a:masterClrMapping/>
+  </p:clrMapOvr>
+  <p:timing>
+    <p:tnLst>
+      <p:par>
+        <p:cTn id="1" dur="indefinite" restart="never" nodeType="tmRoot"/>
+      </p:par>
+    </p:tnLst>
+  </p:timing>
+</p:sld>
+</file>
+
+<file path=ppt/slides/slide16.xml><?xml version="1.0" encoding="utf-8"?>
+<p:sld xmlns:a="http://schemas.openxmlformats.org/drawingml/2006/main" xmlns:r="http://schemas.openxmlformats.org/officeDocument/2006/relationships" xmlns:p="http://schemas.openxmlformats.org/presentationml/2006/main">
+  <p:cSld>
+    <p:spTree>
+      <p:nvGrpSpPr>
+        <p:cNvPr id="1" name=""/>
+        <p:cNvGrpSpPr/>
+        <p:nvPr/>
+      </p:nvGrpSpPr>
+      <p:grpSpPr>
+        <a:xfrm>
+          <a:off x="0" y="0"/>
+          <a:ext cx="0" cy="0"/>
+          <a:chOff x="0" y="0"/>
+          <a:chExt cx="0" cy="0"/>
+        </a:xfrm>
+      </p:grpSpPr>
+      <p:sp>
+        <p:nvSpPr>
+          <p:cNvPr id="2" name="Titel 1"/>
+          <p:cNvSpPr>
+            <a:spLocks noGrp="1"/>
+          </p:cNvSpPr>
+          <p:nvPr>
+            <p:ph type="title"/>
+          </p:nvPr>
+        </p:nvSpPr>
+        <p:spPr>
+          <a:xfrm>
+            <a:off x="539552" y="1412776"/>
+            <a:ext cx="8229600" cy="936104"/>
+          </a:xfrm>
+        </p:spPr>
+        <p:txBody>
+          <a:bodyPr>
+            <a:normAutofit fontScale="90000"/>
+          </a:bodyPr>
+          <a:lstStyle/>
+          <a:p>
+            <a:r>
+              <a:rPr lang="de-DE" dirty="0" smtClean="0"/>
+              <a:t>Und jetzt können noch abschließende Fragen gestellt werden</a:t>
+            </a:r>
+            <a:endParaRPr lang="de-DE" dirty="0"/>
+          </a:p>
+        </p:txBody>
+      </p:sp>
+      <p:sp>
+        <p:nvSpPr>
+          <p:cNvPr id="4" name="Datumsplatzhalter 3"/>
+          <p:cNvSpPr>
+            <a:spLocks noGrp="1"/>
+          </p:cNvSpPr>
+          <p:nvPr>
+            <p:ph type="dt" sz="half" idx="10"/>
+          </p:nvPr>
+        </p:nvSpPr>
+        <p:spPr/>
+        <p:txBody>
+          <a:bodyPr/>
+          <a:lstStyle/>
+          <a:p>
+            <a:fld id="{93F45587-BEEE-4D54-90A9-A458946DA07D}" type="datetime1">
+              <a:rPr lang="de-DE" smtClean="0"/>
+              <a:t>16.05.2013</a:t>
+            </a:fld>
+            <a:endParaRPr lang="de-DE" dirty="0"/>
+          </a:p>
+        </p:txBody>
+      </p:sp>
+      <p:sp>
+        <p:nvSpPr>
+          <p:cNvPr id="5" name="Foliennummernplatzhalter 4"/>
+          <p:cNvSpPr>
+            <a:spLocks noGrp="1"/>
+          </p:cNvSpPr>
+          <p:nvPr>
+            <p:ph type="sldNum" sz="quarter" idx="12"/>
+          </p:nvPr>
+        </p:nvSpPr>
+        <p:spPr/>
+        <p:txBody>
+          <a:bodyPr/>
+          <a:lstStyle/>
+          <a:p>
+            <a:fld id="{6C6AE60A-B69C-4790-82F7-3882EDF23186}" type="slidenum">
+              <a:rPr lang="de-DE" smtClean="0"/>
+              <a:pPr/>
+              <a:t>16</a:t>
+            </a:fld>
+            <a:endParaRPr lang="de-DE" dirty="0"/>
+          </a:p>
+        </p:txBody>
+      </p:sp>
+      <p:sp>
+        <p:nvSpPr>
+          <p:cNvPr id="6" name="Pfeil nach rechts 5"/>
+          <p:cNvSpPr/>
+          <p:nvPr/>
+        </p:nvSpPr>
+        <p:spPr>
+          <a:xfrm rot="5400000">
+            <a:off x="4229962" y="2546902"/>
+            <a:ext cx="756084" cy="864096"/>
+          </a:xfrm>
+          <a:prstGeom prst="rightArrow">
+            <a:avLst/>
+          </a:prstGeom>
+        </p:spPr>
+        <p:style>
+          <a:lnRef idx="2">
+            <a:schemeClr val="accent1">
+              <a:shade val="50000"/>
+            </a:schemeClr>
+          </a:lnRef>
+          <a:fillRef idx="1">
+            <a:schemeClr val="accent1"/>
+          </a:fillRef>
+          <a:effectRef idx="0">
+            <a:schemeClr val="accent1"/>
+          </a:effectRef>
+          <a:fontRef idx="minor">
+            <a:schemeClr val="lt1"/>
+          </a:fontRef>
+        </p:style>
+        <p:txBody>
+          <a:bodyPr rtlCol="0" anchor="ctr"/>
+          <a:lstStyle/>
+          <a:p>
+            <a:pPr algn="ctr"/>
+            <a:endParaRPr lang="de-DE"/>
+          </a:p>
+        </p:txBody>
+      </p:sp>
+      <p:sp>
+        <p:nvSpPr>
+          <p:cNvPr id="7" name="Textfeld 6"/>
+          <p:cNvSpPr txBox="1"/>
+          <p:nvPr/>
+        </p:nvSpPr>
+        <p:spPr>
+          <a:xfrm>
+            <a:off x="2411760" y="3645024"/>
+            <a:ext cx="5184576" cy="646331"/>
+          </a:xfrm>
+          <a:prstGeom prst="rect">
+            <a:avLst/>
+          </a:prstGeom>
+          <a:noFill/>
+        </p:spPr>
+        <p:txBody>
+          <a:bodyPr wrap="square" rtlCol="0">
+            <a:spAutoFit/>
+          </a:bodyPr>
+          <a:lstStyle/>
+          <a:p>
+            <a:r>
+              <a:rPr lang="de-DE" dirty="0" smtClean="0"/>
+              <a:t>Z. B. warum ich den blauen Pfeil als </a:t>
+            </a:r>
+            <a:r>
+              <a:rPr lang="de-DE" dirty="0" err="1" smtClean="0"/>
+              <a:t>Autoform</a:t>
+            </a:r>
+            <a:r>
+              <a:rPr lang="de-DE" dirty="0" smtClean="0"/>
+              <a:t> in </a:t>
+            </a:r>
+            <a:r>
+              <a:rPr lang="de-DE" dirty="0" err="1" smtClean="0"/>
+              <a:t>Powerpoint</a:t>
+            </a:r>
+            <a:r>
+              <a:rPr lang="de-DE" dirty="0" smtClean="0"/>
+              <a:t> so gerne mag</a:t>
+            </a:r>
+            <a:endParaRPr lang="de-DE" dirty="0"/>
+          </a:p>
+        </p:txBody>
+      </p:sp>
+      <p:sp>
+        <p:nvSpPr>
+          <p:cNvPr id="8" name="Smiley 7"/>
+          <p:cNvSpPr/>
+          <p:nvPr/>
+        </p:nvSpPr>
+        <p:spPr>
+          <a:xfrm>
+            <a:off x="3419872" y="4365104"/>
+            <a:ext cx="2520280" cy="2016224"/>
+          </a:xfrm>
+          <a:prstGeom prst="smileyFace">
+            <a:avLst/>
+          </a:prstGeom>
+          <a:noFill/>
+        </p:spPr>
+        <p:style>
+          <a:lnRef idx="2">
+            <a:schemeClr val="accent1">
+              <a:shade val="50000"/>
+            </a:schemeClr>
+          </a:lnRef>
+          <a:fillRef idx="1">
+            <a:schemeClr val="accent1"/>
+          </a:fillRef>
+          <a:effectRef idx="0">
+            <a:schemeClr val="accent1"/>
+          </a:effectRef>
+          <a:fontRef idx="minor">
+            <a:schemeClr val="lt1"/>
+          </a:fontRef>
+        </p:style>
+        <p:txBody>
+          <a:bodyPr rtlCol="0" anchor="ctr"/>
+          <a:lstStyle/>
+          <a:p>
+            <a:pPr algn="ctr"/>
+            <a:endParaRPr lang="de-DE"/>
+          </a:p>
+        </p:txBody>
+      </p:sp>
+    </p:spTree>
+    <p:extLst>
+      <p:ext uri="{BB962C8B-B14F-4D97-AF65-F5344CB8AC3E}">
+        <p14:creationId xmlns:p14="http://schemas.microsoft.com/office/powerpoint/2010/main" val="3431068376"/>
+      </p:ext>
+    </p:extLst>
+  </p:cSld>
+  <p:clrMapOvr>
+    <a:masterClrMapping/>
+  </p:clrMapOvr>
+  <p:timing>
+    <p:tnLst>
+      <p:par>
+        <p:cTn id="1" dur="indefinite" restart="never" nodeType="tmRoot"/>
+      </p:par>
+    </p:tnLst>
+  </p:timing>
+</p:sld>
+</file>
+
 <file path=ppt/slides/slide2.xml><?xml version="1.0" encoding="utf-8"?>
 <p:sld xmlns:a="http://schemas.openxmlformats.org/drawingml/2006/main" xmlns:r="http://schemas.openxmlformats.org/officeDocument/2006/relationships" xmlns:p="http://schemas.openxmlformats.org/presentationml/2006/main">
   <p:cSld>
@@ -3742,7 +5943,7 @@
           <a:p>
             <a:fld id="{5744CE70-91A6-4E2F-AA21-F9B5F6BBF251}" type="datetime1">
               <a:rPr lang="de-DE" smtClean="0"/>
-              <a:t>03.05.2013</a:t>
+              <a:t>16.05.2013</a:t>
             </a:fld>
             <a:endParaRPr lang="de-DE" dirty="0"/>
           </a:p>
@@ -3824,31 +6025,31 @@
           <a:bodyPr/>
           <a:lstStyle/>
           <a:p>
+            <a:endParaRPr lang="de-DE" dirty="0"/>
+          </a:p>
+        </p:txBody>
+      </p:sp>
+      <p:sp>
+        <p:nvSpPr>
+          <p:cNvPr id="3" name="Inhaltsplatzhalter 2"/>
+          <p:cNvSpPr>
+            <a:spLocks noGrp="1"/>
+          </p:cNvSpPr>
+          <p:nvPr>
+            <p:ph idx="1"/>
+          </p:nvPr>
+        </p:nvSpPr>
+        <p:spPr/>
+        <p:txBody>
+          <a:bodyPr/>
+          <a:lstStyle/>
+          <a:p>
             <a:endParaRPr lang="de-DE"/>
           </a:p>
         </p:txBody>
       </p:sp>
       <p:sp>
         <p:nvSpPr>
-          <p:cNvPr id="3" name="Inhaltsplatzhalter 2"/>
-          <p:cNvSpPr>
-            <a:spLocks noGrp="1"/>
-          </p:cNvSpPr>
-          <p:nvPr>
-            <p:ph idx="1"/>
-          </p:nvPr>
-        </p:nvSpPr>
-        <p:spPr/>
-        <p:txBody>
-          <a:bodyPr/>
-          <a:lstStyle/>
-          <a:p>
-            <a:endParaRPr lang="de-DE"/>
-          </a:p>
-        </p:txBody>
-      </p:sp>
-      <p:sp>
-        <p:nvSpPr>
           <p:cNvPr id="4" name="Datumsplatzhalter 3"/>
           <p:cNvSpPr>
             <a:spLocks noGrp="1"/>
@@ -3864,7 +6065,7 @@
           <a:p>
             <a:fld id="{93F45587-BEEE-4D54-90A9-A458946DA07D}" type="datetime1">
               <a:rPr lang="de-DE" smtClean="0"/>
-              <a:t>03.05.2013</a:t>
+              <a:t>16.05.2013</a:t>
             </a:fld>
             <a:endParaRPr lang="de-DE" dirty="0"/>
           </a:p>
@@ -3898,6 +6099,991 @@
     <p:extLst>
       <p:ext uri="{BB962C8B-B14F-4D97-AF65-F5344CB8AC3E}">
         <p14:creationId xmlns:p14="http://schemas.microsoft.com/office/powerpoint/2010/main" val="2164761318"/>
+      </p:ext>
+    </p:extLst>
+  </p:cSld>
+  <p:clrMapOvr>
+    <a:masterClrMapping/>
+  </p:clrMapOvr>
+  <p:timing>
+    <p:tnLst>
+      <p:par>
+        <p:cTn id="1" dur="indefinite" restart="never" nodeType="tmRoot"/>
+      </p:par>
+    </p:tnLst>
+  </p:timing>
+</p:sld>
+</file>
+
+<file path=ppt/slides/slide4.xml><?xml version="1.0" encoding="utf-8"?>
+<p:sld xmlns:a="http://schemas.openxmlformats.org/drawingml/2006/main" xmlns:r="http://schemas.openxmlformats.org/officeDocument/2006/relationships" xmlns:p="http://schemas.openxmlformats.org/presentationml/2006/main">
+  <p:cSld>
+    <p:spTree>
+      <p:nvGrpSpPr>
+        <p:cNvPr id="1" name=""/>
+        <p:cNvGrpSpPr/>
+        <p:nvPr/>
+      </p:nvGrpSpPr>
+      <p:grpSpPr>
+        <a:xfrm>
+          <a:off x="0" y="0"/>
+          <a:ext cx="0" cy="0"/>
+          <a:chOff x="0" y="0"/>
+          <a:chExt cx="0" cy="0"/>
+        </a:xfrm>
+      </p:grpSpPr>
+      <p:sp>
+        <p:nvSpPr>
+          <p:cNvPr id="2" name="Titel 1"/>
+          <p:cNvSpPr>
+            <a:spLocks noGrp="1"/>
+          </p:cNvSpPr>
+          <p:nvPr>
+            <p:ph type="ctrTitle"/>
+          </p:nvPr>
+        </p:nvSpPr>
+        <p:spPr/>
+        <p:txBody>
+          <a:bodyPr/>
+          <a:lstStyle/>
+          <a:p>
+            <a:r>
+              <a:rPr lang="de-DE" dirty="0" smtClean="0"/>
+              <a:t>Model-View-</a:t>
+            </a:r>
+            <a:r>
+              <a:rPr lang="de-DE" dirty="0" err="1" smtClean="0"/>
+              <a:t>Presenter</a:t>
+            </a:r>
+            <a:endParaRPr lang="de-DE" dirty="0"/>
+          </a:p>
+        </p:txBody>
+      </p:sp>
+    </p:spTree>
+    <p:extLst>
+      <p:ext uri="{BB962C8B-B14F-4D97-AF65-F5344CB8AC3E}">
+        <p14:creationId xmlns:p14="http://schemas.microsoft.com/office/powerpoint/2010/main" val="2618379560"/>
+      </p:ext>
+    </p:extLst>
+  </p:cSld>
+  <p:clrMapOvr>
+    <a:masterClrMapping/>
+  </p:clrMapOvr>
+  <p:timing>
+    <p:tnLst>
+      <p:par>
+        <p:cTn id="1" dur="indefinite" restart="never" nodeType="tmRoot"/>
+      </p:par>
+    </p:tnLst>
+  </p:timing>
+</p:sld>
+</file>
+
+<file path=ppt/slides/slide5.xml><?xml version="1.0" encoding="utf-8"?>
+<p:sld xmlns:a="http://schemas.openxmlformats.org/drawingml/2006/main" xmlns:r="http://schemas.openxmlformats.org/officeDocument/2006/relationships" xmlns:p="http://schemas.openxmlformats.org/presentationml/2006/main">
+  <p:cSld>
+    <p:spTree>
+      <p:nvGrpSpPr>
+        <p:cNvPr id="1" name=""/>
+        <p:cNvGrpSpPr/>
+        <p:nvPr/>
+      </p:nvGrpSpPr>
+      <p:grpSpPr>
+        <a:xfrm>
+          <a:off x="0" y="0"/>
+          <a:ext cx="0" cy="0"/>
+          <a:chOff x="0" y="0"/>
+          <a:chExt cx="0" cy="0"/>
+        </a:xfrm>
+      </p:grpSpPr>
+      <p:sp>
+        <p:nvSpPr>
+          <p:cNvPr id="2" name="Titel 1"/>
+          <p:cNvSpPr>
+            <a:spLocks noGrp="1"/>
+          </p:cNvSpPr>
+          <p:nvPr>
+            <p:ph type="title"/>
+          </p:nvPr>
+        </p:nvSpPr>
+        <p:spPr/>
+        <p:txBody>
+          <a:bodyPr/>
+          <a:lstStyle/>
+          <a:p>
+            <a:r>
+              <a:rPr lang="de-DE" dirty="0" smtClean="0"/>
+              <a:t>Übersicht</a:t>
+            </a:r>
+            <a:endParaRPr lang="de-DE" dirty="0"/>
+          </a:p>
+        </p:txBody>
+      </p:sp>
+      <p:sp>
+        <p:nvSpPr>
+          <p:cNvPr id="3" name="Inhaltsplatzhalter 2"/>
+          <p:cNvSpPr>
+            <a:spLocks noGrp="1"/>
+          </p:cNvSpPr>
+          <p:nvPr>
+            <p:ph idx="1"/>
+          </p:nvPr>
+        </p:nvSpPr>
+        <p:spPr/>
+        <p:txBody>
+          <a:bodyPr/>
+          <a:lstStyle/>
+          <a:p>
+            <a:r>
+              <a:rPr lang="de-DE" dirty="0" smtClean="0"/>
+              <a:t>Einführung</a:t>
+            </a:r>
+          </a:p>
+          <a:p>
+            <a:r>
+              <a:rPr lang="de-DE" dirty="0" smtClean="0"/>
+              <a:t>Aufbau einer MVP-Anwendung</a:t>
+            </a:r>
+          </a:p>
+          <a:p>
+            <a:r>
+              <a:rPr lang="de-DE" dirty="0" smtClean="0"/>
+              <a:t>Konkrete Problemstellung</a:t>
+            </a:r>
+          </a:p>
+          <a:p>
+            <a:r>
+              <a:rPr lang="de-DE" dirty="0" smtClean="0"/>
+              <a:t>Mögliche Lösung</a:t>
+            </a:r>
+          </a:p>
+          <a:p>
+            <a:r>
+              <a:rPr lang="de-DE" dirty="0" smtClean="0"/>
+              <a:t>Fazit (inkl. Vor-/Nachteile)</a:t>
+            </a:r>
+          </a:p>
+          <a:p>
+            <a:endParaRPr lang="de-DE" dirty="0"/>
+          </a:p>
+        </p:txBody>
+      </p:sp>
+      <p:sp>
+        <p:nvSpPr>
+          <p:cNvPr id="4" name="Datumsplatzhalter 3"/>
+          <p:cNvSpPr>
+            <a:spLocks noGrp="1"/>
+          </p:cNvSpPr>
+          <p:nvPr>
+            <p:ph type="dt" sz="half" idx="10"/>
+          </p:nvPr>
+        </p:nvSpPr>
+        <p:spPr/>
+        <p:txBody>
+          <a:bodyPr/>
+          <a:lstStyle/>
+          <a:p>
+            <a:fld id="{93F45587-BEEE-4D54-90A9-A458946DA07D}" type="datetime1">
+              <a:rPr lang="de-DE" smtClean="0"/>
+              <a:t>16.05.2013</a:t>
+            </a:fld>
+            <a:endParaRPr lang="de-DE" dirty="0"/>
+          </a:p>
+        </p:txBody>
+      </p:sp>
+      <p:sp>
+        <p:nvSpPr>
+          <p:cNvPr id="5" name="Foliennummernplatzhalter 4"/>
+          <p:cNvSpPr>
+            <a:spLocks noGrp="1"/>
+          </p:cNvSpPr>
+          <p:nvPr>
+            <p:ph type="sldNum" sz="quarter" idx="12"/>
+          </p:nvPr>
+        </p:nvSpPr>
+        <p:spPr/>
+        <p:txBody>
+          <a:bodyPr/>
+          <a:lstStyle/>
+          <a:p>
+            <a:fld id="{6C6AE60A-B69C-4790-82F7-3882EDF23186}" type="slidenum">
+              <a:rPr lang="de-DE" smtClean="0"/>
+              <a:pPr/>
+              <a:t>5</a:t>
+            </a:fld>
+            <a:endParaRPr lang="de-DE" dirty="0"/>
+          </a:p>
+        </p:txBody>
+      </p:sp>
+    </p:spTree>
+    <p:extLst>
+      <p:ext uri="{BB962C8B-B14F-4D97-AF65-F5344CB8AC3E}">
+        <p14:creationId xmlns:p14="http://schemas.microsoft.com/office/powerpoint/2010/main" val="1278289276"/>
+      </p:ext>
+    </p:extLst>
+  </p:cSld>
+  <p:clrMapOvr>
+    <a:masterClrMapping/>
+  </p:clrMapOvr>
+  <p:timing>
+    <p:tnLst>
+      <p:par>
+        <p:cTn id="1" dur="indefinite" restart="never" nodeType="tmRoot"/>
+      </p:par>
+    </p:tnLst>
+  </p:timing>
+</p:sld>
+</file>
+
+<file path=ppt/slides/slide6.xml><?xml version="1.0" encoding="utf-8"?>
+<p:sld xmlns:a="http://schemas.openxmlformats.org/drawingml/2006/main" xmlns:r="http://schemas.openxmlformats.org/officeDocument/2006/relationships" xmlns:p="http://schemas.openxmlformats.org/presentationml/2006/main">
+  <p:cSld>
+    <p:spTree>
+      <p:nvGrpSpPr>
+        <p:cNvPr id="1" name=""/>
+        <p:cNvGrpSpPr/>
+        <p:nvPr/>
+      </p:nvGrpSpPr>
+      <p:grpSpPr>
+        <a:xfrm>
+          <a:off x="0" y="0"/>
+          <a:ext cx="0" cy="0"/>
+          <a:chOff x="0" y="0"/>
+          <a:chExt cx="0" cy="0"/>
+        </a:xfrm>
+      </p:grpSpPr>
+      <p:sp>
+        <p:nvSpPr>
+          <p:cNvPr id="2" name="Titel 1"/>
+          <p:cNvSpPr>
+            <a:spLocks noGrp="1"/>
+          </p:cNvSpPr>
+          <p:nvPr>
+            <p:ph type="title"/>
+          </p:nvPr>
+        </p:nvSpPr>
+        <p:spPr/>
+        <p:txBody>
+          <a:bodyPr/>
+          <a:lstStyle/>
+          <a:p>
+            <a:r>
+              <a:rPr lang="de-DE" dirty="0" smtClean="0"/>
+              <a:t>Was ist Model-View-</a:t>
+            </a:r>
+            <a:r>
+              <a:rPr lang="de-DE" dirty="0" err="1" smtClean="0"/>
+              <a:t>Presenter</a:t>
+            </a:r>
+            <a:r>
+              <a:rPr lang="de-DE" dirty="0" smtClean="0"/>
+              <a:t>?</a:t>
+            </a:r>
+            <a:endParaRPr lang="de-DE" dirty="0"/>
+          </a:p>
+        </p:txBody>
+      </p:sp>
+      <p:sp>
+        <p:nvSpPr>
+          <p:cNvPr id="3" name="Inhaltsplatzhalter 2"/>
+          <p:cNvSpPr>
+            <a:spLocks noGrp="1"/>
+          </p:cNvSpPr>
+          <p:nvPr>
+            <p:ph idx="1"/>
+          </p:nvPr>
+        </p:nvSpPr>
+        <p:spPr/>
+        <p:txBody>
+          <a:bodyPr/>
+          <a:lstStyle/>
+          <a:p>
+            <a:r>
+              <a:rPr lang="de-DE" dirty="0" smtClean="0"/>
+              <a:t>Von </a:t>
+            </a:r>
+            <a:r>
+              <a:rPr lang="de-DE" dirty="0" err="1" smtClean="0"/>
+              <a:t>Taligant</a:t>
+            </a:r>
+            <a:r>
+              <a:rPr lang="de-DE" dirty="0" smtClean="0"/>
+              <a:t> und IBM entwickelt</a:t>
+            </a:r>
+          </a:p>
+          <a:p>
+            <a:r>
+              <a:rPr lang="de-DE" dirty="0" smtClean="0"/>
+              <a:t>Weiterentwicklung von MVC</a:t>
+            </a:r>
+          </a:p>
+          <a:p>
+            <a:r>
+              <a:rPr lang="de-DE" dirty="0" smtClean="0"/>
+              <a:t>Keine genaue Definition</a:t>
+            </a:r>
+          </a:p>
+          <a:p>
+            <a:endParaRPr lang="de-DE" dirty="0" smtClean="0"/>
+          </a:p>
+          <a:p>
+            <a:endParaRPr lang="de-DE" dirty="0"/>
+          </a:p>
+        </p:txBody>
+      </p:sp>
+      <p:sp>
+        <p:nvSpPr>
+          <p:cNvPr id="4" name="Datumsplatzhalter 3"/>
+          <p:cNvSpPr>
+            <a:spLocks noGrp="1"/>
+          </p:cNvSpPr>
+          <p:nvPr>
+            <p:ph type="dt" sz="half" idx="10"/>
+          </p:nvPr>
+        </p:nvSpPr>
+        <p:spPr/>
+        <p:txBody>
+          <a:bodyPr/>
+          <a:lstStyle/>
+          <a:p>
+            <a:fld id="{93F45587-BEEE-4D54-90A9-A458946DA07D}" type="datetime1">
+              <a:rPr lang="de-DE" smtClean="0"/>
+              <a:t>16.05.2013</a:t>
+            </a:fld>
+            <a:endParaRPr lang="de-DE" dirty="0"/>
+          </a:p>
+        </p:txBody>
+      </p:sp>
+      <p:sp>
+        <p:nvSpPr>
+          <p:cNvPr id="5" name="Foliennummernplatzhalter 4"/>
+          <p:cNvSpPr>
+            <a:spLocks noGrp="1"/>
+          </p:cNvSpPr>
+          <p:nvPr>
+            <p:ph type="sldNum" sz="quarter" idx="12"/>
+          </p:nvPr>
+        </p:nvSpPr>
+        <p:spPr/>
+        <p:txBody>
+          <a:bodyPr/>
+          <a:lstStyle/>
+          <a:p>
+            <a:fld id="{6C6AE60A-B69C-4790-82F7-3882EDF23186}" type="slidenum">
+              <a:rPr lang="de-DE" smtClean="0"/>
+              <a:pPr/>
+              <a:t>6</a:t>
+            </a:fld>
+            <a:endParaRPr lang="de-DE" dirty="0"/>
+          </a:p>
+        </p:txBody>
+      </p:sp>
+    </p:spTree>
+    <p:extLst>
+      <p:ext uri="{BB962C8B-B14F-4D97-AF65-F5344CB8AC3E}">
+        <p14:creationId xmlns:p14="http://schemas.microsoft.com/office/powerpoint/2010/main" val="1220430910"/>
+      </p:ext>
+    </p:extLst>
+  </p:cSld>
+  <p:clrMapOvr>
+    <a:masterClrMapping/>
+  </p:clrMapOvr>
+  <p:timing>
+    <p:tnLst>
+      <p:par>
+        <p:cTn id="1" dur="indefinite" restart="never" nodeType="tmRoot"/>
+      </p:par>
+    </p:tnLst>
+  </p:timing>
+</p:sld>
+</file>
+
+<file path=ppt/slides/slide7.xml><?xml version="1.0" encoding="utf-8"?>
+<p:sld xmlns:a="http://schemas.openxmlformats.org/drawingml/2006/main" xmlns:r="http://schemas.openxmlformats.org/officeDocument/2006/relationships" xmlns:p="http://schemas.openxmlformats.org/presentationml/2006/main">
+  <p:cSld>
+    <p:spTree>
+      <p:nvGrpSpPr>
+        <p:cNvPr id="1" name=""/>
+        <p:cNvGrpSpPr/>
+        <p:nvPr/>
+      </p:nvGrpSpPr>
+      <p:grpSpPr>
+        <a:xfrm>
+          <a:off x="0" y="0"/>
+          <a:ext cx="0" cy="0"/>
+          <a:chOff x="0" y="0"/>
+          <a:chExt cx="0" cy="0"/>
+        </a:xfrm>
+      </p:grpSpPr>
+      <p:sp>
+        <p:nvSpPr>
+          <p:cNvPr id="2" name="Titel 1"/>
+          <p:cNvSpPr>
+            <a:spLocks noGrp="1"/>
+          </p:cNvSpPr>
+          <p:nvPr>
+            <p:ph type="title"/>
+          </p:nvPr>
+        </p:nvSpPr>
+        <p:spPr>
+          <a:xfrm>
+            <a:off x="457200" y="764704"/>
+            <a:ext cx="8229600" cy="936104"/>
+          </a:xfrm>
+        </p:spPr>
+        <p:txBody>
+          <a:bodyPr/>
+          <a:lstStyle/>
+          <a:p>
+            <a:r>
+              <a:rPr lang="de-DE" dirty="0" smtClean="0"/>
+              <a:t>Unterschiede zu MVC</a:t>
+            </a:r>
+            <a:endParaRPr lang="de-DE" dirty="0"/>
+          </a:p>
+        </p:txBody>
+      </p:sp>
+      <p:sp>
+        <p:nvSpPr>
+          <p:cNvPr id="3" name="Inhaltsplatzhalter 2"/>
+          <p:cNvSpPr>
+            <a:spLocks noGrp="1"/>
+          </p:cNvSpPr>
+          <p:nvPr>
+            <p:ph idx="1"/>
+          </p:nvPr>
+        </p:nvSpPr>
+        <p:spPr/>
+        <p:txBody>
+          <a:bodyPr/>
+          <a:lstStyle/>
+          <a:p>
+            <a:r>
+              <a:rPr lang="de-DE" dirty="0" smtClean="0"/>
+              <a:t>Der </a:t>
+            </a:r>
+            <a:r>
+              <a:rPr lang="de-DE" dirty="0" err="1" smtClean="0"/>
+              <a:t>Presenter</a:t>
+            </a:r>
+            <a:r>
+              <a:rPr lang="de-DE" dirty="0" smtClean="0"/>
+              <a:t> ist einziges Bindeglied von Model und View -&gt;  View kennt Model nicht</a:t>
+            </a:r>
+          </a:p>
+          <a:p>
+            <a:pPr marL="0" indent="0">
+              <a:buNone/>
+            </a:pPr>
+            <a:endParaRPr lang="de-DE" dirty="0"/>
+          </a:p>
+        </p:txBody>
+      </p:sp>
+      <p:sp>
+        <p:nvSpPr>
+          <p:cNvPr id="4" name="Datumsplatzhalter 3"/>
+          <p:cNvSpPr>
+            <a:spLocks noGrp="1"/>
+          </p:cNvSpPr>
+          <p:nvPr>
+            <p:ph type="dt" sz="half" idx="10"/>
+          </p:nvPr>
+        </p:nvSpPr>
+        <p:spPr/>
+        <p:txBody>
+          <a:bodyPr/>
+          <a:lstStyle/>
+          <a:p>
+            <a:fld id="{93F45587-BEEE-4D54-90A9-A458946DA07D}" type="datetime1">
+              <a:rPr lang="de-DE" smtClean="0"/>
+              <a:t>16.05.2013</a:t>
+            </a:fld>
+            <a:endParaRPr lang="de-DE" dirty="0"/>
+          </a:p>
+        </p:txBody>
+      </p:sp>
+      <p:sp>
+        <p:nvSpPr>
+          <p:cNvPr id="5" name="Foliennummernplatzhalter 4"/>
+          <p:cNvSpPr>
+            <a:spLocks noGrp="1"/>
+          </p:cNvSpPr>
+          <p:nvPr>
+            <p:ph type="sldNum" sz="quarter" idx="12"/>
+          </p:nvPr>
+        </p:nvSpPr>
+        <p:spPr/>
+        <p:txBody>
+          <a:bodyPr/>
+          <a:lstStyle/>
+          <a:p>
+            <a:fld id="{6C6AE60A-B69C-4790-82F7-3882EDF23186}" type="slidenum">
+              <a:rPr lang="de-DE" smtClean="0"/>
+              <a:pPr/>
+              <a:t>7</a:t>
+            </a:fld>
+            <a:endParaRPr lang="de-DE" dirty="0"/>
+          </a:p>
+        </p:txBody>
+      </p:sp>
+      <p:pic>
+        <p:nvPicPr>
+          <p:cNvPr id="1026" name="Picture 2" descr="C:\Design-Pattern-MVC\ausarbeitung_latex\figure\MVP\MVP_Explanation.png"/>
+          <p:cNvPicPr>
+            <a:picLocks noChangeAspect="1" noChangeArrowheads="1"/>
+          </p:cNvPicPr>
+          <p:nvPr/>
+        </p:nvPicPr>
+        <p:blipFill>
+          <a:blip r:embed="rId2">
+            <a:extLst>
+              <a:ext uri="{28A0092B-C50C-407E-A947-70E740481C1C}">
+                <a14:useLocalDpi xmlns:a14="http://schemas.microsoft.com/office/drawing/2010/main" val="0"/>
+              </a:ext>
+            </a:extLst>
+          </a:blip>
+          <a:srcRect/>
+          <a:stretch>
+            <a:fillRect/>
+          </a:stretch>
+        </p:blipFill>
+        <p:spPr bwMode="auto">
+          <a:xfrm>
+            <a:off x="2627784" y="3270437"/>
+            <a:ext cx="3810532" cy="2962689"/>
+          </a:xfrm>
+          <a:prstGeom prst="rect">
+            <a:avLst/>
+          </a:prstGeom>
+          <a:noFill/>
+          <a:extLst>
+            <a:ext uri="{909E8E84-426E-40DD-AFC4-6F175D3DCCD1}">
+              <a14:hiddenFill xmlns:a14="http://schemas.microsoft.com/office/drawing/2010/main">
+                <a:solidFill>
+                  <a:srgbClr val="FFFFFF"/>
+                </a:solidFill>
+              </a14:hiddenFill>
+            </a:ext>
+          </a:extLst>
+        </p:spPr>
+      </p:pic>
+    </p:spTree>
+    <p:extLst>
+      <p:ext uri="{BB962C8B-B14F-4D97-AF65-F5344CB8AC3E}">
+        <p14:creationId xmlns:p14="http://schemas.microsoft.com/office/powerpoint/2010/main" val="3934068056"/>
+      </p:ext>
+    </p:extLst>
+  </p:cSld>
+  <p:clrMapOvr>
+    <a:masterClrMapping/>
+  </p:clrMapOvr>
+  <p:timing>
+    <p:tnLst>
+      <p:par>
+        <p:cTn id="1" dur="indefinite" restart="never" nodeType="tmRoot"/>
+      </p:par>
+    </p:tnLst>
+  </p:timing>
+</p:sld>
+</file>
+
+<file path=ppt/slides/slide8.xml><?xml version="1.0" encoding="utf-8"?>
+<p:sld xmlns:a="http://schemas.openxmlformats.org/drawingml/2006/main" xmlns:r="http://schemas.openxmlformats.org/officeDocument/2006/relationships" xmlns:p="http://schemas.openxmlformats.org/presentationml/2006/main">
+  <p:cSld>
+    <p:spTree>
+      <p:nvGrpSpPr>
+        <p:cNvPr id="1" name=""/>
+        <p:cNvGrpSpPr/>
+        <p:nvPr/>
+      </p:nvGrpSpPr>
+      <p:grpSpPr>
+        <a:xfrm>
+          <a:off x="0" y="0"/>
+          <a:ext cx="0" cy="0"/>
+          <a:chOff x="0" y="0"/>
+          <a:chExt cx="0" cy="0"/>
+        </a:xfrm>
+      </p:grpSpPr>
+      <p:sp>
+        <p:nvSpPr>
+          <p:cNvPr id="2" name="Titel 1"/>
+          <p:cNvSpPr>
+            <a:spLocks noGrp="1"/>
+          </p:cNvSpPr>
+          <p:nvPr>
+            <p:ph type="title"/>
+          </p:nvPr>
+        </p:nvSpPr>
+        <p:spPr>
+          <a:xfrm>
+            <a:off x="457200" y="764704"/>
+            <a:ext cx="8229600" cy="936104"/>
+          </a:xfrm>
+        </p:spPr>
+        <p:txBody>
+          <a:bodyPr/>
+          <a:lstStyle/>
+          <a:p>
+            <a:r>
+              <a:rPr lang="de-DE" dirty="0" smtClean="0"/>
+              <a:t>Au</a:t>
+            </a:r>
+            <a:r>
+              <a:rPr lang="de-DE" b="1" dirty="0" smtClean="0"/>
+              <a:t>f</a:t>
+            </a:r>
+            <a:r>
+              <a:rPr lang="de-DE" dirty="0" smtClean="0"/>
+              <a:t>gabe: Model</a:t>
+            </a:r>
+            <a:endParaRPr lang="de-DE" dirty="0"/>
+          </a:p>
+        </p:txBody>
+      </p:sp>
+      <p:sp>
+        <p:nvSpPr>
+          <p:cNvPr id="3" name="Inhaltsplatzhalter 2"/>
+          <p:cNvSpPr>
+            <a:spLocks noGrp="1"/>
+          </p:cNvSpPr>
+          <p:nvPr>
+            <p:ph idx="1"/>
+          </p:nvPr>
+        </p:nvSpPr>
+        <p:spPr/>
+        <p:txBody>
+          <a:bodyPr/>
+          <a:lstStyle/>
+          <a:p>
+            <a:r>
+              <a:rPr lang="de-DE" dirty="0" smtClean="0"/>
+              <a:t>Bereitstellung von Daten</a:t>
+            </a:r>
+          </a:p>
+          <a:p>
+            <a:r>
+              <a:rPr lang="de-DE" dirty="0" smtClean="0"/>
+              <a:t>Schnittstelle(n) für Datenzugriff</a:t>
+            </a:r>
+          </a:p>
+          <a:p>
+            <a:r>
+              <a:rPr lang="de-DE" dirty="0" smtClean="0"/>
+              <a:t>Das Model kann auch nur Proxy auf die Daten sein</a:t>
+            </a:r>
+          </a:p>
+          <a:p>
+            <a:r>
+              <a:rPr lang="de-DE" dirty="0" smtClean="0"/>
+              <a:t>Kapselung der Daten</a:t>
+            </a:r>
+          </a:p>
+          <a:p>
+            <a:pPr marL="0" indent="0">
+              <a:buNone/>
+            </a:pPr>
+            <a:endParaRPr lang="de-DE" dirty="0"/>
+          </a:p>
+        </p:txBody>
+      </p:sp>
+      <p:sp>
+        <p:nvSpPr>
+          <p:cNvPr id="4" name="Datumsplatzhalter 3"/>
+          <p:cNvSpPr>
+            <a:spLocks noGrp="1"/>
+          </p:cNvSpPr>
+          <p:nvPr>
+            <p:ph type="dt" sz="half" idx="10"/>
+          </p:nvPr>
+        </p:nvSpPr>
+        <p:spPr/>
+        <p:txBody>
+          <a:bodyPr/>
+          <a:lstStyle/>
+          <a:p>
+            <a:fld id="{93F45587-BEEE-4D54-90A9-A458946DA07D}" type="datetime1">
+              <a:rPr lang="de-DE" smtClean="0"/>
+              <a:t>16.05.2013</a:t>
+            </a:fld>
+            <a:endParaRPr lang="de-DE" dirty="0"/>
+          </a:p>
+        </p:txBody>
+      </p:sp>
+      <p:sp>
+        <p:nvSpPr>
+          <p:cNvPr id="5" name="Foliennummernplatzhalter 4"/>
+          <p:cNvSpPr>
+            <a:spLocks noGrp="1"/>
+          </p:cNvSpPr>
+          <p:nvPr>
+            <p:ph type="sldNum" sz="quarter" idx="12"/>
+          </p:nvPr>
+        </p:nvSpPr>
+        <p:spPr/>
+        <p:txBody>
+          <a:bodyPr/>
+          <a:lstStyle/>
+          <a:p>
+            <a:fld id="{6C6AE60A-B69C-4790-82F7-3882EDF23186}" type="slidenum">
+              <a:rPr lang="de-DE" smtClean="0"/>
+              <a:pPr/>
+              <a:t>8</a:t>
+            </a:fld>
+            <a:endParaRPr lang="de-DE" dirty="0"/>
+          </a:p>
+        </p:txBody>
+      </p:sp>
+    </p:spTree>
+    <p:extLst>
+      <p:ext uri="{BB962C8B-B14F-4D97-AF65-F5344CB8AC3E}">
+        <p14:creationId xmlns:p14="http://schemas.microsoft.com/office/powerpoint/2010/main" val="2684987595"/>
+      </p:ext>
+    </p:extLst>
+  </p:cSld>
+  <p:clrMapOvr>
+    <a:masterClrMapping/>
+  </p:clrMapOvr>
+  <p:timing>
+    <p:tnLst>
+      <p:par>
+        <p:cTn id="1" dur="indefinite" restart="never" nodeType="tmRoot"/>
+      </p:par>
+    </p:tnLst>
+  </p:timing>
+</p:sld>
+</file>
+
+<file path=ppt/slides/slide9.xml><?xml version="1.0" encoding="utf-8"?>
+<p:sld xmlns:a="http://schemas.openxmlformats.org/drawingml/2006/main" xmlns:r="http://schemas.openxmlformats.org/officeDocument/2006/relationships" xmlns:p="http://schemas.openxmlformats.org/presentationml/2006/main">
+  <p:cSld>
+    <p:spTree>
+      <p:nvGrpSpPr>
+        <p:cNvPr id="1" name=""/>
+        <p:cNvGrpSpPr/>
+        <p:nvPr/>
+      </p:nvGrpSpPr>
+      <p:grpSpPr>
+        <a:xfrm>
+          <a:off x="0" y="0"/>
+          <a:ext cx="0" cy="0"/>
+          <a:chOff x="0" y="0"/>
+          <a:chExt cx="0" cy="0"/>
+        </a:xfrm>
+      </p:grpSpPr>
+      <p:sp>
+        <p:nvSpPr>
+          <p:cNvPr id="2" name="Titel 1"/>
+          <p:cNvSpPr>
+            <a:spLocks noGrp="1"/>
+          </p:cNvSpPr>
+          <p:nvPr>
+            <p:ph type="title"/>
+          </p:nvPr>
+        </p:nvSpPr>
+        <p:spPr>
+          <a:xfrm>
+            <a:off x="457200" y="764704"/>
+            <a:ext cx="8229600" cy="936104"/>
+          </a:xfrm>
+        </p:spPr>
+        <p:txBody>
+          <a:bodyPr/>
+          <a:lstStyle/>
+          <a:p>
+            <a:r>
+              <a:rPr lang="de-DE" dirty="0" smtClean="0"/>
+              <a:t>Aufgabe: Der </a:t>
+            </a:r>
+            <a:r>
+              <a:rPr lang="de-DE" dirty="0" err="1" smtClean="0"/>
+              <a:t>Presenter</a:t>
+            </a:r>
+            <a:endParaRPr lang="de-DE" dirty="0"/>
+          </a:p>
+        </p:txBody>
+      </p:sp>
+      <p:sp>
+        <p:nvSpPr>
+          <p:cNvPr id="3" name="Inhaltsplatzhalter 2"/>
+          <p:cNvSpPr>
+            <a:spLocks noGrp="1"/>
+          </p:cNvSpPr>
+          <p:nvPr>
+            <p:ph idx="1"/>
+          </p:nvPr>
+        </p:nvSpPr>
+        <p:spPr>
+          <a:xfrm>
+            <a:off x="457200" y="1988841"/>
+            <a:ext cx="8229600" cy="2088232"/>
+          </a:xfrm>
+        </p:spPr>
+        <p:txBody>
+          <a:bodyPr>
+            <a:normAutofit fontScale="92500" lnSpcReduction="10000"/>
+          </a:bodyPr>
+          <a:lstStyle/>
+          <a:p>
+            <a:r>
+              <a:rPr lang="de-DE" dirty="0" smtClean="0"/>
+              <a:t>Bindeglied zwischen Model und View</a:t>
+            </a:r>
+          </a:p>
+          <a:p>
+            <a:r>
+              <a:rPr lang="de-DE" dirty="0" smtClean="0"/>
+              <a:t>Interpretation von Benutzereingaben (Verwendung: passive View)</a:t>
+            </a:r>
+          </a:p>
+          <a:p>
+            <a:pPr marL="0" indent="0">
+              <a:buNone/>
+            </a:pPr>
+            <a:r>
+              <a:rPr lang="de-DE" dirty="0" smtClean="0"/>
+              <a:t>…	</a:t>
+            </a:r>
+            <a:endParaRPr lang="de-DE" dirty="0"/>
+          </a:p>
+        </p:txBody>
+      </p:sp>
+      <p:sp>
+        <p:nvSpPr>
+          <p:cNvPr id="4" name="Datumsplatzhalter 3"/>
+          <p:cNvSpPr>
+            <a:spLocks noGrp="1"/>
+          </p:cNvSpPr>
+          <p:nvPr>
+            <p:ph type="dt" sz="half" idx="10"/>
+          </p:nvPr>
+        </p:nvSpPr>
+        <p:spPr/>
+        <p:txBody>
+          <a:bodyPr/>
+          <a:lstStyle/>
+          <a:p>
+            <a:fld id="{93F45587-BEEE-4D54-90A9-A458946DA07D}" type="datetime1">
+              <a:rPr lang="de-DE" smtClean="0"/>
+              <a:t>16.05.2013</a:t>
+            </a:fld>
+            <a:endParaRPr lang="de-DE" dirty="0"/>
+          </a:p>
+        </p:txBody>
+      </p:sp>
+      <p:sp>
+        <p:nvSpPr>
+          <p:cNvPr id="5" name="Foliennummernplatzhalter 4"/>
+          <p:cNvSpPr>
+            <a:spLocks noGrp="1"/>
+          </p:cNvSpPr>
+          <p:nvPr>
+            <p:ph type="sldNum" sz="quarter" idx="12"/>
+          </p:nvPr>
+        </p:nvSpPr>
+        <p:spPr/>
+        <p:txBody>
+          <a:bodyPr/>
+          <a:lstStyle/>
+          <a:p>
+            <a:fld id="{6C6AE60A-B69C-4790-82F7-3882EDF23186}" type="slidenum">
+              <a:rPr lang="de-DE" smtClean="0"/>
+              <a:pPr/>
+              <a:t>9</a:t>
+            </a:fld>
+            <a:endParaRPr lang="de-DE" dirty="0"/>
+          </a:p>
+        </p:txBody>
+      </p:sp>
+      <p:sp>
+        <p:nvSpPr>
+          <p:cNvPr id="6" name="Textfeld 5"/>
+          <p:cNvSpPr txBox="1"/>
+          <p:nvPr/>
+        </p:nvSpPr>
+        <p:spPr>
+          <a:xfrm>
+            <a:off x="1547664" y="4944070"/>
+            <a:ext cx="6048672" cy="1077218"/>
+          </a:xfrm>
+          <a:prstGeom prst="rect">
+            <a:avLst/>
+          </a:prstGeom>
+          <a:solidFill>
+            <a:schemeClr val="accent6">
+              <a:lumMod val="60000"/>
+              <a:lumOff val="40000"/>
+            </a:schemeClr>
+          </a:solidFill>
+        </p:spPr>
+        <p:txBody>
+          <a:bodyPr wrap="square" rtlCol="0">
+            <a:spAutoFit/>
+          </a:bodyPr>
+          <a:lstStyle/>
+          <a:p>
+            <a:pPr algn="ctr"/>
+            <a:r>
+              <a:rPr lang="de-DE" sz="3200" dirty="0"/>
+              <a:t>Modifikation des Models</a:t>
+            </a:r>
+          </a:p>
+          <a:p>
+            <a:pPr algn="ctr"/>
+            <a:r>
+              <a:rPr lang="de-DE" sz="3200" dirty="0" smtClean="0"/>
+              <a:t>Aktualisierung der View</a:t>
+            </a:r>
+            <a:endParaRPr lang="de-DE" sz="3200" dirty="0"/>
+          </a:p>
+        </p:txBody>
+      </p:sp>
+      <p:sp>
+        <p:nvSpPr>
+          <p:cNvPr id="7" name="Pfeil nach rechts 6"/>
+          <p:cNvSpPr/>
+          <p:nvPr/>
+        </p:nvSpPr>
+        <p:spPr>
+          <a:xfrm rot="5400000">
+            <a:off x="4139952" y="3933056"/>
+            <a:ext cx="864096" cy="864096"/>
+          </a:xfrm>
+          <a:prstGeom prst="rightArrow">
+            <a:avLst>
+              <a:gd name="adj1" fmla="val 100000"/>
+              <a:gd name="adj2" fmla="val 95205"/>
+            </a:avLst>
+          </a:prstGeom>
+        </p:spPr>
+        <p:style>
+          <a:lnRef idx="2">
+            <a:schemeClr val="accent1">
+              <a:shade val="50000"/>
+            </a:schemeClr>
+          </a:lnRef>
+          <a:fillRef idx="1">
+            <a:schemeClr val="accent1"/>
+          </a:fillRef>
+          <a:effectRef idx="0">
+            <a:schemeClr val="accent1"/>
+          </a:effectRef>
+          <a:fontRef idx="minor">
+            <a:schemeClr val="lt1"/>
+          </a:fontRef>
+        </p:style>
+        <p:txBody>
+          <a:bodyPr rtlCol="0" anchor="ctr"/>
+          <a:lstStyle/>
+          <a:p>
+            <a:pPr algn="ctr"/>
+            <a:endParaRPr lang="de-DE"/>
+          </a:p>
+        </p:txBody>
+      </p:sp>
+    </p:spTree>
+    <p:extLst>
+      <p:ext uri="{BB962C8B-B14F-4D97-AF65-F5344CB8AC3E}">
+        <p14:creationId xmlns:p14="http://schemas.microsoft.com/office/powerpoint/2010/main" val="3519240231"/>
       </p:ext>
     </p:extLst>
   </p:cSld>

</xml_diff>

<commit_message>
changed forms in presentation
</commit_message>
<xml_diff>
--- a/Dokumentation/Praesentation/Praesentation.pptx
+++ b/Dokumentation/Praesentation/Praesentation.pptx
@@ -207,7 +207,7 @@
           <a:p>
             <a:fld id="{AD8B85D8-A08F-474B-850C-6EBE1C4997FF}" type="datetimeFigureOut">
               <a:rPr lang="de-DE" smtClean="0"/>
-              <a:t>16.05.2013</a:t>
+              <a:t>17.05.2013</a:t>
             </a:fld>
             <a:endParaRPr lang="de-DE"/>
           </a:p>
@@ -656,7 +656,7 @@
           <a:p>
             <a:fld id="{2262EDCC-AC18-44F8-82D6-389A1A2ACCA2}" type="datetime1">
               <a:rPr lang="de-DE" smtClean="0"/>
-              <a:t>16.05.2013</a:t>
+              <a:t>17.05.2013</a:t>
             </a:fld>
             <a:endParaRPr lang="de-DE"/>
           </a:p>
@@ -828,7 +828,7 @@
           <a:p>
             <a:fld id="{CB217951-9D3E-47DC-B260-5DE836C303CA}" type="datetime1">
               <a:rPr lang="de-DE" smtClean="0"/>
-              <a:t>16.05.2013</a:t>
+              <a:t>17.05.2013</a:t>
             </a:fld>
             <a:endParaRPr lang="de-DE"/>
           </a:p>
@@ -1003,7 +1003,7 @@
           <a:p>
             <a:fld id="{EEC388B6-8733-410D-8F87-E4ED4C6F4DA7}" type="datetime1">
               <a:rPr lang="de-DE" smtClean="0"/>
-              <a:t>16.05.2013</a:t>
+              <a:t>17.05.2013</a:t>
             </a:fld>
             <a:endParaRPr lang="de-DE"/>
           </a:p>
@@ -1188,7 +1188,7 @@
           <a:p>
             <a:fld id="{93F45587-BEEE-4D54-90A9-A458946DA07D}" type="datetime1">
               <a:rPr lang="de-DE" smtClean="0"/>
-              <a:t>16.05.2013</a:t>
+              <a:t>17.05.2013</a:t>
             </a:fld>
             <a:endParaRPr lang="de-DE" dirty="0"/>
           </a:p>
@@ -1604,7 +1604,7 @@
           <a:p>
             <a:fld id="{37179F3E-53BB-4A1E-B9D8-AF3519983CCC}" type="datetime1">
               <a:rPr lang="de-DE" smtClean="0"/>
-              <a:t>16.05.2013</a:t>
+              <a:t>17.05.2013</a:t>
             </a:fld>
             <a:endParaRPr lang="de-DE" dirty="0"/>
           </a:p>
@@ -1899,7 +1899,7 @@
           <a:p>
             <a:fld id="{1A16814E-E00D-42D7-88BB-0C21ED97C26C}" type="datetime1">
               <a:rPr lang="de-DE" smtClean="0"/>
-              <a:t>16.05.2013</a:t>
+              <a:t>17.05.2013</a:t>
             </a:fld>
             <a:endParaRPr lang="de-DE"/>
           </a:p>
@@ -2316,7 +2316,7 @@
           <a:p>
             <a:fld id="{A7846212-3F43-49B0-9322-E3121984D0F5}" type="datetime1">
               <a:rPr lang="de-DE" smtClean="0"/>
-              <a:t>16.05.2013</a:t>
+              <a:t>17.05.2013</a:t>
             </a:fld>
             <a:endParaRPr lang="de-DE"/>
           </a:p>
@@ -2429,7 +2429,7 @@
           <a:p>
             <a:fld id="{33759B05-CA0A-42AB-AAD6-72142BAED1B5}" type="datetime1">
               <a:rPr lang="de-DE" smtClean="0"/>
-              <a:t>16.05.2013</a:t>
+              <a:t>17.05.2013</a:t>
             </a:fld>
             <a:endParaRPr lang="de-DE"/>
           </a:p>
@@ -2519,7 +2519,7 @@
           <a:p>
             <a:fld id="{3FC932FF-2A97-4EAE-B1FA-B102CC0C0A9E}" type="datetime1">
               <a:rPr lang="de-DE" smtClean="0"/>
-              <a:t>16.05.2013</a:t>
+              <a:t>17.05.2013</a:t>
             </a:fld>
             <a:endParaRPr lang="de-DE"/>
           </a:p>
@@ -2791,7 +2791,7 @@
           <a:p>
             <a:fld id="{1E2F9022-582B-4DAF-B74E-56B6795EA56A}" type="datetime1">
               <a:rPr lang="de-DE" smtClean="0"/>
-              <a:t>16.05.2013</a:t>
+              <a:t>17.05.2013</a:t>
             </a:fld>
             <a:endParaRPr lang="de-DE"/>
           </a:p>
@@ -3039,7 +3039,7 @@
           <a:p>
             <a:fld id="{8A551492-2435-4E67-B69C-BFD679A649D4}" type="datetime1">
               <a:rPr lang="de-DE" smtClean="0"/>
-              <a:t>16.05.2013</a:t>
+              <a:t>17.05.2013</a:t>
             </a:fld>
             <a:endParaRPr lang="de-DE"/>
           </a:p>
@@ -3247,7 +3247,7 @@
           <a:p>
             <a:fld id="{017F8D79-42BA-469E-A555-C90750336C1F}" type="datetime1">
               <a:rPr lang="de-DE" smtClean="0"/>
-              <a:t>16.05.2013</a:t>
+              <a:t>17.05.2013</a:t>
             </a:fld>
             <a:endParaRPr lang="de-DE"/>
           </a:p>
@@ -3712,7 +3712,7 @@
         </p:nvSpPr>
         <p:spPr>
           <a:xfrm>
-            <a:off x="446856" y="836712"/>
+            <a:off x="395536" y="1124744"/>
             <a:ext cx="8229600" cy="936104"/>
           </a:xfrm>
         </p:spPr>
@@ -3740,20 +3740,30 @@
         </p:nvSpPr>
         <p:spPr>
           <a:xfrm>
-            <a:off x="2267744" y="1916832"/>
-            <a:ext cx="4824536" cy="648072"/>
+            <a:off x="971600" y="2564904"/>
+            <a:ext cx="7200800" cy="648072"/>
           </a:xfrm>
+          <a:solidFill>
+            <a:schemeClr val="bg1">
+              <a:lumMod val="85000"/>
+            </a:schemeClr>
+          </a:solidFill>
+          <a:ln w="15875">
+            <a:solidFill>
+              <a:schemeClr val="tx1"/>
+            </a:solidFill>
+          </a:ln>
         </p:spPr>
         <p:txBody>
           <a:bodyPr/>
           <a:lstStyle/>
           <a:p>
-            <a:pPr marL="0" indent="0">
+            <a:pPr marL="0" indent="0" algn="ctr">
               <a:buNone/>
             </a:pPr>
             <a:r>
               <a:rPr lang="de-DE" dirty="0" smtClean="0"/>
-              <a:t>Was ist eine passive View?</a:t>
+              <a:t>Passive View</a:t>
             </a:r>
             <a:endParaRPr lang="de-DE" dirty="0"/>
           </a:p>
@@ -3776,7 +3786,7 @@
           <a:p>
             <a:fld id="{93F45587-BEEE-4D54-90A9-A458946DA07D}" type="datetime1">
               <a:rPr lang="de-DE" smtClean="0"/>
-              <a:t>16.05.2013</a:t>
+              <a:t>17.05.2013</a:t>
             </a:fld>
             <a:endParaRPr lang="de-DE" dirty="0"/>
           </a:p>
@@ -3808,54 +3818,54 @@
       </p:sp>
       <p:sp>
         <p:nvSpPr>
-          <p:cNvPr id="6" name="Pfeil nach oben 5"/>
-          <p:cNvSpPr/>
-          <p:nvPr/>
-        </p:nvSpPr>
-        <p:spPr>
-          <a:xfrm rot="10800000">
-            <a:off x="4252704" y="2708920"/>
-            <a:ext cx="484632" cy="618368"/>
-          </a:xfrm>
-          <a:prstGeom prst="upArrow">
-            <a:avLst/>
-          </a:prstGeom>
-        </p:spPr>
-        <p:style>
-          <a:lnRef idx="2">
-            <a:schemeClr val="accent1">
-              <a:shade val="50000"/>
-            </a:schemeClr>
-          </a:lnRef>
-          <a:fillRef idx="1">
-            <a:schemeClr val="accent1"/>
-          </a:fillRef>
-          <a:effectRef idx="0">
-            <a:schemeClr val="accent1"/>
-          </a:effectRef>
-          <a:fontRef idx="minor">
-            <a:schemeClr val="lt1"/>
-          </a:fontRef>
-        </p:style>
-        <p:txBody>
-          <a:bodyPr rtlCol="0" anchor="ctr"/>
-          <a:lstStyle/>
-          <a:p>
-            <a:pPr algn="ctr"/>
-            <a:endParaRPr lang="de-DE"/>
-          </a:p>
-        </p:txBody>
-      </p:sp>
-      <p:sp>
-        <p:nvSpPr>
           <p:cNvPr id="7" name="Textfeld 6"/>
           <p:cNvSpPr txBox="1"/>
           <p:nvPr/>
         </p:nvSpPr>
         <p:spPr>
           <a:xfrm>
-            <a:off x="179512" y="3573016"/>
-            <a:ext cx="8820472" cy="584775"/>
+            <a:off x="971600" y="3212976"/>
+            <a:ext cx="3528392" cy="1569660"/>
+          </a:xfrm>
+          <a:prstGeom prst="rect">
+            <a:avLst/>
+          </a:prstGeom>
+          <a:solidFill>
+            <a:schemeClr val="accent3">
+              <a:lumMod val="40000"/>
+              <a:lumOff val="60000"/>
+            </a:schemeClr>
+          </a:solidFill>
+          <a:ln w="12700">
+            <a:solidFill>
+              <a:schemeClr val="tx1"/>
+            </a:solidFill>
+          </a:ln>
+        </p:spPr>
+        <p:txBody>
+          <a:bodyPr wrap="square" rtlCol="0">
+            <a:spAutoFit/>
+          </a:bodyPr>
+          <a:lstStyle/>
+          <a:p>
+            <a:pPr algn="ctr"/>
+            <a:r>
+              <a:rPr lang="de-DE" sz="3200" dirty="0" smtClean="0"/>
+              <a:t>Reduzierung der Programmlogik auf ein Minimum</a:t>
+            </a:r>
+          </a:p>
+        </p:txBody>
+      </p:sp>
+      <p:sp>
+        <p:nvSpPr>
+          <p:cNvPr id="9" name="Rechteck 8"/>
+          <p:cNvSpPr/>
+          <p:nvPr/>
+        </p:nvSpPr>
+        <p:spPr>
+          <a:xfrm>
+            <a:off x="4499992" y="3212976"/>
+            <a:ext cx="3672408" cy="1569660"/>
           </a:xfrm>
           <a:prstGeom prst="rect">
             <a:avLst/>
@@ -3866,83 +3876,11 @@
               <a:lumOff val="40000"/>
             </a:schemeClr>
           </a:solidFill>
-        </p:spPr>
-        <p:txBody>
-          <a:bodyPr wrap="square" rtlCol="0">
-            <a:spAutoFit/>
-          </a:bodyPr>
-          <a:lstStyle/>
-          <a:p>
-            <a:pPr algn="ctr"/>
-            <a:r>
-              <a:rPr lang="de-DE" sz="3200" dirty="0" smtClean="0"/>
-              <a:t>Reduzierung der Programmlogik auf ein Minimum</a:t>
-            </a:r>
-          </a:p>
-        </p:txBody>
-      </p:sp>
-      <p:sp>
-        <p:nvSpPr>
-          <p:cNvPr id="8" name="Kreuz 7"/>
-          <p:cNvSpPr/>
-          <p:nvPr/>
-        </p:nvSpPr>
-        <p:spPr>
-          <a:xfrm>
-            <a:off x="4283968" y="4293096"/>
-            <a:ext cx="504056" cy="576064"/>
-          </a:xfrm>
-          <a:prstGeom prst="plus">
-            <a:avLst>
-              <a:gd name="adj" fmla="val 32045"/>
-            </a:avLst>
-          </a:prstGeom>
-        </p:spPr>
-        <p:style>
-          <a:lnRef idx="2">
-            <a:schemeClr val="accent1">
-              <a:shade val="50000"/>
-            </a:schemeClr>
-          </a:lnRef>
-          <a:fillRef idx="1">
-            <a:schemeClr val="accent1"/>
-          </a:fillRef>
-          <a:effectRef idx="0">
-            <a:schemeClr val="accent1"/>
-          </a:effectRef>
-          <a:fontRef idx="minor">
-            <a:schemeClr val="lt1"/>
-          </a:fontRef>
-        </p:style>
-        <p:txBody>
-          <a:bodyPr rtlCol="0" anchor="ctr"/>
-          <a:lstStyle/>
-          <a:p>
-            <a:pPr algn="ctr"/>
-            <a:endParaRPr lang="de-DE"/>
-          </a:p>
-        </p:txBody>
-      </p:sp>
-      <p:sp>
-        <p:nvSpPr>
-          <p:cNvPr id="9" name="Rechteck 8"/>
-          <p:cNvSpPr/>
-          <p:nvPr/>
-        </p:nvSpPr>
-        <p:spPr>
-          <a:xfrm>
-            <a:off x="395536" y="5085184"/>
-            <a:ext cx="8424936" cy="1077218"/>
-          </a:xfrm>
-          <a:prstGeom prst="rect">
-            <a:avLst/>
-          </a:prstGeom>
-          <a:solidFill>
-            <a:schemeClr val="accent6">
-              <a:lumMod val="60000"/>
-              <a:lumOff val="40000"/>
-            </a:schemeClr>
-          </a:solidFill>
+          <a:ln w="12700">
+            <a:solidFill>
+              <a:schemeClr val="tx1"/>
+            </a:solidFill>
+          </a:ln>
         </p:spPr>
         <p:txBody>
           <a:bodyPr wrap="square">
@@ -3955,7 +3893,6 @@
               <a:rPr lang="de-DE" sz="3200" dirty="0"/>
               <a:t>Handler der GUI-Elemente werden in die View ausgelagert</a:t>
             </a:r>
-            <a:endParaRPr lang="de-DE" sz="3200" dirty="0"/>
           </a:p>
         </p:txBody>
       </p:sp>
@@ -4036,7 +3973,7 @@
           <a:p>
             <a:fld id="{93F45587-BEEE-4D54-90A9-A458946DA07D}" type="datetime1">
               <a:rPr lang="de-DE" smtClean="0"/>
-              <a:t>16.05.2013</a:t>
+              <a:t>17.05.2013</a:t>
             </a:fld>
             <a:endParaRPr lang="de-DE" dirty="0"/>
           </a:p>
@@ -4089,7 +4026,7 @@
         </p:blipFill>
         <p:spPr bwMode="auto">
           <a:xfrm>
-            <a:off x="2267744" y="1556792"/>
+            <a:off x="2267744" y="1557536"/>
             <a:ext cx="3960440" cy="5062749"/>
           </a:xfrm>
           <a:prstGeom prst="rect">
@@ -4107,6 +4044,54 @@
           </a:extLst>
         </p:spPr>
       </p:pic>
+      <p:sp>
+        <p:nvSpPr>
+          <p:cNvPr id="3" name="Textfeld 2"/>
+          <p:cNvSpPr txBox="1"/>
+          <p:nvPr/>
+        </p:nvSpPr>
+        <p:spPr>
+          <a:xfrm>
+            <a:off x="6804248" y="3429000"/>
+            <a:ext cx="1801006" cy="646331"/>
+          </a:xfrm>
+          <a:prstGeom prst="rect">
+            <a:avLst/>
+          </a:prstGeom>
+          <a:noFill/>
+        </p:spPr>
+        <p:txBody>
+          <a:bodyPr wrap="none" rtlCol="0">
+            <a:spAutoFit/>
+          </a:bodyPr>
+          <a:lstStyle/>
+          <a:p>
+            <a:r>
+              <a:rPr lang="de-DE" dirty="0" smtClean="0">
+                <a:solidFill>
+                  <a:srgbClr val="FF0000"/>
+                </a:solidFill>
+              </a:rPr>
+              <a:t>Service in Model </a:t>
+            </a:r>
+          </a:p>
+          <a:p>
+            <a:r>
+              <a:rPr lang="de-DE" dirty="0" smtClean="0">
+                <a:solidFill>
+                  <a:srgbClr val="FF0000"/>
+                </a:solidFill>
+              </a:rPr>
+              <a:t>umbenennen </a:t>
+            </a:r>
+            <a:endParaRPr lang="de-DE" dirty="0">
+              <a:solidFill>
+                <a:srgbClr val="FF0000"/>
+              </a:solidFill>
+            </a:endParaRPr>
+          </a:p>
+        </p:txBody>
+      </p:sp>
     </p:spTree>
     <p:extLst>
       <p:ext uri="{BB962C8B-B14F-4D97-AF65-F5344CB8AC3E}">
@@ -4210,7 +4195,7 @@
           <a:p>
             <a:fld id="{93F45587-BEEE-4D54-90A9-A458946DA07D}" type="datetime1">
               <a:rPr lang="de-DE" smtClean="0"/>
-              <a:t>16.05.2013</a:t>
+              <a:t>17.05.2013</a:t>
             </a:fld>
             <a:endParaRPr lang="de-DE" dirty="0"/>
           </a:p>
@@ -4367,7 +4352,7 @@
           <a:p>
             <a:fld id="{93F45587-BEEE-4D54-90A9-A458946DA07D}" type="datetime1">
               <a:rPr lang="de-DE" smtClean="0"/>
-              <a:t>16.05.2013</a:t>
+              <a:t>17.05.2013</a:t>
             </a:fld>
             <a:endParaRPr lang="de-DE" dirty="0"/>
           </a:p>
@@ -4525,7 +4510,7 @@
           <a:p>
             <a:fld id="{93F45587-BEEE-4D54-90A9-A458946DA07D}" type="datetime1">
               <a:rPr lang="de-DE" smtClean="0"/>
-              <a:t>16.05.2013</a:t>
+              <a:t>17.05.2013</a:t>
             </a:fld>
             <a:endParaRPr lang="de-DE" dirty="0"/>
           </a:p>
@@ -4602,8 +4587,8 @@
         </p:nvSpPr>
         <p:spPr>
           <a:xfrm>
-            <a:off x="4139952" y="3789040"/>
-            <a:ext cx="864096" cy="1224136"/>
+            <a:off x="4139952" y="4005064"/>
+            <a:ext cx="864096" cy="1008112"/>
           </a:xfrm>
           <a:prstGeom prst="downArrow">
             <a:avLst/>
@@ -4631,6 +4616,44 @@
           <a:p>
             <a:pPr algn="ctr"/>
             <a:endParaRPr lang="de-DE"/>
+          </a:p>
+        </p:txBody>
+      </p:sp>
+      <p:sp>
+        <p:nvSpPr>
+          <p:cNvPr id="6" name="Textfeld 5"/>
+          <p:cNvSpPr txBox="1"/>
+          <p:nvPr/>
+        </p:nvSpPr>
+        <p:spPr>
+          <a:xfrm>
+            <a:off x="6372200" y="3789040"/>
+            <a:ext cx="2304256" cy="369332"/>
+          </a:xfrm>
+          <a:prstGeom prst="rect">
+            <a:avLst/>
+          </a:prstGeom>
+          <a:noFill/>
+        </p:spPr>
+        <p:txBody>
+          <a:bodyPr wrap="square" rtlCol="0">
+            <a:spAutoFit/>
+          </a:bodyPr>
+          <a:lstStyle/>
+          <a:p>
+            <a:r>
+              <a:rPr lang="de-DE" dirty="0" smtClean="0">
+                <a:solidFill>
+                  <a:srgbClr val="FF0000"/>
+                </a:solidFill>
+              </a:rPr>
+              <a:t>Erklärung noch </a:t>
+            </a:r>
+            <a:endParaRPr lang="de-DE" dirty="0">
+              <a:solidFill>
+                <a:srgbClr val="FF0000"/>
+              </a:solidFill>
+            </a:endParaRPr>
           </a:p>
         </p:txBody>
       </p:sp>
@@ -4711,7 +4734,7 @@
           <a:p>
             <a:fld id="{93F45587-BEEE-4D54-90A9-A458946DA07D}" type="datetime1">
               <a:rPr lang="de-DE" smtClean="0"/>
-              <a:t>16.05.2013</a:t>
+              <a:t>17.05.2013</a:t>
             </a:fld>
             <a:endParaRPr lang="de-DE" dirty="0"/>
           </a:p>
@@ -5610,6 +5633,44 @@
           </a:p>
         </p:txBody>
       </p:sp>
+      <p:sp>
+        <p:nvSpPr>
+          <p:cNvPr id="3" name="Textfeld 2"/>
+          <p:cNvSpPr txBox="1"/>
+          <p:nvPr/>
+        </p:nvSpPr>
+        <p:spPr>
+          <a:xfrm>
+            <a:off x="4716016" y="5877272"/>
+            <a:ext cx="2880320" cy="369332"/>
+          </a:xfrm>
+          <a:prstGeom prst="rect">
+            <a:avLst/>
+          </a:prstGeom>
+          <a:noFill/>
+        </p:spPr>
+        <p:txBody>
+          <a:bodyPr wrap="square" rtlCol="0">
+            <a:spAutoFit/>
+          </a:bodyPr>
+          <a:lstStyle/>
+          <a:p>
+            <a:r>
+              <a:rPr lang="de-DE" dirty="0" smtClean="0">
+                <a:solidFill>
+                  <a:srgbClr val="FF0000"/>
+                </a:solidFill>
+              </a:rPr>
+              <a:t>Ampeln nutzen</a:t>
+            </a:r>
+            <a:endParaRPr lang="de-DE" dirty="0">
+              <a:solidFill>
+                <a:srgbClr val="FF0000"/>
+              </a:solidFill>
+            </a:endParaRPr>
+          </a:p>
+        </p:txBody>
+      </p:sp>
     </p:spTree>
     <p:extLst>
       <p:ext uri="{BB962C8B-B14F-4D97-AF65-F5344CB8AC3E}">
@@ -5694,7 +5755,7 @@
           <a:p>
             <a:fld id="{93F45587-BEEE-4D54-90A9-A458946DA07D}" type="datetime1">
               <a:rPr lang="de-DE" smtClean="0"/>
-              <a:t>16.05.2013</a:t>
+              <a:t>17.05.2013</a:t>
             </a:fld>
             <a:endParaRPr lang="de-DE" dirty="0"/>
           </a:p>
@@ -5943,7 +6004,7 @@
           <a:p>
             <a:fld id="{5744CE70-91A6-4E2F-AA21-F9B5F6BBF251}" type="datetime1">
               <a:rPr lang="de-DE" smtClean="0"/>
-              <a:t>16.05.2013</a:t>
+              <a:t>17.05.2013</a:t>
             </a:fld>
             <a:endParaRPr lang="de-DE" dirty="0"/>
           </a:p>
@@ -6065,7 +6126,7 @@
           <a:p>
             <a:fld id="{93F45587-BEEE-4D54-90A9-A458946DA07D}" type="datetime1">
               <a:rPr lang="de-DE" smtClean="0"/>
-              <a:t>16.05.2013</a:t>
+              <a:t>17.05.2013</a:t>
             </a:fld>
             <a:endParaRPr lang="de-DE" dirty="0"/>
           </a:p>
@@ -6285,7 +6346,7 @@
           <a:p>
             <a:fld id="{93F45587-BEEE-4D54-90A9-A458946DA07D}" type="datetime1">
               <a:rPr lang="de-DE" smtClean="0"/>
-              <a:t>16.05.2013</a:t>
+              <a:t>17.05.2013</a:t>
             </a:fld>
             <a:endParaRPr lang="de-DE" dirty="0"/>
           </a:p>
@@ -6448,7 +6509,7 @@
           <a:p>
             <a:fld id="{93F45587-BEEE-4D54-90A9-A458946DA07D}" type="datetime1">
               <a:rPr lang="de-DE" smtClean="0"/>
-              <a:t>16.05.2013</a:t>
+              <a:t>17.05.2013</a:t>
             </a:fld>
             <a:endParaRPr lang="de-DE" dirty="0"/>
           </a:p>
@@ -6596,7 +6657,7 @@
           <a:p>
             <a:fld id="{93F45587-BEEE-4D54-90A9-A458946DA07D}" type="datetime1">
               <a:rPr lang="de-DE" smtClean="0"/>
-              <a:t>16.05.2013</a:t>
+              <a:t>17.05.2013</a:t>
             </a:fld>
             <a:endParaRPr lang="de-DE" dirty="0"/>
           </a:p>
@@ -6726,15 +6787,7 @@
           <a:p>
             <a:r>
               <a:rPr lang="de-DE" dirty="0" smtClean="0"/>
-              <a:t>Au</a:t>
-            </a:r>
-            <a:r>
-              <a:rPr lang="de-DE" b="1" dirty="0" smtClean="0"/>
-              <a:t>f</a:t>
-            </a:r>
-            <a:r>
-              <a:rPr lang="de-DE" dirty="0" smtClean="0"/>
-              <a:t>gabe: Model</a:t>
+              <a:t>Aufgabe: Model</a:t>
             </a:r>
             <a:endParaRPr lang="de-DE" dirty="0"/>
           </a:p>
@@ -6775,8 +6828,19 @@
           <a:p>
             <a:r>
               <a:rPr lang="de-DE" dirty="0" smtClean="0"/>
-              <a:t>Kapselung der Daten</a:t>
-            </a:r>
+              <a:t>Kapselung der </a:t>
+            </a:r>
+            <a:r>
+              <a:rPr lang="de-DE" dirty="0" smtClean="0"/>
+              <a:t>Daten</a:t>
+            </a:r>
+          </a:p>
+          <a:p>
+            <a:r>
+              <a:rPr lang="de-DE" dirty="0" smtClean="0"/>
+              <a:t>Enthält die Geschäftslogik</a:t>
+            </a:r>
+            <a:endParaRPr lang="de-DE" dirty="0" smtClean="0"/>
           </a:p>
           <a:p>
             <a:pPr marL="0" indent="0">
@@ -6803,7 +6867,7 @@
           <a:p>
             <a:fld id="{93F45587-BEEE-4D54-90A9-A458946DA07D}" type="datetime1">
               <a:rPr lang="de-DE" smtClean="0"/>
-              <a:t>16.05.2013</a:t>
+              <a:t>17.05.2013</a:t>
             </a:fld>
             <a:endParaRPr lang="de-DE" dirty="0"/>
           </a:p>
@@ -6964,7 +7028,7 @@
           <a:p>
             <a:fld id="{93F45587-BEEE-4D54-90A9-A458946DA07D}" type="datetime1">
               <a:rPr lang="de-DE" smtClean="0"/>
-              <a:t>16.05.2013</a:t>
+              <a:t>17.05.2013</a:t>
             </a:fld>
             <a:endParaRPr lang="de-DE" dirty="0"/>
           </a:p>

</xml_diff>

<commit_message>
enhanced observer part in presentation
</commit_message>
<xml_diff>
--- a/Dokumentation/Praesentation/Praesentation.pptx
+++ b/Dokumentation/Praesentation/Praesentation.pptx
@@ -3716,10 +3716,10 @@
           <a:lstStyle/>
           <a:p>
             <a:r>
-              <a:rPr lang="de-DE"/>
+              <a:rPr lang="de-DE" sz="3200" dirty="0"/>
               <a:t>Observer Pattern</a:t>
             </a:r>
-            <a:endParaRPr/>
+            <a:endParaRPr sz="3200" dirty="0"/>
           </a:p>
         </p:txBody>
       </p:sp>
@@ -4013,7 +4013,7 @@
         </p:blipFill>
         <p:spPr>
           <a:xfrm>
-            <a:off x="936360" y="3744000"/>
+            <a:off x="949176" y="3012815"/>
             <a:ext cx="7127640" cy="1302120"/>
           </a:xfrm>
           <a:prstGeom prst="rect">
@@ -4035,7 +4035,7 @@
         </p:blipFill>
         <p:spPr>
           <a:xfrm>
-            <a:off x="2734560" y="2232000"/>
+            <a:off x="2734560" y="1554622"/>
             <a:ext cx="1224000" cy="1224000"/>
           </a:xfrm>
           <a:prstGeom prst="rect">
@@ -4057,7 +4057,7 @@
         </p:blipFill>
         <p:spPr>
           <a:xfrm>
-            <a:off x="5398560" y="2518560"/>
+            <a:off x="5398560" y="1841182"/>
             <a:ext cx="721440" cy="721440"/>
           </a:xfrm>
           <a:prstGeom prst="rect">
@@ -4073,7 +4073,7 @@
         </p:nvSpPr>
         <p:spPr>
           <a:xfrm>
-            <a:off x="4102560" y="2437760"/>
+            <a:off x="4102560" y="1760382"/>
             <a:ext cx="1029600" cy="346680"/>
           </a:xfrm>
           <a:prstGeom prst="rect">
@@ -4100,7 +4100,7 @@
         </p:nvSpPr>
         <p:spPr>
           <a:xfrm>
-            <a:off x="3945141" y="2784440"/>
+            <a:off x="3945141" y="2107062"/>
             <a:ext cx="1440000" cy="189680"/>
           </a:xfrm>
           <a:prstGeom prst="rightArrow">
@@ -4132,6 +4132,186 @@
           </a:p>
         </p:txBody>
       </p:sp>
+      <p:sp>
+        <p:nvSpPr>
+          <p:cNvPr id="3" name="Textfeld 2"/>
+          <p:cNvSpPr txBox="1"/>
+          <p:nvPr/>
+        </p:nvSpPr>
+        <p:spPr>
+          <a:xfrm>
+            <a:off x="949176" y="4509120"/>
+            <a:ext cx="7891849" cy="1077218"/>
+          </a:xfrm>
+          <a:prstGeom prst="rect">
+            <a:avLst/>
+          </a:prstGeom>
+          <a:noFill/>
+        </p:spPr>
+        <p:txBody>
+          <a:bodyPr wrap="square" rtlCol="0">
+            <a:spAutoFit/>
+          </a:bodyPr>
+          <a:lstStyle/>
+          <a:p>
+            <a:pPr>
+              <a:spcAft>
+                <a:spcPts val="600"/>
+              </a:spcAft>
+            </a:pPr>
+            <a:r>
+              <a:rPr lang="de-DE" dirty="0" smtClean="0"/>
+              <a:t>Observer benötigt keine Informationen über Subjekt -&gt; Starke Entkopplung</a:t>
+            </a:r>
+          </a:p>
+          <a:p>
+            <a:pPr>
+              <a:spcAft>
+                <a:spcPts val="600"/>
+              </a:spcAft>
+            </a:pPr>
+            <a:r>
+              <a:rPr lang="de-DE" dirty="0" smtClean="0"/>
+              <a:t>Nicht jeder Observer benötigt alle/die selben Parameter!</a:t>
+            </a:r>
+          </a:p>
+          <a:p>
+            <a:pPr>
+              <a:spcAft>
+                <a:spcPts val="600"/>
+              </a:spcAft>
+            </a:pPr>
+            <a:r>
+              <a:rPr lang="de-DE" dirty="0" smtClean="0"/>
+              <a:t>Bei Erweiterung müssen alle Observer angepasst werden</a:t>
+            </a:r>
+            <a:endParaRPr lang="de-DE" dirty="0"/>
+          </a:p>
+        </p:txBody>
+      </p:sp>
+      <p:pic>
+        <p:nvPicPr>
+          <p:cNvPr id="3074" name="Picture 2" descr="E:\Eigene Dateien\Dropbox\__Studium\6.Semester\Design Patterns\Design-Pattern-MVC_git\symbols\Menu_Ready.png"/>
+          <p:cNvPicPr>
+            <a:picLocks noChangeAspect="1" noChangeArrowheads="1"/>
+          </p:cNvPicPr>
+          <p:nvPr/>
+        </p:nvPicPr>
+        <p:blipFill>
+          <a:blip r:embed="rId5">
+            <a:extLst>
+              <a:ext uri="{28A0092B-C50C-407E-A947-70E740481C1C}">
+                <a14:useLocalDpi xmlns:a14="http://schemas.microsoft.com/office/drawing/2010/main" val="0"/>
+              </a:ext>
+            </a:extLst>
+          </a:blip>
+          <a:srcRect/>
+          <a:stretch>
+            <a:fillRect/>
+          </a:stretch>
+        </p:blipFill>
+        <p:spPr bwMode="auto">
+          <a:xfrm>
+            <a:off x="590550" y="4557712"/>
+            <a:ext cx="304800" cy="304800"/>
+          </a:xfrm>
+          <a:prstGeom prst="rect">
+            <a:avLst/>
+          </a:prstGeom>
+          <a:noFill/>
+          <a:extLst>
+            <a:ext uri="{909E8E84-426E-40DD-AFC4-6F175D3DCCD1}">
+              <a14:hiddenFill xmlns:a14="http://schemas.microsoft.com/office/drawing/2010/main">
+                <a:solidFill>
+                  <a:srgbClr val="FFFFFF"/>
+                </a:solidFill>
+              </a14:hiddenFill>
+            </a:ext>
+          </a:extLst>
+        </p:spPr>
+      </p:pic>
+      <p:pic>
+        <p:nvPicPr>
+          <p:cNvPr id="3075" name="Picture 3" descr="E:\Eigene Dateien\Dropbox\__Studium\6.Semester\Design Patterns\Design-Pattern-MVC_git\symbols\Menu_NotReady.png"/>
+          <p:cNvPicPr>
+            <a:picLocks noChangeAspect="1" noChangeArrowheads="1"/>
+          </p:cNvPicPr>
+          <p:nvPr/>
+        </p:nvPicPr>
+        <p:blipFill>
+          <a:blip r:embed="rId6">
+            <a:extLst>
+              <a:ext uri="{28A0092B-C50C-407E-A947-70E740481C1C}">
+                <a14:useLocalDpi xmlns:a14="http://schemas.microsoft.com/office/drawing/2010/main" val="0"/>
+              </a:ext>
+            </a:extLst>
+          </a:blip>
+          <a:srcRect/>
+          <a:stretch>
+            <a:fillRect/>
+          </a:stretch>
+        </p:blipFill>
+        <p:spPr bwMode="auto">
+          <a:xfrm>
+            <a:off x="590550" y="4876018"/>
+            <a:ext cx="343421" cy="343421"/>
+          </a:xfrm>
+          <a:prstGeom prst="rect">
+            <a:avLst/>
+          </a:prstGeom>
+          <a:noFill/>
+          <a:extLst>
+            <a:ext uri="{909E8E84-426E-40DD-AFC4-6F175D3DCCD1}">
+              <a14:hiddenFill xmlns:a14="http://schemas.microsoft.com/office/drawing/2010/main">
+                <a:solidFill>
+                  <a:srgbClr val="FFFFFF"/>
+                </a:solidFill>
+              </a14:hiddenFill>
+            </a:ext>
+          </a:extLst>
+        </p:spPr>
+      </p:pic>
+      <p:pic>
+        <p:nvPicPr>
+          <p:cNvPr id="15" name="Picture 3" descr="E:\Eigene Dateien\Dropbox\__Studium\6.Semester\Design Patterns\Design-Pattern-MVC_git\symbols\Menu_NotReady.png"/>
+          <p:cNvPicPr>
+            <a:picLocks noChangeAspect="1" noChangeArrowheads="1"/>
+          </p:cNvPicPr>
+          <p:nvPr/>
+        </p:nvPicPr>
+        <p:blipFill>
+          <a:blip r:embed="rId6">
+            <a:extLst>
+              <a:ext uri="{28A0092B-C50C-407E-A947-70E740481C1C}">
+                <a14:useLocalDpi xmlns:a14="http://schemas.microsoft.com/office/drawing/2010/main" val="0"/>
+              </a:ext>
+            </a:extLst>
+          </a:blip>
+          <a:srcRect/>
+          <a:stretch>
+            <a:fillRect/>
+          </a:stretch>
+        </p:blipFill>
+        <p:spPr bwMode="auto">
+          <a:xfrm>
+            <a:off x="571499" y="5200128"/>
+            <a:ext cx="343421" cy="343421"/>
+          </a:xfrm>
+          <a:prstGeom prst="rect">
+            <a:avLst/>
+          </a:prstGeom>
+          <a:noFill/>
+          <a:extLst>
+            <a:ext uri="{909E8E84-426E-40DD-AFC4-6F175D3DCCD1}">
+              <a14:hiddenFill xmlns:a14="http://schemas.microsoft.com/office/drawing/2010/main">
+                <a:solidFill>
+                  <a:srgbClr val="FFFFFF"/>
+                </a:solidFill>
+              </a14:hiddenFill>
+            </a:ext>
+          </a:extLst>
+        </p:spPr>
+      </p:pic>
     </p:spTree>
   </p:cSld>
   <p:clrMapOvr>
@@ -4193,7 +4373,7 @@
         <p:spPr>
           <a:xfrm>
             <a:off x="97200" y="864000"/>
-            <a:ext cx="4654800" cy="387360"/>
+            <a:ext cx="5319360" cy="387360"/>
           </a:xfrm>
           <a:prstGeom prst="rect">
             <a:avLst/>
@@ -4204,10 +4384,10 @@
           <a:lstStyle/>
           <a:p>
             <a:r>
-              <a:rPr lang="de-DE" sz="2800"/>
+              <a:rPr lang="de-DE" sz="2800" dirty="0"/>
               <a:t>Observer Pattern: Variationen</a:t>
             </a:r>
-            <a:endParaRPr/>
+            <a:endParaRPr dirty="0"/>
           </a:p>
         </p:txBody>
       </p:sp>
@@ -4326,7 +4506,7 @@
         </p:blipFill>
         <p:spPr>
           <a:xfrm>
-            <a:off x="2734560" y="2232000"/>
+            <a:off x="2734560" y="1529640"/>
             <a:ext cx="1224000" cy="1224000"/>
           </a:xfrm>
           <a:prstGeom prst="rect">
@@ -4348,7 +4528,7 @@
         </p:blipFill>
         <p:spPr>
           <a:xfrm>
-            <a:off x="5416560" y="2590560"/>
+            <a:off x="5416560" y="1888200"/>
             <a:ext cx="721440" cy="721440"/>
           </a:xfrm>
           <a:prstGeom prst="rect">
@@ -4364,7 +4544,7 @@
         </p:nvSpPr>
         <p:spPr>
           <a:xfrm>
-            <a:off x="4120560" y="2304000"/>
+            <a:off x="4120560" y="1601640"/>
             <a:ext cx="1029600" cy="346680"/>
           </a:xfrm>
           <a:prstGeom prst="rect">
@@ -4397,7 +4577,7 @@
         </p:blipFill>
         <p:spPr>
           <a:xfrm>
-            <a:off x="1008360" y="3744000"/>
+            <a:off x="1015258" y="3062724"/>
             <a:ext cx="6767640" cy="1164600"/>
           </a:xfrm>
           <a:prstGeom prst="rect">
@@ -4419,7 +4599,7 @@
         </p:blipFill>
         <p:spPr>
           <a:xfrm>
-            <a:off x="4021560" y="2802960"/>
+            <a:off x="4021560" y="2100600"/>
             <a:ext cx="1334880" cy="496080"/>
           </a:xfrm>
           <a:prstGeom prst="rect">
@@ -4435,7 +4615,7 @@
         </p:nvSpPr>
         <p:spPr>
           <a:xfrm>
-            <a:off x="4295880" y="2868840"/>
+            <a:off x="4295880" y="2166480"/>
             <a:ext cx="816120" cy="346680"/>
           </a:xfrm>
           <a:prstGeom prst="rect">
@@ -4462,7 +4642,7 @@
         </p:nvSpPr>
         <p:spPr>
           <a:xfrm>
-            <a:off x="3958560" y="2650680"/>
+            <a:off x="3958560" y="1948320"/>
             <a:ext cx="1458000" cy="152280"/>
           </a:xfrm>
           <a:prstGeom prst="rightArrow">
@@ -4494,6 +4674,186 @@
           </a:p>
         </p:txBody>
       </p:sp>
+      <p:sp>
+        <p:nvSpPr>
+          <p:cNvPr id="14" name="Textfeld 13"/>
+          <p:cNvSpPr txBox="1"/>
+          <p:nvPr/>
+        </p:nvSpPr>
+        <p:spPr>
+          <a:xfrm>
+            <a:off x="949176" y="4509120"/>
+            <a:ext cx="7891849" cy="1354217"/>
+          </a:xfrm>
+          <a:prstGeom prst="rect">
+            <a:avLst/>
+          </a:prstGeom>
+          <a:noFill/>
+        </p:spPr>
+        <p:txBody>
+          <a:bodyPr wrap="square" rtlCol="0">
+            <a:spAutoFit/>
+          </a:bodyPr>
+          <a:lstStyle/>
+          <a:p>
+            <a:pPr>
+              <a:spcAft>
+                <a:spcPts val="600"/>
+              </a:spcAft>
+            </a:pPr>
+            <a:r>
+              <a:rPr lang="de-DE" dirty="0" smtClean="0"/>
+              <a:t>Jeder Observer holt sich per Getter nur die benötigten Informationen.</a:t>
+            </a:r>
+          </a:p>
+          <a:p>
+            <a:pPr>
+              <a:spcAft>
+                <a:spcPts val="600"/>
+              </a:spcAft>
+            </a:pPr>
+            <a:r>
+              <a:rPr lang="de-DE" dirty="0" smtClean="0"/>
+              <a:t>Bei mehreren Subjekten: Eindeutig von welchem Subjekt!</a:t>
+            </a:r>
+          </a:p>
+          <a:p>
+            <a:pPr>
+              <a:spcAft>
+                <a:spcPts val="600"/>
+              </a:spcAft>
+            </a:pPr>
+            <a:r>
+              <a:rPr lang="de-DE" dirty="0" smtClean="0"/>
+              <a:t>Kann ineffizient werden, da Observer herausfinden muss was sich konkret verändert hat.</a:t>
+            </a:r>
+            <a:endParaRPr lang="de-DE" dirty="0"/>
+          </a:p>
+        </p:txBody>
+      </p:sp>
+      <p:pic>
+        <p:nvPicPr>
+          <p:cNvPr id="15" name="Picture 2" descr="E:\Eigene Dateien\Dropbox\__Studium\6.Semester\Design Patterns\Design-Pattern-MVC_git\symbols\Menu_Ready.png"/>
+          <p:cNvPicPr>
+            <a:picLocks noChangeAspect="1" noChangeArrowheads="1"/>
+          </p:cNvPicPr>
+          <p:nvPr/>
+        </p:nvPicPr>
+        <p:blipFill>
+          <a:blip r:embed="rId6">
+            <a:extLst>
+              <a:ext uri="{28A0092B-C50C-407E-A947-70E740481C1C}">
+                <a14:useLocalDpi xmlns:a14="http://schemas.microsoft.com/office/drawing/2010/main" val="0"/>
+              </a:ext>
+            </a:extLst>
+          </a:blip>
+          <a:srcRect/>
+          <a:stretch>
+            <a:fillRect/>
+          </a:stretch>
+        </p:blipFill>
+        <p:spPr bwMode="auto">
+          <a:xfrm>
+            <a:off x="590550" y="4557712"/>
+            <a:ext cx="304800" cy="304800"/>
+          </a:xfrm>
+          <a:prstGeom prst="rect">
+            <a:avLst/>
+          </a:prstGeom>
+          <a:noFill/>
+          <a:extLst>
+            <a:ext uri="{909E8E84-426E-40DD-AFC4-6F175D3DCCD1}">
+              <a14:hiddenFill xmlns:a14="http://schemas.microsoft.com/office/drawing/2010/main">
+                <a:solidFill>
+                  <a:srgbClr val="FFFFFF"/>
+                </a:solidFill>
+              </a14:hiddenFill>
+            </a:ext>
+          </a:extLst>
+        </p:spPr>
+      </p:pic>
+      <p:pic>
+        <p:nvPicPr>
+          <p:cNvPr id="17" name="Picture 3" descr="E:\Eigene Dateien\Dropbox\__Studium\6.Semester\Design Patterns\Design-Pattern-MVC_git\symbols\Menu_NotReady.png"/>
+          <p:cNvPicPr>
+            <a:picLocks noChangeAspect="1" noChangeArrowheads="1"/>
+          </p:cNvPicPr>
+          <p:nvPr/>
+        </p:nvPicPr>
+        <p:blipFill>
+          <a:blip r:embed="rId7">
+            <a:extLst>
+              <a:ext uri="{28A0092B-C50C-407E-A947-70E740481C1C}">
+                <a14:useLocalDpi xmlns:a14="http://schemas.microsoft.com/office/drawing/2010/main" val="0"/>
+              </a:ext>
+            </a:extLst>
+          </a:blip>
+          <a:srcRect/>
+          <a:stretch>
+            <a:fillRect/>
+          </a:stretch>
+        </p:blipFill>
+        <p:spPr bwMode="auto">
+          <a:xfrm>
+            <a:off x="571499" y="5200128"/>
+            <a:ext cx="343421" cy="343421"/>
+          </a:xfrm>
+          <a:prstGeom prst="rect">
+            <a:avLst/>
+          </a:prstGeom>
+          <a:noFill/>
+          <a:extLst>
+            <a:ext uri="{909E8E84-426E-40DD-AFC4-6F175D3DCCD1}">
+              <a14:hiddenFill xmlns:a14="http://schemas.microsoft.com/office/drawing/2010/main">
+                <a:solidFill>
+                  <a:srgbClr val="FFFFFF"/>
+                </a:solidFill>
+              </a14:hiddenFill>
+            </a:ext>
+          </a:extLst>
+        </p:spPr>
+      </p:pic>
+      <p:pic>
+        <p:nvPicPr>
+          <p:cNvPr id="18" name="Picture 2" descr="E:\Eigene Dateien\Dropbox\__Studium\6.Semester\Design Patterns\Design-Pattern-MVC_git\symbols\Menu_Ready.png"/>
+          <p:cNvPicPr>
+            <a:picLocks noChangeAspect="1" noChangeArrowheads="1"/>
+          </p:cNvPicPr>
+          <p:nvPr/>
+        </p:nvPicPr>
+        <p:blipFill>
+          <a:blip r:embed="rId6">
+            <a:extLst>
+              <a:ext uri="{28A0092B-C50C-407E-A947-70E740481C1C}">
+                <a14:useLocalDpi xmlns:a14="http://schemas.microsoft.com/office/drawing/2010/main" val="0"/>
+              </a:ext>
+            </a:extLst>
+          </a:blip>
+          <a:srcRect/>
+          <a:stretch>
+            <a:fillRect/>
+          </a:stretch>
+        </p:blipFill>
+        <p:spPr bwMode="auto">
+          <a:xfrm>
+            <a:off x="610120" y="4881428"/>
+            <a:ext cx="304800" cy="304800"/>
+          </a:xfrm>
+          <a:prstGeom prst="rect">
+            <a:avLst/>
+          </a:prstGeom>
+          <a:noFill/>
+          <a:extLst>
+            <a:ext uri="{909E8E84-426E-40DD-AFC4-6F175D3DCCD1}">
+              <a14:hiddenFill xmlns:a14="http://schemas.microsoft.com/office/drawing/2010/main">
+                <a:solidFill>
+                  <a:srgbClr val="FFFFFF"/>
+                </a:solidFill>
+              </a14:hiddenFill>
+            </a:ext>
+          </a:extLst>
+        </p:spPr>
+      </p:pic>
     </p:spTree>
   </p:cSld>
   <p:clrMapOvr>
@@ -4555,7 +4915,7 @@
         <p:spPr>
           <a:xfrm>
             <a:off x="97200" y="864000"/>
-            <a:ext cx="4654800" cy="387360"/>
+            <a:ext cx="5842952" cy="387360"/>
           </a:xfrm>
           <a:prstGeom prst="rect">
             <a:avLst/>
@@ -4566,10 +4926,10 @@
           <a:lstStyle/>
           <a:p>
             <a:r>
-              <a:rPr lang="de-DE" sz="2800"/>
+              <a:rPr lang="de-DE" sz="2800" dirty="0"/>
               <a:t>Observer Pattern: Variationen</a:t>
             </a:r>
-            <a:endParaRPr/>
+            <a:endParaRPr dirty="0"/>
           </a:p>
         </p:txBody>
       </p:sp>
@@ -4655,7 +5015,7 @@
         </p:nvSpPr>
         <p:spPr>
           <a:xfrm>
-            <a:off x="937440" y="1800000"/>
+            <a:off x="500116" y="1553000"/>
             <a:ext cx="2518560" cy="459360"/>
           </a:xfrm>
           <a:prstGeom prst="rect">
@@ -4667,38 +5027,12 @@
           <a:lstStyle/>
           <a:p>
             <a:r>
-              <a:rPr lang="de-DE"/>
+              <a:rPr lang="de-DE" sz="2000" dirty="0"/>
               <a:t>Pull oder Push?</a:t>
             </a:r>
-            <a:endParaRPr/>
-          </a:p>
-        </p:txBody>
-      </p:sp>
-      <p:sp>
-        <p:nvSpPr>
-          <p:cNvPr id="155" name="CustomShape 5"/>
-          <p:cNvSpPr/>
-          <p:nvPr/>
-        </p:nvSpPr>
-        <p:spPr>
-          <a:xfrm>
-            <a:off x="1872000" y="2664000"/>
-            <a:ext cx="720000" cy="720000"/>
-          </a:xfrm>
-          <a:prstGeom prst="smileyFace">
-            <a:avLst>
-              <a:gd name="adj" fmla="val 17520"/>
-            </a:avLst>
-          </a:prstGeom>
-          <a:solidFill>
-            <a:srgbClr val="FFCC99"/>
-          </a:solidFill>
-          <a:ln>
-            <a:solidFill>
-              <a:srgbClr val="3465AF"/>
-            </a:solidFill>
-          </a:ln>
-        </p:spPr>
+            <a:endParaRPr sz="2000" dirty="0"/>
+          </a:p>
+        </p:txBody>
       </p:sp>
       <p:sp>
         <p:nvSpPr>
@@ -4708,7 +5042,7 @@
         </p:nvSpPr>
         <p:spPr>
           <a:xfrm rot="10800000" flipH="1">
-            <a:off x="1728000" y="3527640"/>
+            <a:off x="1728000" y="3123958"/>
             <a:ext cx="6336000" cy="2232000"/>
           </a:xfrm>
           <a:prstGeom prst="wedgeRoundRectCallout">
@@ -4726,6 +5060,188 @@
             </a:solidFill>
           </a:ln>
         </p:spPr>
+      </p:sp>
+      <p:sp>
+        <p:nvSpPr>
+          <p:cNvPr id="2" name="Abgerundete rechteckige Legende 1"/>
+          <p:cNvSpPr/>
+          <p:nvPr/>
+        </p:nvSpPr>
+        <p:spPr>
+          <a:xfrm rot="10800000" flipH="1">
+            <a:off x="755576" y="2781924"/>
+            <a:ext cx="7416824" cy="2015228"/>
+          </a:xfrm>
+          <a:prstGeom prst="wedgeRoundRectCallout">
+            <a:avLst>
+              <a:gd name="adj1" fmla="val -33417"/>
+              <a:gd name="adj2" fmla="val 46785"/>
+              <a:gd name="adj3" fmla="val 16667"/>
+            </a:avLst>
+          </a:prstGeom>
+        </p:spPr>
+        <p:style>
+          <a:lnRef idx="1">
+            <a:schemeClr val="accent1"/>
+          </a:lnRef>
+          <a:fillRef idx="2">
+            <a:schemeClr val="accent1"/>
+          </a:fillRef>
+          <a:effectRef idx="1">
+            <a:schemeClr val="accent1"/>
+          </a:effectRef>
+          <a:fontRef idx="minor">
+            <a:schemeClr val="dk1"/>
+          </a:fontRef>
+        </p:style>
+        <p:txBody>
+          <a:bodyPr rtlCol="0" anchor="ctr"/>
+          <a:lstStyle/>
+          <a:p>
+            <a:pPr algn="ctr"/>
+            <a:endParaRPr lang="de-DE" dirty="0"/>
+          </a:p>
+        </p:txBody>
+      </p:sp>
+      <p:sp>
+        <p:nvSpPr>
+          <p:cNvPr id="3" name="Textfeld 2"/>
+          <p:cNvSpPr txBox="1"/>
+          <p:nvPr/>
+        </p:nvSpPr>
+        <p:spPr>
+          <a:xfrm>
+            <a:off x="913411" y="2914460"/>
+            <a:ext cx="7488832" cy="1585049"/>
+          </a:xfrm>
+          <a:prstGeom prst="rect">
+            <a:avLst/>
+          </a:prstGeom>
+          <a:noFill/>
+        </p:spPr>
+        <p:txBody>
+          <a:bodyPr wrap="square" rtlCol="0">
+            <a:spAutoFit/>
+          </a:bodyPr>
+          <a:lstStyle/>
+          <a:p>
+            <a:r>
+              <a:rPr lang="de-DE" sz="2000" u="sng" dirty="0" smtClean="0"/>
+              <a:t>Merke</a:t>
+            </a:r>
+            <a:r>
+              <a:rPr lang="de-DE" sz="2000" dirty="0" smtClean="0"/>
+              <a:t>:</a:t>
+            </a:r>
+          </a:p>
+          <a:p>
+            <a:r>
+              <a:rPr lang="de-DE" dirty="0" smtClean="0"/>
+              <a:t>Weiß das Subjekt…</a:t>
+            </a:r>
+          </a:p>
+          <a:p>
+            <a:endParaRPr lang="de-DE" dirty="0" smtClean="0"/>
+          </a:p>
+          <a:p>
+            <a:pPr>
+              <a:spcAft>
+                <a:spcPts val="600"/>
+              </a:spcAft>
+            </a:pPr>
+            <a:r>
+              <a:rPr lang="de-DE" dirty="0" smtClean="0"/>
+              <a:t>… von den Anforderungen der Observer 	 	Push-Modell</a:t>
+            </a:r>
+          </a:p>
+          <a:p>
+            <a:r>
+              <a:rPr lang="de-DE" dirty="0" smtClean="0"/>
+              <a:t>… nichts über die Observer 			Pull-Modell</a:t>
+            </a:r>
+            <a:endParaRPr lang="de-DE" dirty="0"/>
+          </a:p>
+        </p:txBody>
+      </p:sp>
+      <p:sp>
+        <p:nvSpPr>
+          <p:cNvPr id="4" name="Pfeil nach rechts 3"/>
+          <p:cNvSpPr/>
+          <p:nvPr/>
+        </p:nvSpPr>
+        <p:spPr>
+          <a:xfrm>
+            <a:off x="5579121" y="3830789"/>
+            <a:ext cx="360040" cy="206528"/>
+          </a:xfrm>
+          <a:prstGeom prst="rightArrow">
+            <a:avLst/>
+          </a:prstGeom>
+        </p:spPr>
+        <p:style>
+          <a:lnRef idx="2">
+            <a:schemeClr val="accent1">
+              <a:shade val="50000"/>
+            </a:schemeClr>
+          </a:lnRef>
+          <a:fillRef idx="1">
+            <a:schemeClr val="accent1"/>
+          </a:fillRef>
+          <a:effectRef idx="0">
+            <a:schemeClr val="accent1"/>
+          </a:effectRef>
+          <a:fontRef idx="minor">
+            <a:schemeClr val="lt1"/>
+          </a:fontRef>
+        </p:style>
+        <p:txBody>
+          <a:bodyPr rtlCol="0" anchor="ctr"/>
+          <a:lstStyle/>
+          <a:p>
+            <a:pPr algn="ctr"/>
+            <a:endParaRPr lang="de-DE"/>
+          </a:p>
+        </p:txBody>
+      </p:sp>
+      <p:sp>
+        <p:nvSpPr>
+          <p:cNvPr id="11" name="Pfeil nach rechts 10"/>
+          <p:cNvSpPr/>
+          <p:nvPr/>
+        </p:nvSpPr>
+        <p:spPr>
+          <a:xfrm>
+            <a:off x="5580112" y="4189717"/>
+            <a:ext cx="360040" cy="206528"/>
+          </a:xfrm>
+          <a:prstGeom prst="rightArrow">
+            <a:avLst/>
+          </a:prstGeom>
+        </p:spPr>
+        <p:style>
+          <a:lnRef idx="2">
+            <a:schemeClr val="accent1">
+              <a:shade val="50000"/>
+            </a:schemeClr>
+          </a:lnRef>
+          <a:fillRef idx="1">
+            <a:schemeClr val="accent1"/>
+          </a:fillRef>
+          <a:effectRef idx="0">
+            <a:schemeClr val="accent1"/>
+          </a:effectRef>
+          <a:fontRef idx="minor">
+            <a:schemeClr val="lt1"/>
+          </a:fontRef>
+        </p:style>
+        <p:txBody>
+          <a:bodyPr rtlCol="0" anchor="ctr"/>
+          <a:lstStyle/>
+          <a:p>
+            <a:pPr algn="ctr"/>
+            <a:endParaRPr lang="de-DE"/>
+          </a:p>
+        </p:txBody>
       </p:sp>
     </p:spTree>
   </p:cSld>
@@ -4779,190 +5295,151 @@
           <a:chExt cx="0" cy="0"/>
         </a:xfrm>
       </p:grpSpPr>
-      <p:sp>
-        <p:nvSpPr>
-          <p:cNvPr id="159" name="TextShape 1"/>
-          <p:cNvSpPr txBox="1"/>
-          <p:nvPr/>
-        </p:nvSpPr>
-        <p:spPr>
-          <a:xfrm>
-            <a:off x="97200" y="864000"/>
-            <a:ext cx="5230800" cy="387360"/>
-          </a:xfrm>
-          <a:prstGeom prst="rect">
-            <a:avLst/>
-          </a:prstGeom>
-        </p:spPr>
-        <p:txBody>
-          <a:bodyPr anchor="ctr"/>
-          <a:lstStyle/>
-          <a:p>
-            <a:r>
-              <a:rPr lang="de-DE" sz="2800"/>
-              <a:t>Observer Pattern: Übung/Beispiel</a:t>
-            </a:r>
-            <a:endParaRPr/>
-          </a:p>
-        </p:txBody>
-      </p:sp>
-      <p:sp>
-        <p:nvSpPr>
-          <p:cNvPr id="160" name="TextShape 2"/>
-          <p:cNvSpPr txBox="1"/>
-          <p:nvPr/>
-        </p:nvSpPr>
-        <p:spPr>
-          <a:xfrm>
-            <a:off x="457200" y="6356520"/>
-            <a:ext cx="2133360" cy="364680"/>
-          </a:xfrm>
-          <a:prstGeom prst="rect">
-            <a:avLst/>
-          </a:prstGeom>
-        </p:spPr>
-        <p:txBody>
-          <a:bodyPr anchor="ctr"/>
-          <a:lstStyle/>
-          <a:p>
-            <a:pPr>
-              <a:lnSpc>
-                <a:spcPct val="100000"/>
-              </a:lnSpc>
-            </a:pPr>
-            <a:r>
-              <a:rPr lang="de-DE" sz="1600">
-                <a:solidFill>
-                  <a:srgbClr val="8B8B8B"/>
-                </a:solidFill>
-                <a:latin typeface="Calibri"/>
-              </a:rPr>
-              <a:t>21.05.13</a:t>
-            </a:r>
-            <a:endParaRPr/>
-          </a:p>
-        </p:txBody>
-      </p:sp>
-      <p:sp>
-        <p:nvSpPr>
-          <p:cNvPr id="161" name="TextShape 3"/>
-          <p:cNvSpPr txBox="1"/>
-          <p:nvPr/>
-        </p:nvSpPr>
-        <p:spPr>
-          <a:xfrm>
-            <a:off x="6553080" y="6356520"/>
-            <a:ext cx="2133360" cy="364680"/>
-          </a:xfrm>
-          <a:prstGeom prst="rect">
-            <a:avLst/>
-          </a:prstGeom>
-        </p:spPr>
-        <p:txBody>
-          <a:bodyPr anchor="ctr"/>
-          <a:lstStyle/>
-          <a:p>
-            <a:pPr>
-              <a:lnSpc>
-                <a:spcPct val="100000"/>
-              </a:lnSpc>
-            </a:pPr>
-            <a:fld id="{84F36B80-351F-4A1D-BE44-B95E7FFB41D9}" type="slidenum">
-              <a:rPr lang="de-DE" sz="1600">
-                <a:solidFill>
-                  <a:srgbClr val="8B8B8B"/>
-                </a:solidFill>
-                <a:latin typeface="Calibri"/>
-              </a:rPr>
-              <a:t>13</a:t>
-            </a:fld>
-            <a:endParaRPr/>
-          </a:p>
-        </p:txBody>
-      </p:sp>
       <p:pic>
         <p:nvPicPr>
-          <p:cNvPr id="162" name="Grafik 161"/>
-          <p:cNvPicPr/>
+          <p:cNvPr id="9" name="Picture 2" descr="E:\Eigene Dateien\Dropbox\__Studium\6.Semester\Design Patterns\Observer Pattern\Observer Pattern.png"/>
+          <p:cNvPicPr>
+            <a:picLocks noChangeAspect="1" noChangeArrowheads="1"/>
+          </p:cNvPicPr>
           <p:nvPr/>
         </p:nvPicPr>
         <p:blipFill>
-          <a:blip r:embed="rId2"/>
+          <a:blip r:embed="rId2">
+            <a:extLst>
+              <a:ext uri="{28A0092B-C50C-407E-A947-70E740481C1C}">
+                <a14:useLocalDpi xmlns:a14="http://schemas.microsoft.com/office/drawing/2010/main" val="0"/>
+              </a:ext>
+            </a:extLst>
+          </a:blip>
+          <a:srcRect/>
           <a:stretch>
             <a:fillRect/>
           </a:stretch>
         </p:blipFill>
-        <p:spPr>
-          <a:xfrm>
-            <a:off x="504000" y="2160000"/>
-            <a:ext cx="7844760" cy="1856160"/>
-          </a:xfrm>
-          <a:prstGeom prst="rect">
-            <a:avLst/>
-          </a:prstGeom>
+        <p:spPr bwMode="auto">
+          <a:xfrm>
+            <a:off x="1797535" y="4149080"/>
+            <a:ext cx="4500128" cy="2144444"/>
+          </a:xfrm>
+          <a:prstGeom prst="rect">
+            <a:avLst/>
+          </a:prstGeom>
+          <a:noFill/>
+          <a:extLst>
+            <a:ext uri="{909E8E84-426E-40DD-AFC4-6F175D3DCCD1}">
+              <a14:hiddenFill xmlns:a14="http://schemas.microsoft.com/office/drawing/2010/main">
+                <a:solidFill>
+                  <a:srgbClr val="FFFFFF"/>
+                </a:solidFill>
+              </a14:hiddenFill>
+            </a:ext>
+          </a:extLst>
         </p:spPr>
       </p:pic>
       <p:sp>
         <p:nvSpPr>
-          <p:cNvPr id="163" name="TextShape 4"/>
+          <p:cNvPr id="159" name="TextShape 1"/>
           <p:cNvSpPr txBox="1"/>
           <p:nvPr/>
         </p:nvSpPr>
         <p:spPr>
           <a:xfrm>
-            <a:off x="299160" y="1728000"/>
-            <a:ext cx="2004840" cy="360000"/>
-          </a:xfrm>
-          <a:prstGeom prst="rect">
-            <a:avLst/>
-          </a:prstGeom>
-        </p:spPr>
-        <p:txBody>
-          <a:bodyPr wrap="none" lIns="90000" tIns="45000" rIns="90000" bIns="45000"/>
-          <a:lstStyle/>
-          <a:p>
-            <a:r>
-              <a:rPr lang="de-DE"/>
-              <a:t>Klassendiagramm</a:t>
-            </a:r>
-            <a:endParaRPr/>
-          </a:p>
-        </p:txBody>
-      </p:sp>
-      <p:sp>
-        <p:nvSpPr>
-          <p:cNvPr id="164" name="TextShape 5"/>
+            <a:off x="97199" y="864000"/>
+            <a:ext cx="6200463" cy="387360"/>
+          </a:xfrm>
+          <a:prstGeom prst="rect">
+            <a:avLst/>
+          </a:prstGeom>
+        </p:spPr>
+        <p:txBody>
+          <a:bodyPr anchor="ctr"/>
+          <a:lstStyle/>
+          <a:p>
+            <a:r>
+              <a:rPr lang="de-DE" sz="2800" dirty="0"/>
+              <a:t>Observer Pattern: Übung/Beispiel</a:t>
+            </a:r>
+            <a:endParaRPr dirty="0"/>
+          </a:p>
+        </p:txBody>
+      </p:sp>
+      <p:sp>
+        <p:nvSpPr>
+          <p:cNvPr id="160" name="TextShape 2"/>
           <p:cNvSpPr txBox="1"/>
           <p:nvPr/>
         </p:nvSpPr>
         <p:spPr>
           <a:xfrm>
-            <a:off x="310320" y="4194000"/>
-            <a:ext cx="5089680" cy="353880"/>
-          </a:xfrm>
-          <a:prstGeom prst="rect">
-            <a:avLst/>
-          </a:prstGeom>
-        </p:spPr>
-        <p:txBody>
-          <a:bodyPr wrap="none" lIns="90000" tIns="45000" rIns="90000" bIns="45000"/>
-          <a:lstStyle/>
-          <a:p>
-            <a:r>
-              <a:rPr lang="de-DE" b="1"/>
-              <a:t>Übung</a:t>
-            </a:r>
-            <a:r>
-              <a:rPr lang="de-DE"/>
-              <a:t>: Klassendiagramm mit Observer Pattern!</a:t>
-            </a:r>
+            <a:off x="457200" y="6356520"/>
+            <a:ext cx="2133360" cy="364680"/>
+          </a:xfrm>
+          <a:prstGeom prst="rect">
+            <a:avLst/>
+          </a:prstGeom>
+        </p:spPr>
+        <p:txBody>
+          <a:bodyPr anchor="ctr"/>
+          <a:lstStyle/>
+          <a:p>
+            <a:pPr>
+              <a:lnSpc>
+                <a:spcPct val="100000"/>
+              </a:lnSpc>
+            </a:pPr>
+            <a:r>
+              <a:rPr lang="de-DE" sz="1600">
+                <a:solidFill>
+                  <a:srgbClr val="8B8B8B"/>
+                </a:solidFill>
+                <a:latin typeface="Calibri"/>
+              </a:rPr>
+              <a:t>21.05.13</a:t>
+            </a:r>
+            <a:endParaRPr/>
+          </a:p>
+        </p:txBody>
+      </p:sp>
+      <p:sp>
+        <p:nvSpPr>
+          <p:cNvPr id="161" name="TextShape 3"/>
+          <p:cNvSpPr txBox="1"/>
+          <p:nvPr/>
+        </p:nvSpPr>
+        <p:spPr>
+          <a:xfrm>
+            <a:off x="6553080" y="6356520"/>
+            <a:ext cx="2133360" cy="364680"/>
+          </a:xfrm>
+          <a:prstGeom prst="rect">
+            <a:avLst/>
+          </a:prstGeom>
+        </p:spPr>
+        <p:txBody>
+          <a:bodyPr anchor="ctr"/>
+          <a:lstStyle/>
+          <a:p>
+            <a:pPr>
+              <a:lnSpc>
+                <a:spcPct val="100000"/>
+              </a:lnSpc>
+            </a:pPr>
+            <a:fld id="{84F36B80-351F-4A1D-BE44-B95E7FFB41D9}" type="slidenum">
+              <a:rPr lang="de-DE" sz="1600">
+                <a:solidFill>
+                  <a:srgbClr val="8B8B8B"/>
+                </a:solidFill>
+                <a:latin typeface="Calibri"/>
+              </a:rPr>
+              <a:t>13</a:t>
+            </a:fld>
             <a:endParaRPr/>
           </a:p>
         </p:txBody>
       </p:sp>
       <p:pic>
         <p:nvPicPr>
-          <p:cNvPr id="165" name="Grafik 164"/>
+          <p:cNvPr id="162" name="Grafik 161"/>
           <p:cNvPicPr/>
           <p:nvPr/>
         </p:nvPicPr>
@@ -4974,8 +5451,60 @@
         </p:blipFill>
         <p:spPr>
           <a:xfrm>
-            <a:off x="5378760" y="4410000"/>
-            <a:ext cx="3333240" cy="1638000"/>
+            <a:off x="504000" y="2160000"/>
+            <a:ext cx="7844760" cy="1856160"/>
+          </a:xfrm>
+          <a:prstGeom prst="rect">
+            <a:avLst/>
+          </a:prstGeom>
+        </p:spPr>
+      </p:pic>
+      <p:sp>
+        <p:nvSpPr>
+          <p:cNvPr id="164" name="TextShape 5"/>
+          <p:cNvSpPr txBox="1"/>
+          <p:nvPr/>
+        </p:nvSpPr>
+        <p:spPr>
+          <a:xfrm>
+            <a:off x="457200" y="1734120"/>
+            <a:ext cx="5089680" cy="353880"/>
+          </a:xfrm>
+          <a:prstGeom prst="rect">
+            <a:avLst/>
+          </a:prstGeom>
+        </p:spPr>
+        <p:txBody>
+          <a:bodyPr wrap="none" lIns="90000" tIns="45000" rIns="90000" bIns="45000"/>
+          <a:lstStyle/>
+          <a:p>
+            <a:r>
+              <a:rPr lang="de-DE" b="1" dirty="0"/>
+              <a:t>Übung</a:t>
+            </a:r>
+            <a:r>
+              <a:rPr lang="de-DE" dirty="0"/>
+              <a:t>: Klassendiagramm mit Observer Pattern!</a:t>
+            </a:r>
+            <a:endParaRPr dirty="0"/>
+          </a:p>
+        </p:txBody>
+      </p:sp>
+      <p:pic>
+        <p:nvPicPr>
+          <p:cNvPr id="11" name="Grafik 10"/>
+          <p:cNvPicPr/>
+          <p:nvPr/>
+        </p:nvPicPr>
+        <p:blipFill rotWithShape="1">
+          <a:blip r:embed="rId4"/>
+          <a:srcRect t="39851" b="39851"/>
+          <a:stretch/>
+        </p:blipFill>
+        <p:spPr>
+          <a:xfrm>
+            <a:off x="6264000" y="971280"/>
+            <a:ext cx="2664000" cy="540720"/>
           </a:xfrm>
           <a:prstGeom prst="rect">
             <a:avLst/>
@@ -5043,7 +5572,7 @@
         <p:spPr>
           <a:xfrm>
             <a:off x="97200" y="864000"/>
-            <a:ext cx="5230800" cy="387360"/>
+            <a:ext cx="5842952" cy="387360"/>
           </a:xfrm>
           <a:prstGeom prst="rect">
             <a:avLst/>
@@ -5054,10 +5583,10 @@
           <a:lstStyle/>
           <a:p>
             <a:r>
-              <a:rPr lang="de-DE" sz="2800"/>
+              <a:rPr lang="de-DE" sz="2800" dirty="0"/>
               <a:t>Observer Pattern: Übung/Beispiel</a:t>
             </a:r>
-            <a:endParaRPr/>
+            <a:endParaRPr dirty="0"/>
           </a:p>
         </p:txBody>
       </p:sp>
@@ -5188,6 +5717,27 @@
           </a:p>
         </p:txBody>
       </p:sp>
+      <p:pic>
+        <p:nvPicPr>
+          <p:cNvPr id="7" name="Grafik 6"/>
+          <p:cNvPicPr/>
+          <p:nvPr/>
+        </p:nvPicPr>
+        <p:blipFill rotWithShape="1">
+          <a:blip r:embed="rId3"/>
+          <a:srcRect t="39851" b="39851"/>
+          <a:stretch/>
+        </p:blipFill>
+        <p:spPr>
+          <a:xfrm>
+            <a:off x="6264000" y="971280"/>
+            <a:ext cx="2664000" cy="540720"/>
+          </a:xfrm>
+          <a:prstGeom prst="rect">
+            <a:avLst/>
+          </a:prstGeom>
+        </p:spPr>
+      </p:pic>
     </p:spTree>
   </p:cSld>
   <p:clrMapOvr>
@@ -6435,7 +6985,7 @@
         <p:spPr>
           <a:xfrm>
             <a:off x="97200" y="864000"/>
-            <a:ext cx="2782800" cy="387360"/>
+            <a:ext cx="4834840" cy="387360"/>
           </a:xfrm>
           <a:prstGeom prst="rect">
             <a:avLst/>
@@ -6446,10 +6996,10 @@
           <a:lstStyle/>
           <a:p>
             <a:r>
-              <a:rPr lang="de-DE" sz="2800"/>
+              <a:rPr lang="de-DE" sz="2800" dirty="0"/>
               <a:t>Observer Pattern</a:t>
             </a:r>
-            <a:endParaRPr/>
+            <a:endParaRPr dirty="0"/>
           </a:p>
         </p:txBody>
       </p:sp>
@@ -6461,7 +7011,7 @@
         </p:nvSpPr>
         <p:spPr>
           <a:xfrm>
-            <a:off x="122760" y="1694880"/>
+            <a:off x="323528" y="1700808"/>
             <a:ext cx="8229240" cy="4137120"/>
           </a:xfrm>
           <a:prstGeom prst="rect">
@@ -6474,74 +7024,92 @@
           <a:p>
             <a:pPr>
               <a:buSzPct val="25000"/>
-              <a:buFont typeface="StarSymbol"/>
-              <a:buChar char=""/>
-            </a:pPr>
-            <a:r>
-              <a:rPr lang="de-DE" sz="2600" b="1" u="sng"/>
+            </a:pPr>
+            <a:r>
+              <a:rPr lang="de-DE" sz="2600" b="1" u="sng" dirty="0" smtClean="0"/>
               <a:t>Agenda</a:t>
             </a:r>
-            <a:endParaRPr/>
-          </a:p>
-          <a:p>
-            <a:pPr lvl="1">
+          </a:p>
+          <a:p>
+            <a:pPr>
               <a:buSzPct val="25000"/>
-              <a:buFont typeface="StarSymbol"/>
-              <a:buChar char=""/>
-            </a:pPr>
-            <a:r>
-              <a:rPr lang="de-DE" sz="2600"/>
+            </a:pPr>
+            <a:endParaRPr dirty="0"/>
+          </a:p>
+          <a:p>
+            <a:pPr marL="914400" lvl="1" indent="-457200">
+              <a:spcAft>
+                <a:spcPts val="600"/>
+              </a:spcAft>
+              <a:buSzPct val="100000"/>
+              <a:buFont typeface="Arial" pitchFamily="34" charset="0"/>
+              <a:buChar char="•"/>
+            </a:pPr>
+            <a:r>
+              <a:rPr lang="de-DE" sz="2800" dirty="0"/>
               <a:t>Problem</a:t>
             </a:r>
-            <a:endParaRPr/>
-          </a:p>
-          <a:p>
-            <a:pPr lvl="1">
-              <a:buSzPct val="25000"/>
-              <a:buFont typeface="StarSymbol"/>
-              <a:buChar char=""/>
-            </a:pPr>
-            <a:r>
-              <a:rPr lang="de-DE" sz="2600"/>
+            <a:endParaRPr sz="2800" dirty="0"/>
+          </a:p>
+          <a:p>
+            <a:pPr marL="914400" lvl="1" indent="-457200">
+              <a:spcAft>
+                <a:spcPts val="600"/>
+              </a:spcAft>
+              <a:buSzPct val="100000"/>
+              <a:buFont typeface="Arial" pitchFamily="34" charset="0"/>
+              <a:buChar char="•"/>
+            </a:pPr>
+            <a:r>
+              <a:rPr lang="de-DE" sz="2800" dirty="0"/>
               <a:t>Lösung: Observer Pattern</a:t>
             </a:r>
-            <a:endParaRPr/>
-          </a:p>
-          <a:p>
-            <a:pPr lvl="1">
-              <a:buSzPct val="25000"/>
-              <a:buFont typeface="StarSymbol"/>
-              <a:buChar char=""/>
-            </a:pPr>
-            <a:r>
-              <a:rPr lang="de-DE" sz="2600"/>
+            <a:endParaRPr sz="2800" dirty="0"/>
+          </a:p>
+          <a:p>
+            <a:pPr marL="914400" lvl="1" indent="-457200">
+              <a:spcAft>
+                <a:spcPts val="600"/>
+              </a:spcAft>
+              <a:buSzPct val="100000"/>
+              <a:buFont typeface="Arial" pitchFamily="34" charset="0"/>
+              <a:buChar char="•"/>
+            </a:pPr>
+            <a:r>
+              <a:rPr lang="de-DE" sz="2800" dirty="0"/>
               <a:t>Variationen</a:t>
             </a:r>
-            <a:endParaRPr/>
-          </a:p>
-          <a:p>
-            <a:pPr lvl="1">
-              <a:buSzPct val="25000"/>
-              <a:buFont typeface="StarSymbol"/>
-              <a:buChar char=""/>
-            </a:pPr>
-            <a:r>
-              <a:rPr lang="de-DE" sz="2600"/>
+            <a:endParaRPr sz="2800" dirty="0"/>
+          </a:p>
+          <a:p>
+            <a:pPr marL="914400" lvl="1" indent="-457200">
+              <a:spcAft>
+                <a:spcPts val="600"/>
+              </a:spcAft>
+              <a:buSzPct val="100000"/>
+              <a:buFont typeface="Arial" pitchFamily="34" charset="0"/>
+              <a:buChar char="•"/>
+            </a:pPr>
+            <a:r>
+              <a:rPr lang="de-DE" sz="2800" dirty="0"/>
               <a:t>Übung/Beispiel</a:t>
             </a:r>
-            <a:endParaRPr/>
-          </a:p>
-          <a:p>
-            <a:pPr lvl="1">
-              <a:buSzPct val="25000"/>
-              <a:buFont typeface="StarSymbol"/>
-              <a:buChar char=""/>
-            </a:pPr>
-            <a:r>
-              <a:rPr lang="de-DE" sz="2600"/>
+            <a:endParaRPr sz="2800" dirty="0"/>
+          </a:p>
+          <a:p>
+            <a:pPr marL="914400" lvl="1" indent="-457200">
+              <a:spcAft>
+                <a:spcPts val="600"/>
+              </a:spcAft>
+              <a:buSzPct val="100000"/>
+              <a:buFont typeface="Arial" pitchFamily="34" charset="0"/>
+              <a:buChar char="•"/>
+            </a:pPr>
+            <a:r>
+              <a:rPr lang="de-DE" sz="2800" dirty="0"/>
               <a:t>Vor- und Nachteile</a:t>
             </a:r>
-            <a:endParaRPr/>
+            <a:endParaRPr sz="2800" dirty="0"/>
           </a:p>
         </p:txBody>
       </p:sp>
@@ -9284,51 +9852,64 @@
       </p:sp>
       <p:pic>
         <p:nvPicPr>
-          <p:cNvPr id="92" name="Grafik 91"/>
+          <p:cNvPr id="7" name="Grafik 6"/>
           <p:cNvPicPr/>
+          <p:nvPr/>
+        </p:nvPicPr>
+        <p:blipFill rotWithShape="1">
+          <a:blip r:embed="rId2"/>
+          <a:srcRect t="39851" b="39851"/>
+          <a:stretch/>
+        </p:blipFill>
+        <p:spPr>
+          <a:xfrm>
+            <a:off x="6264000" y="971280"/>
+            <a:ext cx="2664000" cy="540720"/>
+          </a:xfrm>
+          <a:prstGeom prst="rect">
+            <a:avLst/>
+          </a:prstGeom>
+        </p:spPr>
+      </p:pic>
+      <p:pic>
+        <p:nvPicPr>
+          <p:cNvPr id="1026" name="Picture 2" descr="E:\Eigene Dateien\Dropbox\__Studium\6.Semester\Design Patterns\Observer Pattern\FAZ_Problem.png"/>
+          <p:cNvPicPr>
+            <a:picLocks noChangeAspect="1" noChangeArrowheads="1"/>
+          </p:cNvPicPr>
           <p:nvPr/>
         </p:nvPicPr>
         <p:blipFill>
-          <a:blip r:embed="rId2"/>
+          <a:blip r:embed="rId3">
+            <a:extLst>
+              <a:ext uri="{28A0092B-C50C-407E-A947-70E740481C1C}">
+                <a14:useLocalDpi xmlns:a14="http://schemas.microsoft.com/office/drawing/2010/main" val="0"/>
+              </a:ext>
+            </a:extLst>
+          </a:blip>
+          <a:srcRect/>
           <a:stretch>
             <a:fillRect/>
           </a:stretch>
         </p:blipFill>
-        <p:spPr>
-          <a:xfrm>
-            <a:off x="1728000" y="3024000"/>
-            <a:ext cx="5391000" cy="2063520"/>
-          </a:xfrm>
-          <a:prstGeom prst="rect">
-            <a:avLst/>
-          </a:prstGeom>
-          <a:ln w="36000">
-            <a:solidFill>
-              <a:srgbClr val="000000"/>
-            </a:solidFill>
-            <a:round/>
-          </a:ln>
-        </p:spPr>
-      </p:pic>
-      <p:pic>
-        <p:nvPicPr>
-          <p:cNvPr id="7" name="Grafik 6"/>
-          <p:cNvPicPr/>
-          <p:nvPr/>
-        </p:nvPicPr>
-        <p:blipFill rotWithShape="1">
-          <a:blip r:embed="rId3"/>
-          <a:srcRect t="39851" b="39851"/>
-          <a:stretch/>
-        </p:blipFill>
-        <p:spPr>
-          <a:xfrm>
-            <a:off x="6264000" y="971280"/>
-            <a:ext cx="2664000" cy="540720"/>
-          </a:xfrm>
-          <a:prstGeom prst="rect">
-            <a:avLst/>
-          </a:prstGeom>
+        <p:spPr bwMode="auto">
+          <a:xfrm>
+            <a:off x="611560" y="2110200"/>
+            <a:ext cx="7135812" cy="3400425"/>
+          </a:xfrm>
+          <a:prstGeom prst="rect">
+            <a:avLst/>
+          </a:prstGeom>
+          <a:noFill/>
+          <a:extLst>
+            <a:ext uri="{909E8E84-426E-40DD-AFC4-6F175D3DCCD1}">
+              <a14:hiddenFill xmlns:a14="http://schemas.microsoft.com/office/drawing/2010/main">
+                <a:solidFill>
+                  <a:srgbClr val="FFFFFF"/>
+                </a:solidFill>
+              </a14:hiddenFill>
+            </a:ext>
+          </a:extLst>
         </p:spPr>
       </p:pic>
     </p:spTree>
@@ -12059,25 +12640,27 @@
         </p:nvSpPr>
         <p:spPr>
           <a:xfrm>
-            <a:off x="864000" y="2016000"/>
-            <a:ext cx="7272000" cy="2736000"/>
-          </a:xfrm>
-          <a:prstGeom prst="rect">
-            <a:avLst/>
-          </a:prstGeom>
-        </p:spPr>
-        <p:txBody>
-          <a:bodyPr wrap="none" lIns="0" tIns="0" rIns="0" bIns="0"/>
-          <a:lstStyle/>
-          <a:p>
-            <a:r>
-              <a:rPr lang="de-DE"/>
+            <a:off x="864000" y="2204864"/>
+            <a:ext cx="6732000" cy="2369880"/>
+          </a:xfrm>
+          <a:prstGeom prst="rect">
+            <a:avLst/>
+          </a:prstGeom>
+        </p:spPr>
+        <p:txBody>
+          <a:bodyPr wrap="square" lIns="0" tIns="0" rIns="0" bIns="0">
+            <a:spAutoFit/>
+          </a:bodyPr>
+          <a:lstStyle/>
+          <a:p>
+            <a:r>
+              <a:rPr lang="de-DE" sz="2800" dirty="0"/>
               <a:t>Nachteile:</a:t>
             </a:r>
-            <a:endParaRPr/>
-          </a:p>
-          <a:p>
-            <a:endParaRPr/>
+            <a:endParaRPr sz="2800" dirty="0"/>
+          </a:p>
+          <a:p>
+            <a:endParaRPr dirty="0"/>
           </a:p>
           <a:p>
             <a:pPr>
@@ -12085,17 +12668,37 @@
               <a:buAutoNum type="arabicParenR"/>
             </a:pPr>
             <a:r>
-              <a:rPr lang="de-DE"/>
-              <a:t> Enge Verbindung zwischen FAZVerlag und Abonnenten</a:t>
-            </a:r>
-            <a:endParaRPr/>
+              <a:rPr lang="de-DE" dirty="0"/>
+              <a:t> Enge Verbindung zwischen </a:t>
+            </a:r>
+            <a:r>
+              <a:rPr lang="de-DE" dirty="0" smtClean="0"/>
+              <a:t>„</a:t>
+            </a:r>
+            <a:r>
+              <a:rPr lang="de-DE" dirty="0" err="1" smtClean="0"/>
+              <a:t>FAZVerlag</a:t>
+            </a:r>
+            <a:r>
+              <a:rPr lang="de-DE" dirty="0" smtClean="0"/>
+              <a:t>“ </a:t>
+            </a:r>
+            <a:r>
+              <a:rPr lang="de-DE" dirty="0"/>
+              <a:t>und </a:t>
+            </a:r>
+            <a:r>
+              <a:rPr lang="de-DE" dirty="0" smtClean="0"/>
+              <a:t>„Abonnenten“</a:t>
+            </a:r>
+            <a:endParaRPr dirty="0"/>
           </a:p>
           <a:p>
             <a:pPr>
               <a:buFont typeface="Times New Roman"/>
               <a:buAutoNum type="arabicParenR"/>
             </a:pPr>
-            <a:endParaRPr/>
+            <a:endParaRPr dirty="0"/>
           </a:p>
           <a:p>
             <a:pPr>
@@ -12103,17 +12706,17 @@
               <a:buAutoNum type="arabicParenR"/>
             </a:pPr>
             <a:r>
-              <a:rPr lang="de-DE"/>
+              <a:rPr lang="de-DE" dirty="0"/>
               <a:t> Erweiterbarkeit stark eingeschränkt!</a:t>
             </a:r>
-            <a:endParaRPr/>
+            <a:endParaRPr dirty="0"/>
           </a:p>
           <a:p>
             <a:pPr>
               <a:buFont typeface="Times New Roman"/>
               <a:buAutoNum type="arabicParenR"/>
             </a:pPr>
-            <a:endParaRPr/>
+            <a:endParaRPr dirty="0"/>
           </a:p>
           <a:p>
             <a:pPr>
@@ -12121,10 +12724,10 @@
               <a:buAutoNum type="arabicParenR"/>
             </a:pPr>
             <a:r>
-              <a:rPr lang="de-DE"/>
+              <a:rPr lang="de-DE" dirty="0"/>
               <a:t> Abonnement bestellen oder abbestellen während der Laufzeit nicht möglich!</a:t>
             </a:r>
-            <a:endParaRPr/>
+            <a:endParaRPr dirty="0"/>
           </a:p>
         </p:txBody>
       </p:sp>
@@ -12556,6 +13159,47 @@
           </a:p>
         </p:txBody>
       </p:sp>
+      <p:pic>
+        <p:nvPicPr>
+          <p:cNvPr id="4098" name="Picture 2" descr="E:\Eigene Dateien\Dropbox\__Studium\6.Semester\Design Patterns\Design-Pattern-MVC_git\symbols\exclamationmark.png"/>
+          <p:cNvPicPr>
+            <a:picLocks noChangeAspect="1" noChangeArrowheads="1"/>
+          </p:cNvPicPr>
+          <p:nvPr/>
+        </p:nvPicPr>
+        <p:blipFill>
+          <a:blip r:embed="rId4" cstate="print">
+            <a:extLst>
+              <a:ext uri="{28A0092B-C50C-407E-A947-70E740481C1C}">
+                <a14:useLocalDpi xmlns:a14="http://schemas.microsoft.com/office/drawing/2010/main" val="0"/>
+              </a:ext>
+            </a:extLst>
+          </a:blip>
+          <a:srcRect/>
+          <a:stretch>
+            <a:fillRect/>
+          </a:stretch>
+        </p:blipFill>
+        <p:spPr bwMode="auto">
+          <a:xfrm>
+            <a:off x="3680952" y="4049797"/>
+            <a:ext cx="629970" cy="629970"/>
+          </a:xfrm>
+          <a:prstGeom prst="rect">
+            <a:avLst/>
+          </a:prstGeom>
+          <a:noFill/>
+          <a:extLst>
+            <a:ext uri="{909E8E84-426E-40DD-AFC4-6F175D3DCCD1}">
+              <a14:hiddenFill xmlns:a14="http://schemas.microsoft.com/office/drawing/2010/main">
+                <a:solidFill>
+                  <a:srgbClr val="FFFFFF"/>
+                </a:solidFill>
+              </a14:hiddenFill>
+            </a:ext>
+          </a:extLst>
+        </p:spPr>
+      </p:pic>
     </p:spTree>
   </p:cSld>
   <p:clrMapOvr>
@@ -12711,24 +13355,43 @@
       </p:sp>
       <p:pic>
         <p:nvPicPr>
-          <p:cNvPr id="126" name="Grafik 125"/>
-          <p:cNvPicPr/>
+          <p:cNvPr id="2050" name="Picture 2" descr="E:\Eigene Dateien\Dropbox\__Studium\6.Semester\Design Patterns\Observer Pattern\Observer Pattern.png"/>
+          <p:cNvPicPr>
+            <a:picLocks noChangeAspect="1" noChangeArrowheads="1"/>
+          </p:cNvPicPr>
           <p:nvPr/>
         </p:nvPicPr>
         <p:blipFill>
-          <a:blip r:embed="rId2"/>
+          <a:blip r:embed="rId2">
+            <a:extLst>
+              <a:ext uri="{28A0092B-C50C-407E-A947-70E740481C1C}">
+                <a14:useLocalDpi xmlns:a14="http://schemas.microsoft.com/office/drawing/2010/main" val="0"/>
+              </a:ext>
+            </a:extLst>
+          </a:blip>
+          <a:srcRect/>
           <a:stretch>
             <a:fillRect/>
           </a:stretch>
         </p:blipFill>
-        <p:spPr>
-          <a:xfrm>
-            <a:off x="1224000" y="2034000"/>
-            <a:ext cx="6410160" cy="3150000"/>
-          </a:xfrm>
-          <a:prstGeom prst="rect">
-            <a:avLst/>
-          </a:prstGeom>
+        <p:spPr bwMode="auto">
+          <a:xfrm>
+            <a:off x="529348" y="2132856"/>
+            <a:ext cx="7135812" cy="3400425"/>
+          </a:xfrm>
+          <a:prstGeom prst="rect">
+            <a:avLst/>
+          </a:prstGeom>
+          <a:noFill/>
+          <a:extLst>
+            <a:ext uri="{909E8E84-426E-40DD-AFC4-6F175D3DCCD1}">
+              <a14:hiddenFill xmlns:a14="http://schemas.microsoft.com/office/drawing/2010/main">
+                <a:solidFill>
+                  <a:srgbClr val="FFFFFF"/>
+                </a:solidFill>
+              </a14:hiddenFill>
+            </a:ext>
+          </a:extLst>
         </p:spPr>
       </p:pic>
     </p:spTree>

</xml_diff>